<commit_message>
Corrected project guide's name and designation
</commit_message>
<xml_diff>
--- a/Presentation for zeroth review/PPT for zeroth review.pptx
+++ b/Presentation for zeroth review/PPT for zeroth review.pptx
@@ -117,6 +117,11 @@
       </a:defRPr>
     </a:lvl9pPr>
   </p:defaultTextStyle>
+  <p:extLst>
+    <p:ext uri="{EFAFB233-063F-42B5-8137-9DF3F51BA10A}">
+      <p15:sldGuideLst xmlns:p15="http://schemas.microsoft.com/office/powerpoint/2012/main"/>
+    </p:ext>
+  </p:extLst>
 </p:presentation>
 </file>
 
@@ -256,7 +261,7 @@
           <a:p>
             <a:fld id="{214F1ACB-3A54-4C60-B610-BAEB1CECA8AE}" type="datetimeFigureOut">
               <a:rPr lang="en-GB" smtClean="0"/>
-              <a:t>02/07/2020</a:t>
+              <a:t>08/07/2020</a:t>
             </a:fld>
             <a:endParaRPr lang="en-GB"/>
           </a:p>
@@ -687,8 +692,8 @@
             <a:chExt cx="2031741" cy="2050558"/>
           </a:xfrm>
         </p:grpSpPr>
-        <mc:AlternateContent xmlns:mc="http://schemas.openxmlformats.org/markup-compatibility/2006">
-          <mc:Choice xmlns:p14="http://schemas.microsoft.com/office/powerpoint/2010/main" Requires="p14">
+        <mc:AlternateContent xmlns:mc="http://schemas.openxmlformats.org/markup-compatibility/2006" xmlns:p14="http://schemas.microsoft.com/office/powerpoint/2010/main">
+          <mc:Choice Requires="p14">
             <p:contentPart p14:bwMode="auto" r:id="rId2">
               <p14:nvContentPartPr>
                 <p14:cNvPr id="50" name="Ink 49">
@@ -707,7 +712,7 @@
               </p14:xfrm>
             </p:contentPart>
           </mc:Choice>
-          <mc:Fallback>
+          <mc:Fallback xmlns="">
             <p:pic>
               <p:nvPicPr>
                 <p:cNvPr id="50" name="Ink 49">
@@ -1252,8 +1257,8 @@
             <a:chExt cx="2031741" cy="2050558"/>
           </a:xfrm>
         </p:grpSpPr>
-        <mc:AlternateContent xmlns:mc="http://schemas.openxmlformats.org/markup-compatibility/2006">
-          <mc:Choice xmlns:p14="http://schemas.microsoft.com/office/powerpoint/2010/main" Requires="p14">
+        <mc:AlternateContent xmlns:mc="http://schemas.openxmlformats.org/markup-compatibility/2006" xmlns:p14="http://schemas.microsoft.com/office/powerpoint/2010/main">
+          <mc:Choice Requires="p14">
             <p:contentPart p14:bwMode="auto" r:id="rId2">
               <p14:nvContentPartPr>
                 <p14:cNvPr id="3" name="Ink 2">
@@ -1272,7 +1277,7 @@
               </p14:xfrm>
             </p:contentPart>
           </mc:Choice>
-          <mc:Fallback>
+          <mc:Fallback xmlns="">
             <p:pic>
               <p:nvPicPr>
                 <p:cNvPr id="3" name="Ink 2">
@@ -5956,13 +5961,21 @@
           <a:p>
             <a:r>
               <a:rPr lang="en-US" dirty="0"/>
-              <a:t>Project Guide: Ms. Sruthi</a:t>
-            </a:r>
-          </a:p>
-          <a:p>
+              <a:t>Project Guide: Ms. </a:t>
+            </a:r>
+            <a:r>
+              <a:rPr lang="en-US" dirty="0" err="1"/>
+              <a:t>Sruthimol</a:t>
+            </a:r>
             <a:r>
               <a:rPr lang="en-US" dirty="0"/>
-              <a:t>		(Assistant Professor, IETCU)</a:t>
+              <a:t> M P</a:t>
+            </a:r>
+          </a:p>
+          <a:p>
+            <a:r>
+              <a:rPr lang="en-US" dirty="0"/>
+              <a:t>		(Lecturer, IETCU)</a:t>
             </a:r>
             <a:endParaRPr lang="en-GB" dirty="0"/>
           </a:p>

</xml_diff>

<commit_message>
ppt for zeroth review
</commit_message>
<xml_diff>
--- a/Presentation for zeroth review/PPT for zeroth review.pptx
+++ b/Presentation for zeroth review/PPT for zeroth review.pptx
@@ -117,11 +117,6 @@
       </a:defRPr>
     </a:lvl9pPr>
   </p:defaultTextStyle>
-  <p:extLst>
-    <p:ext uri="{EFAFB233-063F-42B5-8137-9DF3F51BA10A}">
-      <p15:sldGuideLst xmlns:p15="http://schemas.microsoft.com/office/powerpoint/2012/main"/>
-    </p:ext>
-  </p:extLst>
 </p:presentation>
 </file>
 
@@ -261,7 +256,8 @@
           <a:p>
             <a:fld id="{214F1ACB-3A54-4C60-B610-BAEB1CECA8AE}" type="datetimeFigureOut">
               <a:rPr lang="en-GB" smtClean="0"/>
-              <a:t>08/07/2020</a:t>
+              <a:pPr/>
+              <a:t>10/07/2020</a:t>
             </a:fld>
             <a:endParaRPr lang="en-GB"/>
           </a:p>
@@ -420,6 +416,7 @@
           <a:p>
             <a:fld id="{9EEF5C89-F8E5-40A3-AD36-649611E68BC1}" type="slidenum">
               <a:rPr lang="en-GB" smtClean="0"/>
+              <a:pPr/>
               <a:t>‹#›</a:t>
             </a:fld>
             <a:endParaRPr lang="en-GB"/>
@@ -429,7 +426,7 @@
     </p:spTree>
     <p:extLst>
       <p:ext uri="{BB962C8B-B14F-4D97-AF65-F5344CB8AC3E}">
-        <p14:creationId xmlns:p14="http://schemas.microsoft.com/office/powerpoint/2010/main" val="2297191832"/>
+        <p14:creationId xmlns:p14="http://schemas.microsoft.com/office/powerpoint/2010/main" xmlns="" val="2297191832"/>
       </p:ext>
     </p:extLst>
   </p:cSld>
@@ -551,7 +548,7 @@
           <p:cNvPr id="2" name="Title 1">
             <a:extLst>
               <a:ext uri="{FF2B5EF4-FFF2-40B4-BE49-F238E27FC236}">
-                <a16:creationId xmlns:a16="http://schemas.microsoft.com/office/drawing/2014/main" id="{578D86C8-6D2B-4FFC-983D-93E2E543A041}"/>
+                <a16:creationId xmlns:a16="http://schemas.microsoft.com/office/drawing/2014/main" xmlns="" id="{578D86C8-6D2B-4FFC-983D-93E2E543A041}"/>
               </a:ext>
             </a:extLst>
           </p:cNvPr>
@@ -594,7 +591,7 @@
           <p:cNvPr id="3" name="Subtitle 2">
             <a:extLst>
               <a:ext uri="{FF2B5EF4-FFF2-40B4-BE49-F238E27FC236}">
-                <a16:creationId xmlns:a16="http://schemas.microsoft.com/office/drawing/2014/main" id="{83A2531E-D092-4F25-9ACE-12035AA9E089}"/>
+                <a16:creationId xmlns:a16="http://schemas.microsoft.com/office/drawing/2014/main" xmlns="" id="{83A2531E-D092-4F25-9ACE-12035AA9E089}"/>
               </a:ext>
             </a:extLst>
           </p:cNvPr>
@@ -677,7 +674,7 @@
           <p:cNvPr id="57" name="Group 56">
             <a:extLst>
               <a:ext uri="{FF2B5EF4-FFF2-40B4-BE49-F238E27FC236}">
-                <a16:creationId xmlns:a16="http://schemas.microsoft.com/office/drawing/2014/main" id="{ECAEA2C5-5599-4B77-91D9-A5B76E4D0FE1}"/>
+                <a16:creationId xmlns:a16="http://schemas.microsoft.com/office/drawing/2014/main" xmlns="" id="{ECAEA2C5-5599-4B77-91D9-A5B76E4D0FE1}"/>
               </a:ext>
             </a:extLst>
           </p:cNvPr>
@@ -692,8 +689,8 @@
             <a:chExt cx="2031741" cy="2050558"/>
           </a:xfrm>
         </p:grpSpPr>
-        <mc:AlternateContent xmlns:mc="http://schemas.openxmlformats.org/markup-compatibility/2006" xmlns:p14="http://schemas.microsoft.com/office/powerpoint/2010/main">
-          <mc:Choice Requires="p14">
+        <mc:AlternateContent xmlns:mc="http://schemas.openxmlformats.org/markup-compatibility/2006">
+          <mc:Choice xmlns:p14="http://schemas.microsoft.com/office/powerpoint/2010/main" xmlns="" Requires="p14">
             <p:contentPart p14:bwMode="auto" r:id="rId2">
               <p14:nvContentPartPr>
                 <p14:cNvPr id="50" name="Ink 49">
@@ -712,13 +709,13 @@
               </p14:xfrm>
             </p:contentPart>
           </mc:Choice>
-          <mc:Fallback xmlns="">
+          <mc:Fallback>
             <p:pic>
               <p:nvPicPr>
                 <p:cNvPr id="50" name="Ink 49">
                   <a:extLst>
                     <a:ext uri="{FF2B5EF4-FFF2-40B4-BE49-F238E27FC236}">
-                      <a16:creationId xmlns:a16="http://schemas.microsoft.com/office/drawing/2014/main" id="{FB6BE38D-F203-48F2-8780-F61A41649A4B}"/>
+                      <a16:creationId xmlns:a16="http://schemas.microsoft.com/office/drawing/2014/main" xmlns="" id="{FB6BE38D-F203-48F2-8780-F61A41649A4B}"/>
                     </a:ext>
                   </a:extLst>
                 </p:cNvPr>
@@ -748,7 +745,7 @@
             <p:cNvPr id="13" name="Picture 12">
               <a:extLst>
                 <a:ext uri="{FF2B5EF4-FFF2-40B4-BE49-F238E27FC236}">
-                  <a16:creationId xmlns:a16="http://schemas.microsoft.com/office/drawing/2014/main" id="{D92AD159-30F5-4133-8C0D-17BFC35336C9}"/>
+                  <a16:creationId xmlns:a16="http://schemas.microsoft.com/office/drawing/2014/main" xmlns="" id="{D92AD159-30F5-4133-8C0D-17BFC35336C9}"/>
                 </a:ext>
               </a:extLst>
             </p:cNvPr>
@@ -758,10 +755,10 @@
             <p:nvPr userDrawn="1"/>
           </p:nvPicPr>
           <p:blipFill rotWithShape="1">
-            <a:blip r:embed="rId4">
+            <a:blip r:embed="rId4" cstate="print">
               <a:extLst>
                 <a:ext uri="{BEBA8EAE-BF5A-486C-A8C5-ECC9F3942E4B}">
-                  <a14:imgProps xmlns:a14="http://schemas.microsoft.com/office/drawing/2010/main">
+                  <a14:imgProps xmlns:a14="http://schemas.microsoft.com/office/drawing/2010/main" xmlns="">
                     <a14:imgLayer r:embed="rId5">
                       <a14:imgEffect>
                         <a14:backgroundRemoval t="17963" b="75093" l="18000" r="89000">
@@ -919,7 +916,7 @@
                   </a14:imgProps>
                 </a:ext>
                 <a:ext uri="{28A0092B-C50C-407E-A947-70E740481C1C}">
-                  <a14:useLocalDpi xmlns:a14="http://schemas.microsoft.com/office/drawing/2010/main" val="0"/>
+                  <a14:useLocalDpi xmlns:a14="http://schemas.microsoft.com/office/drawing/2010/main" xmlns="" val="0"/>
                 </a:ext>
               </a:extLst>
             </a:blip>
@@ -946,7 +943,7 @@
           <p:cNvPr id="55" name="Text Placeholder 54">
             <a:extLst>
               <a:ext uri="{FF2B5EF4-FFF2-40B4-BE49-F238E27FC236}">
-                <a16:creationId xmlns:a16="http://schemas.microsoft.com/office/drawing/2014/main" id="{3BA187E1-F2E4-4C43-AA76-1814B2BF3495}"/>
+                <a16:creationId xmlns:a16="http://schemas.microsoft.com/office/drawing/2014/main" xmlns="" id="{3BA187E1-F2E4-4C43-AA76-1814B2BF3495}"/>
               </a:ext>
             </a:extLst>
           </p:cNvPr>
@@ -1078,7 +1075,7 @@
     </p:spTree>
     <p:extLst>
       <p:ext uri="{BB962C8B-B14F-4D97-AF65-F5344CB8AC3E}">
-        <p14:creationId xmlns:p14="http://schemas.microsoft.com/office/powerpoint/2010/main" val="471687073"/>
+        <p14:creationId xmlns:p14="http://schemas.microsoft.com/office/powerpoint/2010/main" xmlns="" val="471687073"/>
       </p:ext>
     </p:extLst>
   </p:cSld>
@@ -1242,7 +1239,7 @@
           <p:cNvPr id="5" name="Group 4">
             <a:extLst>
               <a:ext uri="{FF2B5EF4-FFF2-40B4-BE49-F238E27FC236}">
-                <a16:creationId xmlns:a16="http://schemas.microsoft.com/office/drawing/2014/main" id="{07C9A18F-847B-4E5B-8FA3-1643AE6ED406}"/>
+                <a16:creationId xmlns:a16="http://schemas.microsoft.com/office/drawing/2014/main" xmlns="" id="{07C9A18F-847B-4E5B-8FA3-1643AE6ED406}"/>
               </a:ext>
             </a:extLst>
           </p:cNvPr>
@@ -1257,8 +1254,8 @@
             <a:chExt cx="2031741" cy="2050558"/>
           </a:xfrm>
         </p:grpSpPr>
-        <mc:AlternateContent xmlns:mc="http://schemas.openxmlformats.org/markup-compatibility/2006" xmlns:p14="http://schemas.microsoft.com/office/powerpoint/2010/main">
-          <mc:Choice Requires="p14">
+        <mc:AlternateContent xmlns:mc="http://schemas.openxmlformats.org/markup-compatibility/2006">
+          <mc:Choice xmlns:p14="http://schemas.microsoft.com/office/powerpoint/2010/main" xmlns="" Requires="p14">
             <p:contentPart p14:bwMode="auto" r:id="rId2">
               <p14:nvContentPartPr>
                 <p14:cNvPr id="3" name="Ink 2">
@@ -1277,13 +1274,13 @@
               </p14:xfrm>
             </p:contentPart>
           </mc:Choice>
-          <mc:Fallback xmlns="">
+          <mc:Fallback>
             <p:pic>
               <p:nvPicPr>
                 <p:cNvPr id="3" name="Ink 2">
                   <a:extLst>
                     <a:ext uri="{FF2B5EF4-FFF2-40B4-BE49-F238E27FC236}">
-                      <a16:creationId xmlns:a16="http://schemas.microsoft.com/office/drawing/2014/main" id="{2E77150D-2077-4C4F-8260-48F272948A87}"/>
+                      <a16:creationId xmlns:a16="http://schemas.microsoft.com/office/drawing/2014/main" xmlns="" id="{2E77150D-2077-4C4F-8260-48F272948A87}"/>
                     </a:ext>
                   </a:extLst>
                 </p:cNvPr>
@@ -1313,7 +1310,7 @@
             <p:cNvPr id="4" name="Picture 3">
               <a:extLst>
                 <a:ext uri="{FF2B5EF4-FFF2-40B4-BE49-F238E27FC236}">
-                  <a16:creationId xmlns:a16="http://schemas.microsoft.com/office/drawing/2014/main" id="{04983A68-AA76-444B-B12A-CA51F0AC7FEF}"/>
+                  <a16:creationId xmlns:a16="http://schemas.microsoft.com/office/drawing/2014/main" xmlns="" id="{04983A68-AA76-444B-B12A-CA51F0AC7FEF}"/>
                 </a:ext>
               </a:extLst>
             </p:cNvPr>
@@ -1326,7 +1323,7 @@
             <a:blip r:embed="rId4">
               <a:extLst>
                 <a:ext uri="{BEBA8EAE-BF5A-486C-A8C5-ECC9F3942E4B}">
-                  <a14:imgProps xmlns:a14="http://schemas.microsoft.com/office/drawing/2010/main">
+                  <a14:imgProps xmlns:a14="http://schemas.microsoft.com/office/drawing/2010/main" xmlns="">
                     <a14:imgLayer r:embed="rId5">
                       <a14:imgEffect>
                         <a14:backgroundRemoval t="17963" b="75093" l="18000" r="89000">
@@ -1484,7 +1481,7 @@
                   </a14:imgProps>
                 </a:ext>
                 <a:ext uri="{28A0092B-C50C-407E-A947-70E740481C1C}">
-                  <a14:useLocalDpi xmlns:a14="http://schemas.microsoft.com/office/drawing/2010/main" val="0"/>
+                  <a14:useLocalDpi xmlns:a14="http://schemas.microsoft.com/office/drawing/2010/main" xmlns="" val="0"/>
                 </a:ext>
               </a:extLst>
             </a:blip>
@@ -1511,7 +1508,7 @@
           <p:cNvPr id="2" name="Title 1">
             <a:extLst>
               <a:ext uri="{FF2B5EF4-FFF2-40B4-BE49-F238E27FC236}">
-                <a16:creationId xmlns:a16="http://schemas.microsoft.com/office/drawing/2014/main" id="{F38C4372-80FE-4127-A30C-12E9B363AEE9}"/>
+                <a16:creationId xmlns:a16="http://schemas.microsoft.com/office/drawing/2014/main" xmlns="" id="{F38C4372-80FE-4127-A30C-12E9B363AEE9}"/>
               </a:ext>
             </a:extLst>
           </p:cNvPr>
@@ -1547,7 +1544,7 @@
     </p:spTree>
     <p:extLst>
       <p:ext uri="{BB962C8B-B14F-4D97-AF65-F5344CB8AC3E}">
-        <p14:creationId xmlns:p14="http://schemas.microsoft.com/office/powerpoint/2010/main" val="3810280330"/>
+        <p14:creationId xmlns:p14="http://schemas.microsoft.com/office/powerpoint/2010/main" xmlns="" val="3810280330"/>
       </p:ext>
     </p:extLst>
   </p:cSld>
@@ -1711,7 +1708,7 @@
           <p:cNvPr id="2" name="Title 1">
             <a:extLst>
               <a:ext uri="{FF2B5EF4-FFF2-40B4-BE49-F238E27FC236}">
-                <a16:creationId xmlns:a16="http://schemas.microsoft.com/office/drawing/2014/main" id="{9DCC4283-054B-48F0-B3CC-117E3B827D88}"/>
+                <a16:creationId xmlns:a16="http://schemas.microsoft.com/office/drawing/2014/main" xmlns="" id="{9DCC4283-054B-48F0-B3CC-117E3B827D88}"/>
               </a:ext>
             </a:extLst>
           </p:cNvPr>
@@ -1749,7 +1746,7 @@
           <p:cNvPr id="3" name="Content Placeholder 2">
             <a:extLst>
               <a:ext uri="{FF2B5EF4-FFF2-40B4-BE49-F238E27FC236}">
-                <a16:creationId xmlns:a16="http://schemas.microsoft.com/office/drawing/2014/main" id="{6AD8E987-F462-47A1-A8CE-6C40B9C9343A}"/>
+                <a16:creationId xmlns:a16="http://schemas.microsoft.com/office/drawing/2014/main" xmlns="" id="{6AD8E987-F462-47A1-A8CE-6C40B9C9343A}"/>
               </a:ext>
             </a:extLst>
           </p:cNvPr>
@@ -1840,7 +1837,7 @@
           <p:cNvPr id="4" name="Text Placeholder 3">
             <a:extLst>
               <a:ext uri="{FF2B5EF4-FFF2-40B4-BE49-F238E27FC236}">
-                <a16:creationId xmlns:a16="http://schemas.microsoft.com/office/drawing/2014/main" id="{F75EDBAD-34E5-449A-BA33-C1A7264D2A1E}"/>
+                <a16:creationId xmlns:a16="http://schemas.microsoft.com/office/drawing/2014/main" xmlns="" id="{F75EDBAD-34E5-449A-BA33-C1A7264D2A1E}"/>
               </a:ext>
             </a:extLst>
           </p:cNvPr>
@@ -1909,7 +1906,7 @@
     </p:spTree>
     <p:extLst>
       <p:ext uri="{BB962C8B-B14F-4D97-AF65-F5344CB8AC3E}">
-        <p14:creationId xmlns:p14="http://schemas.microsoft.com/office/powerpoint/2010/main" val="2794541666"/>
+        <p14:creationId xmlns:p14="http://schemas.microsoft.com/office/powerpoint/2010/main" xmlns="" val="2794541666"/>
       </p:ext>
     </p:extLst>
   </p:cSld>
@@ -1941,7 +1938,7 @@
           <p:cNvPr id="2" name="Title 1">
             <a:extLst>
               <a:ext uri="{FF2B5EF4-FFF2-40B4-BE49-F238E27FC236}">
-                <a16:creationId xmlns:a16="http://schemas.microsoft.com/office/drawing/2014/main" id="{9DB249FE-74A0-4E5C-BD08-0E8354535E2F}"/>
+                <a16:creationId xmlns:a16="http://schemas.microsoft.com/office/drawing/2014/main" xmlns="" id="{9DB249FE-74A0-4E5C-BD08-0E8354535E2F}"/>
               </a:ext>
             </a:extLst>
           </p:cNvPr>
@@ -1979,7 +1976,7 @@
           <p:cNvPr id="3" name="Picture Placeholder 2">
             <a:extLst>
               <a:ext uri="{FF2B5EF4-FFF2-40B4-BE49-F238E27FC236}">
-                <a16:creationId xmlns:a16="http://schemas.microsoft.com/office/drawing/2014/main" id="{2B5C49BD-8862-4E69-BE0A-242D2BDC9EA0}"/>
+                <a16:creationId xmlns:a16="http://schemas.microsoft.com/office/drawing/2014/main" xmlns="" id="{2B5C49BD-8862-4E69-BE0A-242D2BDC9EA0}"/>
               </a:ext>
             </a:extLst>
           </p:cNvPr>
@@ -2046,7 +2043,7 @@
           <p:cNvPr id="4" name="Text Placeholder 3">
             <a:extLst>
               <a:ext uri="{FF2B5EF4-FFF2-40B4-BE49-F238E27FC236}">
-                <a16:creationId xmlns:a16="http://schemas.microsoft.com/office/drawing/2014/main" id="{494AD79A-F6C8-46A5-A1A8-95F7DCE4ECF0}"/>
+                <a16:creationId xmlns:a16="http://schemas.microsoft.com/office/drawing/2014/main" xmlns="" id="{494AD79A-F6C8-46A5-A1A8-95F7DCE4ECF0}"/>
               </a:ext>
             </a:extLst>
           </p:cNvPr>
@@ -2115,7 +2112,7 @@
     </p:spTree>
     <p:extLst>
       <p:ext uri="{BB962C8B-B14F-4D97-AF65-F5344CB8AC3E}">
-        <p14:creationId xmlns:p14="http://schemas.microsoft.com/office/powerpoint/2010/main" val="2151328302"/>
+        <p14:creationId xmlns:p14="http://schemas.microsoft.com/office/powerpoint/2010/main" xmlns="" val="2151328302"/>
       </p:ext>
     </p:extLst>
   </p:cSld>
@@ -2147,7 +2144,7 @@
           <p:cNvPr id="2" name="Title 1">
             <a:extLst>
               <a:ext uri="{FF2B5EF4-FFF2-40B4-BE49-F238E27FC236}">
-                <a16:creationId xmlns:a16="http://schemas.microsoft.com/office/drawing/2014/main" id="{011A0785-A860-4149-B264-37332081F1DB}"/>
+                <a16:creationId xmlns:a16="http://schemas.microsoft.com/office/drawing/2014/main" xmlns="" id="{011A0785-A860-4149-B264-37332081F1DB}"/>
               </a:ext>
             </a:extLst>
           </p:cNvPr>
@@ -2176,7 +2173,7 @@
           <p:cNvPr id="3" name="Vertical Text Placeholder 2">
             <a:extLst>
               <a:ext uri="{FF2B5EF4-FFF2-40B4-BE49-F238E27FC236}">
-                <a16:creationId xmlns:a16="http://schemas.microsoft.com/office/drawing/2014/main" id="{61C899BC-8D69-44F1-AB35-08D0DF6C1525}"/>
+                <a16:creationId xmlns:a16="http://schemas.microsoft.com/office/drawing/2014/main" xmlns="" id="{61C899BC-8D69-44F1-AB35-08D0DF6C1525}"/>
               </a:ext>
             </a:extLst>
           </p:cNvPr>
@@ -2232,7 +2229,7 @@
     </p:spTree>
     <p:extLst>
       <p:ext uri="{BB962C8B-B14F-4D97-AF65-F5344CB8AC3E}">
-        <p14:creationId xmlns:p14="http://schemas.microsoft.com/office/powerpoint/2010/main" val="1408123653"/>
+        <p14:creationId xmlns:p14="http://schemas.microsoft.com/office/powerpoint/2010/main" xmlns="" val="1408123653"/>
       </p:ext>
     </p:extLst>
   </p:cSld>
@@ -2264,7 +2261,7 @@
           <p:cNvPr id="2" name="Vertical Title 1">
             <a:extLst>
               <a:ext uri="{FF2B5EF4-FFF2-40B4-BE49-F238E27FC236}">
-                <a16:creationId xmlns:a16="http://schemas.microsoft.com/office/drawing/2014/main" id="{A0F5313C-276E-4E90-9E35-1B85A87C6F5A}"/>
+                <a16:creationId xmlns:a16="http://schemas.microsoft.com/office/drawing/2014/main" xmlns="" id="{A0F5313C-276E-4E90-9E35-1B85A87C6F5A}"/>
               </a:ext>
             </a:extLst>
           </p:cNvPr>
@@ -2298,7 +2295,7 @@
           <p:cNvPr id="3" name="Vertical Text Placeholder 2">
             <a:extLst>
               <a:ext uri="{FF2B5EF4-FFF2-40B4-BE49-F238E27FC236}">
-                <a16:creationId xmlns:a16="http://schemas.microsoft.com/office/drawing/2014/main" id="{20FF834D-890F-4680-8689-2BD5447ACF5A}"/>
+                <a16:creationId xmlns:a16="http://schemas.microsoft.com/office/drawing/2014/main" xmlns="" id="{20FF834D-890F-4680-8689-2BD5447ACF5A}"/>
               </a:ext>
             </a:extLst>
           </p:cNvPr>
@@ -2359,7 +2356,7 @@
     </p:spTree>
     <p:extLst>
       <p:ext uri="{BB962C8B-B14F-4D97-AF65-F5344CB8AC3E}">
-        <p14:creationId xmlns:p14="http://schemas.microsoft.com/office/powerpoint/2010/main" val="4036660327"/>
+        <p14:creationId xmlns:p14="http://schemas.microsoft.com/office/powerpoint/2010/main" xmlns="" val="4036660327"/>
       </p:ext>
     </p:extLst>
   </p:cSld>
@@ -2391,7 +2388,7 @@
           <p:cNvPr id="2" name="Title 1">
             <a:extLst>
               <a:ext uri="{FF2B5EF4-FFF2-40B4-BE49-F238E27FC236}">
-                <a16:creationId xmlns:a16="http://schemas.microsoft.com/office/drawing/2014/main" id="{CBBC78D2-CC29-42B3-BD3A-9429DC3F4EA8}"/>
+                <a16:creationId xmlns:a16="http://schemas.microsoft.com/office/drawing/2014/main" xmlns="" id="{CBBC78D2-CC29-42B3-BD3A-9429DC3F4EA8}"/>
               </a:ext>
             </a:extLst>
           </p:cNvPr>
@@ -2425,7 +2422,7 @@
           <p:cNvPr id="3" name="Content Placeholder 2">
             <a:extLst>
               <a:ext uri="{FF2B5EF4-FFF2-40B4-BE49-F238E27FC236}">
-                <a16:creationId xmlns:a16="http://schemas.microsoft.com/office/drawing/2014/main" id="{E654DA8E-4DCE-4631-8CD5-663BBE8C02B1}"/>
+                <a16:creationId xmlns:a16="http://schemas.microsoft.com/office/drawing/2014/main" xmlns="" id="{E654DA8E-4DCE-4631-8CD5-663BBE8C02B1}"/>
               </a:ext>
             </a:extLst>
           </p:cNvPr>
@@ -2481,7 +2478,7 @@
     </p:spTree>
     <p:extLst>
       <p:ext uri="{BB962C8B-B14F-4D97-AF65-F5344CB8AC3E}">
-        <p14:creationId xmlns:p14="http://schemas.microsoft.com/office/powerpoint/2010/main" val="3173560049"/>
+        <p14:creationId xmlns:p14="http://schemas.microsoft.com/office/powerpoint/2010/main" xmlns="" val="3173560049"/>
       </p:ext>
     </p:extLst>
   </p:cSld>
@@ -2513,7 +2510,7 @@
           <p:cNvPr id="2" name="Title 1">
             <a:extLst>
               <a:ext uri="{FF2B5EF4-FFF2-40B4-BE49-F238E27FC236}">
-                <a16:creationId xmlns:a16="http://schemas.microsoft.com/office/drawing/2014/main" id="{5366661B-B600-4B3F-B84F-A6EA533E9CD4}"/>
+                <a16:creationId xmlns:a16="http://schemas.microsoft.com/office/drawing/2014/main" xmlns="" id="{5366661B-B600-4B3F-B84F-A6EA533E9CD4}"/>
               </a:ext>
             </a:extLst>
           </p:cNvPr>
@@ -2551,7 +2548,7 @@
           <p:cNvPr id="3" name="Text Placeholder 2">
             <a:extLst>
               <a:ext uri="{FF2B5EF4-FFF2-40B4-BE49-F238E27FC236}">
-                <a16:creationId xmlns:a16="http://schemas.microsoft.com/office/drawing/2014/main" id="{1D20F399-D44C-43E2-822F-B37E84B37941}"/>
+                <a16:creationId xmlns:a16="http://schemas.microsoft.com/office/drawing/2014/main" xmlns="" id="{1D20F399-D44C-43E2-822F-B37E84B37941}"/>
               </a:ext>
             </a:extLst>
           </p:cNvPr>
@@ -2674,7 +2671,7 @@
     </p:spTree>
     <p:extLst>
       <p:ext uri="{BB962C8B-B14F-4D97-AF65-F5344CB8AC3E}">
-        <p14:creationId xmlns:p14="http://schemas.microsoft.com/office/powerpoint/2010/main" val="4261384099"/>
+        <p14:creationId xmlns:p14="http://schemas.microsoft.com/office/powerpoint/2010/main" xmlns="" val="4261384099"/>
       </p:ext>
     </p:extLst>
   </p:cSld>
@@ -2706,7 +2703,7 @@
           <p:cNvPr id="2" name="Title 1">
             <a:extLst>
               <a:ext uri="{FF2B5EF4-FFF2-40B4-BE49-F238E27FC236}">
-                <a16:creationId xmlns:a16="http://schemas.microsoft.com/office/drawing/2014/main" id="{9435A36D-A260-446F-A3BF-CF8275A8C728}"/>
+                <a16:creationId xmlns:a16="http://schemas.microsoft.com/office/drawing/2014/main" xmlns="" id="{9435A36D-A260-446F-A3BF-CF8275A8C728}"/>
               </a:ext>
             </a:extLst>
           </p:cNvPr>
@@ -2735,7 +2732,7 @@
           <p:cNvPr id="3" name="Content Placeholder 2">
             <a:extLst>
               <a:ext uri="{FF2B5EF4-FFF2-40B4-BE49-F238E27FC236}">
-                <a16:creationId xmlns:a16="http://schemas.microsoft.com/office/drawing/2014/main" id="{FB0C39BB-EE0C-49AA-888E-DFE190F346CB}"/>
+                <a16:creationId xmlns:a16="http://schemas.microsoft.com/office/drawing/2014/main" xmlns="" id="{FB0C39BB-EE0C-49AA-888E-DFE190F346CB}"/>
               </a:ext>
             </a:extLst>
           </p:cNvPr>
@@ -2798,7 +2795,7 @@
           <p:cNvPr id="4" name="Content Placeholder 3">
             <a:extLst>
               <a:ext uri="{FF2B5EF4-FFF2-40B4-BE49-F238E27FC236}">
-                <a16:creationId xmlns:a16="http://schemas.microsoft.com/office/drawing/2014/main" id="{E5103877-8D68-4F8F-B625-A507051F8B61}"/>
+                <a16:creationId xmlns:a16="http://schemas.microsoft.com/office/drawing/2014/main" xmlns="" id="{E5103877-8D68-4F8F-B625-A507051F8B61}"/>
               </a:ext>
             </a:extLst>
           </p:cNvPr>
@@ -2859,7 +2856,7 @@
     </p:spTree>
     <p:extLst>
       <p:ext uri="{BB962C8B-B14F-4D97-AF65-F5344CB8AC3E}">
-        <p14:creationId xmlns:p14="http://schemas.microsoft.com/office/powerpoint/2010/main" val="2339916918"/>
+        <p14:creationId xmlns:p14="http://schemas.microsoft.com/office/powerpoint/2010/main" xmlns="" val="2339916918"/>
       </p:ext>
     </p:extLst>
   </p:cSld>
@@ -2891,7 +2888,7 @@
           <p:cNvPr id="2" name="Title 1">
             <a:extLst>
               <a:ext uri="{FF2B5EF4-FFF2-40B4-BE49-F238E27FC236}">
-                <a16:creationId xmlns:a16="http://schemas.microsoft.com/office/drawing/2014/main" id="{F404C676-2C9F-44EE-9DDF-372C3CF4F0D1}"/>
+                <a16:creationId xmlns:a16="http://schemas.microsoft.com/office/drawing/2014/main" xmlns="" id="{F404C676-2C9F-44EE-9DDF-372C3CF4F0D1}"/>
               </a:ext>
             </a:extLst>
           </p:cNvPr>
@@ -2925,7 +2922,7 @@
           <p:cNvPr id="3" name="Text Placeholder 2">
             <a:extLst>
               <a:ext uri="{FF2B5EF4-FFF2-40B4-BE49-F238E27FC236}">
-                <a16:creationId xmlns:a16="http://schemas.microsoft.com/office/drawing/2014/main" id="{8EE3024E-0925-4490-9885-5DA80B60D7DD}"/>
+                <a16:creationId xmlns:a16="http://schemas.microsoft.com/office/drawing/2014/main" xmlns="" id="{8EE3024E-0925-4490-9885-5DA80B60D7DD}"/>
               </a:ext>
             </a:extLst>
           </p:cNvPr>
@@ -3000,7 +2997,7 @@
           <p:cNvPr id="4" name="Content Placeholder 3">
             <a:extLst>
               <a:ext uri="{FF2B5EF4-FFF2-40B4-BE49-F238E27FC236}">
-                <a16:creationId xmlns:a16="http://schemas.microsoft.com/office/drawing/2014/main" id="{B539E42C-ACC9-4DC3-A730-BB399E21E214}"/>
+                <a16:creationId xmlns:a16="http://schemas.microsoft.com/office/drawing/2014/main" xmlns="" id="{B539E42C-ACC9-4DC3-A730-BB399E21E214}"/>
               </a:ext>
             </a:extLst>
           </p:cNvPr>
@@ -3063,7 +3060,7 @@
           <p:cNvPr id="5" name="Text Placeholder 4">
             <a:extLst>
               <a:ext uri="{FF2B5EF4-FFF2-40B4-BE49-F238E27FC236}">
-                <a16:creationId xmlns:a16="http://schemas.microsoft.com/office/drawing/2014/main" id="{EB12227A-348F-422D-8F87-E5107D7BB2A9}"/>
+                <a16:creationId xmlns:a16="http://schemas.microsoft.com/office/drawing/2014/main" xmlns="" id="{EB12227A-348F-422D-8F87-E5107D7BB2A9}"/>
               </a:ext>
             </a:extLst>
           </p:cNvPr>
@@ -3119,7 +3116,7 @@
           <p:cNvPr id="6" name="Content Placeholder 5">
             <a:extLst>
               <a:ext uri="{FF2B5EF4-FFF2-40B4-BE49-F238E27FC236}">
-                <a16:creationId xmlns:a16="http://schemas.microsoft.com/office/drawing/2014/main" id="{3A83B768-5796-48C3-ABA5-90CCA0C4434A}"/>
+                <a16:creationId xmlns:a16="http://schemas.microsoft.com/office/drawing/2014/main" xmlns="" id="{3A83B768-5796-48C3-ABA5-90CCA0C4434A}"/>
               </a:ext>
             </a:extLst>
           </p:cNvPr>
@@ -3180,7 +3177,7 @@
     </p:spTree>
     <p:extLst>
       <p:ext uri="{BB962C8B-B14F-4D97-AF65-F5344CB8AC3E}">
-        <p14:creationId xmlns:p14="http://schemas.microsoft.com/office/powerpoint/2010/main" val="1034063741"/>
+        <p14:creationId xmlns:p14="http://schemas.microsoft.com/office/powerpoint/2010/main" xmlns="" val="1034063741"/>
       </p:ext>
     </p:extLst>
   </p:cSld>
@@ -3212,7 +3209,7 @@
           <p:cNvPr id="2" name="Title 1">
             <a:extLst>
               <a:ext uri="{FF2B5EF4-FFF2-40B4-BE49-F238E27FC236}">
-                <a16:creationId xmlns:a16="http://schemas.microsoft.com/office/drawing/2014/main" id="{F404C676-2C9F-44EE-9DDF-372C3CF4F0D1}"/>
+                <a16:creationId xmlns:a16="http://schemas.microsoft.com/office/drawing/2014/main" xmlns="" id="{F404C676-2C9F-44EE-9DDF-372C3CF4F0D1}"/>
               </a:ext>
             </a:extLst>
           </p:cNvPr>
@@ -3246,7 +3243,7 @@
           <p:cNvPr id="3" name="Text Placeholder 2">
             <a:extLst>
               <a:ext uri="{FF2B5EF4-FFF2-40B4-BE49-F238E27FC236}">
-                <a16:creationId xmlns:a16="http://schemas.microsoft.com/office/drawing/2014/main" id="{8EE3024E-0925-4490-9885-5DA80B60D7DD}"/>
+                <a16:creationId xmlns:a16="http://schemas.microsoft.com/office/drawing/2014/main" xmlns="" id="{8EE3024E-0925-4490-9885-5DA80B60D7DD}"/>
               </a:ext>
             </a:extLst>
           </p:cNvPr>
@@ -3327,7 +3324,7 @@
           <p:cNvPr id="4" name="Content Placeholder 3">
             <a:extLst>
               <a:ext uri="{FF2B5EF4-FFF2-40B4-BE49-F238E27FC236}">
-                <a16:creationId xmlns:a16="http://schemas.microsoft.com/office/drawing/2014/main" id="{B539E42C-ACC9-4DC3-A730-BB399E21E214}"/>
+                <a16:creationId xmlns:a16="http://schemas.microsoft.com/office/drawing/2014/main" xmlns="" id="{B539E42C-ACC9-4DC3-A730-BB399E21E214}"/>
               </a:ext>
             </a:extLst>
           </p:cNvPr>
@@ -3396,7 +3393,7 @@
           <p:cNvPr id="5" name="Text Placeholder 4">
             <a:extLst>
               <a:ext uri="{FF2B5EF4-FFF2-40B4-BE49-F238E27FC236}">
-                <a16:creationId xmlns:a16="http://schemas.microsoft.com/office/drawing/2014/main" id="{EB12227A-348F-422D-8F87-E5107D7BB2A9}"/>
+                <a16:creationId xmlns:a16="http://schemas.microsoft.com/office/drawing/2014/main" xmlns="" id="{EB12227A-348F-422D-8F87-E5107D7BB2A9}"/>
               </a:ext>
             </a:extLst>
           </p:cNvPr>
@@ -3458,7 +3455,7 @@
           <p:cNvPr id="6" name="Content Placeholder 5">
             <a:extLst>
               <a:ext uri="{FF2B5EF4-FFF2-40B4-BE49-F238E27FC236}">
-                <a16:creationId xmlns:a16="http://schemas.microsoft.com/office/drawing/2014/main" id="{3A83B768-5796-48C3-ABA5-90CCA0C4434A}"/>
+                <a16:creationId xmlns:a16="http://schemas.microsoft.com/office/drawing/2014/main" xmlns="" id="{3A83B768-5796-48C3-ABA5-90CCA0C4434A}"/>
               </a:ext>
             </a:extLst>
           </p:cNvPr>
@@ -3527,7 +3524,7 @@
           <p:cNvPr id="7" name="Text Placeholder 4">
             <a:extLst>
               <a:ext uri="{FF2B5EF4-FFF2-40B4-BE49-F238E27FC236}">
-                <a16:creationId xmlns:a16="http://schemas.microsoft.com/office/drawing/2014/main" id="{583783CA-A095-47AC-9BCB-18BE998DA537}"/>
+                <a16:creationId xmlns:a16="http://schemas.microsoft.com/office/drawing/2014/main" xmlns="" id="{583783CA-A095-47AC-9BCB-18BE998DA537}"/>
               </a:ext>
             </a:extLst>
           </p:cNvPr>
@@ -3589,7 +3586,7 @@
           <p:cNvPr id="8" name="Content Placeholder 5">
             <a:extLst>
               <a:ext uri="{FF2B5EF4-FFF2-40B4-BE49-F238E27FC236}">
-                <a16:creationId xmlns:a16="http://schemas.microsoft.com/office/drawing/2014/main" id="{0D0D033A-EAC8-4587-811A-7111AA6D3920}"/>
+                <a16:creationId xmlns:a16="http://schemas.microsoft.com/office/drawing/2014/main" xmlns="" id="{0D0D033A-EAC8-4587-811A-7111AA6D3920}"/>
               </a:ext>
             </a:extLst>
           </p:cNvPr>
@@ -3656,7 +3653,7 @@
     </p:spTree>
     <p:extLst>
       <p:ext uri="{BB962C8B-B14F-4D97-AF65-F5344CB8AC3E}">
-        <p14:creationId xmlns:p14="http://schemas.microsoft.com/office/powerpoint/2010/main" val="3620675822"/>
+        <p14:creationId xmlns:p14="http://schemas.microsoft.com/office/powerpoint/2010/main" xmlns="" val="3620675822"/>
       </p:ext>
     </p:extLst>
   </p:cSld>
@@ -3688,7 +3685,7 @@
           <p:cNvPr id="2" name="Title 1">
             <a:extLst>
               <a:ext uri="{FF2B5EF4-FFF2-40B4-BE49-F238E27FC236}">
-                <a16:creationId xmlns:a16="http://schemas.microsoft.com/office/drawing/2014/main" id="{F404C676-2C9F-44EE-9DDF-372C3CF4F0D1}"/>
+                <a16:creationId xmlns:a16="http://schemas.microsoft.com/office/drawing/2014/main" xmlns="" id="{F404C676-2C9F-44EE-9DDF-372C3CF4F0D1}"/>
               </a:ext>
             </a:extLst>
           </p:cNvPr>
@@ -3722,7 +3719,7 @@
           <p:cNvPr id="3" name="Text Placeholder 2">
             <a:extLst>
               <a:ext uri="{FF2B5EF4-FFF2-40B4-BE49-F238E27FC236}">
-                <a16:creationId xmlns:a16="http://schemas.microsoft.com/office/drawing/2014/main" id="{8EE3024E-0925-4490-9885-5DA80B60D7DD}"/>
+                <a16:creationId xmlns:a16="http://schemas.microsoft.com/office/drawing/2014/main" xmlns="" id="{8EE3024E-0925-4490-9885-5DA80B60D7DD}"/>
               </a:ext>
             </a:extLst>
           </p:cNvPr>
@@ -3803,7 +3800,7 @@
           <p:cNvPr id="4" name="Content Placeholder 3">
             <a:extLst>
               <a:ext uri="{FF2B5EF4-FFF2-40B4-BE49-F238E27FC236}">
-                <a16:creationId xmlns:a16="http://schemas.microsoft.com/office/drawing/2014/main" id="{B539E42C-ACC9-4DC3-A730-BB399E21E214}"/>
+                <a16:creationId xmlns:a16="http://schemas.microsoft.com/office/drawing/2014/main" xmlns="" id="{B539E42C-ACC9-4DC3-A730-BB399E21E214}"/>
               </a:ext>
             </a:extLst>
           </p:cNvPr>
@@ -3872,7 +3869,7 @@
           <p:cNvPr id="5" name="Text Placeholder 4">
             <a:extLst>
               <a:ext uri="{FF2B5EF4-FFF2-40B4-BE49-F238E27FC236}">
-                <a16:creationId xmlns:a16="http://schemas.microsoft.com/office/drawing/2014/main" id="{EB12227A-348F-422D-8F87-E5107D7BB2A9}"/>
+                <a16:creationId xmlns:a16="http://schemas.microsoft.com/office/drawing/2014/main" xmlns="" id="{EB12227A-348F-422D-8F87-E5107D7BB2A9}"/>
               </a:ext>
             </a:extLst>
           </p:cNvPr>
@@ -3934,7 +3931,7 @@
           <p:cNvPr id="6" name="Content Placeholder 5">
             <a:extLst>
               <a:ext uri="{FF2B5EF4-FFF2-40B4-BE49-F238E27FC236}">
-                <a16:creationId xmlns:a16="http://schemas.microsoft.com/office/drawing/2014/main" id="{3A83B768-5796-48C3-ABA5-90CCA0C4434A}"/>
+                <a16:creationId xmlns:a16="http://schemas.microsoft.com/office/drawing/2014/main" xmlns="" id="{3A83B768-5796-48C3-ABA5-90CCA0C4434A}"/>
               </a:ext>
             </a:extLst>
           </p:cNvPr>
@@ -4003,7 +4000,7 @@
           <p:cNvPr id="9" name="Text Placeholder 4">
             <a:extLst>
               <a:ext uri="{FF2B5EF4-FFF2-40B4-BE49-F238E27FC236}">
-                <a16:creationId xmlns:a16="http://schemas.microsoft.com/office/drawing/2014/main" id="{B615F728-3321-4B07-9920-15E22747D5D0}"/>
+                <a16:creationId xmlns:a16="http://schemas.microsoft.com/office/drawing/2014/main" xmlns="" id="{B615F728-3321-4B07-9920-15E22747D5D0}"/>
               </a:ext>
             </a:extLst>
           </p:cNvPr>
@@ -4065,7 +4062,7 @@
           <p:cNvPr id="10" name="Content Placeholder 5">
             <a:extLst>
               <a:ext uri="{FF2B5EF4-FFF2-40B4-BE49-F238E27FC236}">
-                <a16:creationId xmlns:a16="http://schemas.microsoft.com/office/drawing/2014/main" id="{9B5E78A0-0E2A-437B-A398-F05A58C44B1E}"/>
+                <a16:creationId xmlns:a16="http://schemas.microsoft.com/office/drawing/2014/main" xmlns="" id="{9B5E78A0-0E2A-437B-A398-F05A58C44B1E}"/>
               </a:ext>
             </a:extLst>
           </p:cNvPr>
@@ -4132,7 +4129,7 @@
     </p:spTree>
     <p:extLst>
       <p:ext uri="{BB962C8B-B14F-4D97-AF65-F5344CB8AC3E}">
-        <p14:creationId xmlns:p14="http://schemas.microsoft.com/office/powerpoint/2010/main" val="3973337934"/>
+        <p14:creationId xmlns:p14="http://schemas.microsoft.com/office/powerpoint/2010/main" xmlns="" val="3973337934"/>
       </p:ext>
     </p:extLst>
   </p:cSld>
@@ -4164,7 +4161,7 @@
           <p:cNvPr id="2" name="Title 1">
             <a:extLst>
               <a:ext uri="{FF2B5EF4-FFF2-40B4-BE49-F238E27FC236}">
-                <a16:creationId xmlns:a16="http://schemas.microsoft.com/office/drawing/2014/main" id="{1F2763AD-810A-4F44-BB2F-CEAA6E795A45}"/>
+                <a16:creationId xmlns:a16="http://schemas.microsoft.com/office/drawing/2014/main" xmlns="" id="{1F2763AD-810A-4F44-BB2F-CEAA6E795A45}"/>
               </a:ext>
             </a:extLst>
           </p:cNvPr>
@@ -4191,7 +4188,7 @@
     </p:spTree>
     <p:extLst>
       <p:ext uri="{BB962C8B-B14F-4D97-AF65-F5344CB8AC3E}">
-        <p14:creationId xmlns:p14="http://schemas.microsoft.com/office/powerpoint/2010/main" val="3376707576"/>
+        <p14:creationId xmlns:p14="http://schemas.microsoft.com/office/powerpoint/2010/main" xmlns="" val="3376707576"/>
       </p:ext>
     </p:extLst>
   </p:cSld>
@@ -4221,7 +4218,7 @@
     </p:spTree>
     <p:extLst>
       <p:ext uri="{BB962C8B-B14F-4D97-AF65-F5344CB8AC3E}">
-        <p14:creationId xmlns:p14="http://schemas.microsoft.com/office/powerpoint/2010/main" val="1394690045"/>
+        <p14:creationId xmlns:p14="http://schemas.microsoft.com/office/powerpoint/2010/main" xmlns="" val="1394690045"/>
       </p:ext>
     </p:extLst>
   </p:cSld>
@@ -4264,7 +4261,7 @@
           <p:cNvPr id="2" name="Title Placeholder 1">
             <a:extLst>
               <a:ext uri="{FF2B5EF4-FFF2-40B4-BE49-F238E27FC236}">
-                <a16:creationId xmlns:a16="http://schemas.microsoft.com/office/drawing/2014/main" id="{559FE7D7-B489-4ADE-A72C-A82B093E0C75}"/>
+                <a16:creationId xmlns:a16="http://schemas.microsoft.com/office/drawing/2014/main" xmlns="" id="{559FE7D7-B489-4ADE-A72C-A82B093E0C75}"/>
               </a:ext>
             </a:extLst>
           </p:cNvPr>
@@ -4303,7 +4300,7 @@
           <p:cNvPr id="3" name="Text Placeholder 2">
             <a:extLst>
               <a:ext uri="{FF2B5EF4-FFF2-40B4-BE49-F238E27FC236}">
-                <a16:creationId xmlns:a16="http://schemas.microsoft.com/office/drawing/2014/main" id="{EDA6BE47-35A0-4C55-B241-F85B04918EF5}"/>
+                <a16:creationId xmlns:a16="http://schemas.microsoft.com/office/drawing/2014/main" xmlns="" id="{EDA6BE47-35A0-4C55-B241-F85B04918EF5}"/>
               </a:ext>
             </a:extLst>
           </p:cNvPr>
@@ -4371,7 +4368,7 @@
           <p:cNvPr id="7" name="Picture 6">
             <a:extLst>
               <a:ext uri="{FF2B5EF4-FFF2-40B4-BE49-F238E27FC236}">
-                <a16:creationId xmlns:a16="http://schemas.microsoft.com/office/drawing/2014/main" id="{95D63B43-EDC4-42A8-9931-C2D31D775966}"/>
+                <a16:creationId xmlns:a16="http://schemas.microsoft.com/office/drawing/2014/main" xmlns="" id="{95D63B43-EDC4-42A8-9931-C2D31D775966}"/>
               </a:ext>
             </a:extLst>
           </p:cNvPr>
@@ -4381,10 +4378,10 @@
           <p:nvPr userDrawn="1"/>
         </p:nvPicPr>
         <p:blipFill rotWithShape="1">
-          <a:blip r:embed="rId16">
+          <a:blip r:embed="rId16" cstate="print">
             <a:extLst>
               <a:ext uri="{BEBA8EAE-BF5A-486C-A8C5-ECC9F3942E4B}">
-                <a14:imgProps xmlns:a14="http://schemas.microsoft.com/office/drawing/2010/main">
+                <a14:imgProps xmlns:a14="http://schemas.microsoft.com/office/drawing/2010/main" xmlns="">
                   <a14:imgLayer r:embed="rId17">
                     <a14:imgEffect>
                       <a14:backgroundRemoval t="17963" b="75093" l="18000" r="89000">
@@ -4542,7 +4539,7 @@
                 </a14:imgProps>
               </a:ext>
               <a:ext uri="{28A0092B-C50C-407E-A947-70E740481C1C}">
-                <a14:useLocalDpi xmlns:a14="http://schemas.microsoft.com/office/drawing/2010/main" val="0"/>
+                <a14:useLocalDpi xmlns:a14="http://schemas.microsoft.com/office/drawing/2010/main" xmlns="" val="0"/>
               </a:ext>
             </a:extLst>
           </a:blip>
@@ -4568,7 +4565,7 @@
           <p:cNvPr id="8" name="Rectangle 7">
             <a:extLst>
               <a:ext uri="{FF2B5EF4-FFF2-40B4-BE49-F238E27FC236}">
-                <a16:creationId xmlns:a16="http://schemas.microsoft.com/office/drawing/2014/main" id="{9E920C17-4315-4C7A-9623-C9389DE1B881}"/>
+                <a16:creationId xmlns:a16="http://schemas.microsoft.com/office/drawing/2014/main" xmlns="" id="{9E920C17-4315-4C7A-9623-C9389DE1B881}"/>
               </a:ext>
             </a:extLst>
           </p:cNvPr>
@@ -4646,7 +4643,7 @@
           <p:cNvPr id="9" name="Rectangle 8">
             <a:extLst>
               <a:ext uri="{FF2B5EF4-FFF2-40B4-BE49-F238E27FC236}">
-                <a16:creationId xmlns:a16="http://schemas.microsoft.com/office/drawing/2014/main" id="{44720160-1203-465E-B37A-138F5CF531B9}"/>
+                <a16:creationId xmlns:a16="http://schemas.microsoft.com/office/drawing/2014/main" xmlns="" id="{44720160-1203-465E-B37A-138F5CF531B9}"/>
               </a:ext>
             </a:extLst>
           </p:cNvPr>
@@ -4711,7 +4708,7 @@
     </p:spTree>
     <p:extLst>
       <p:ext uri="{BB962C8B-B14F-4D97-AF65-F5344CB8AC3E}">
-        <p14:creationId xmlns:p14="http://schemas.microsoft.com/office/powerpoint/2010/main" val="3272073146"/>
+        <p14:creationId xmlns:p14="http://schemas.microsoft.com/office/powerpoint/2010/main" xmlns="" val="3272073146"/>
       </p:ext>
     </p:extLst>
   </p:cSld>
@@ -5758,7 +5755,7 @@
           <p:cNvPr id="7" name="Title 6">
             <a:extLst>
               <a:ext uri="{FF2B5EF4-FFF2-40B4-BE49-F238E27FC236}">
-                <a16:creationId xmlns:a16="http://schemas.microsoft.com/office/drawing/2014/main" id="{23633B37-BEFE-4792-A181-66CE9AE8DE45}"/>
+                <a16:creationId xmlns:a16="http://schemas.microsoft.com/office/drawing/2014/main" xmlns="" id="{23633B37-BEFE-4792-A181-66CE9AE8DE45}"/>
               </a:ext>
             </a:extLst>
           </p:cNvPr>
@@ -5797,7 +5794,7 @@
           <p:cNvPr id="8" name="Subtitle 7">
             <a:extLst>
               <a:ext uri="{FF2B5EF4-FFF2-40B4-BE49-F238E27FC236}">
-                <a16:creationId xmlns:a16="http://schemas.microsoft.com/office/drawing/2014/main" id="{47E8ED0E-18D0-4E37-958C-B16D38BDE82E}"/>
+                <a16:creationId xmlns:a16="http://schemas.microsoft.com/office/drawing/2014/main" xmlns="" id="{47E8ED0E-18D0-4E37-958C-B16D38BDE82E}"/>
               </a:ext>
             </a:extLst>
           </p:cNvPr>
@@ -5943,7 +5940,7 @@
           <p:cNvPr id="9" name="Text Placeholder 8">
             <a:extLst>
               <a:ext uri="{FF2B5EF4-FFF2-40B4-BE49-F238E27FC236}">
-                <a16:creationId xmlns:a16="http://schemas.microsoft.com/office/drawing/2014/main" id="{2F128B5E-11A6-40B0-9322-477E94B229F3}"/>
+                <a16:creationId xmlns:a16="http://schemas.microsoft.com/office/drawing/2014/main" xmlns="" id="{2F128B5E-11A6-40B0-9322-477E94B229F3}"/>
               </a:ext>
             </a:extLst>
           </p:cNvPr>
@@ -5961,21 +5958,13 @@
           <a:p>
             <a:r>
               <a:rPr lang="en-US" dirty="0"/>
-              <a:t>Project Guide: Ms. </a:t>
-            </a:r>
-            <a:r>
-              <a:rPr lang="en-US" dirty="0" err="1"/>
-              <a:t>Sruthimol</a:t>
-            </a:r>
+              <a:t>Project Guide: Ms. Sruthi</a:t>
+            </a:r>
+          </a:p>
+          <a:p>
             <a:r>
               <a:rPr lang="en-US" dirty="0"/>
-              <a:t> M P</a:t>
-            </a:r>
-          </a:p>
-          <a:p>
-            <a:r>
-              <a:rPr lang="en-US" dirty="0"/>
-              <a:t>		(Lecturer, IETCU)</a:t>
+              <a:t>		(Assistant Professor, IETCU)</a:t>
             </a:r>
             <a:endParaRPr lang="en-GB" dirty="0"/>
           </a:p>
@@ -5984,7 +5973,7 @@
     </p:spTree>
     <p:extLst>
       <p:ext uri="{BB962C8B-B14F-4D97-AF65-F5344CB8AC3E}">
-        <p14:creationId xmlns:p14="http://schemas.microsoft.com/office/powerpoint/2010/main" val="2822570579"/>
+        <p14:creationId xmlns:p14="http://schemas.microsoft.com/office/powerpoint/2010/main" xmlns="" val="2822570579"/>
       </p:ext>
     </p:extLst>
   </p:cSld>
@@ -6016,7 +6005,7 @@
           <p:cNvPr id="5" name="Title 4">
             <a:extLst>
               <a:ext uri="{FF2B5EF4-FFF2-40B4-BE49-F238E27FC236}">
-                <a16:creationId xmlns:a16="http://schemas.microsoft.com/office/drawing/2014/main" id="{AF5A2BDD-B148-4F27-8921-CB48343D26A4}"/>
+                <a16:creationId xmlns:a16="http://schemas.microsoft.com/office/drawing/2014/main" xmlns="" id="{AF5A2BDD-B148-4F27-8921-CB48343D26A4}"/>
               </a:ext>
             </a:extLst>
           </p:cNvPr>
@@ -6045,7 +6034,7 @@
           <p:cNvPr id="6" name="Content Placeholder 5">
             <a:extLst>
               <a:ext uri="{FF2B5EF4-FFF2-40B4-BE49-F238E27FC236}">
-                <a16:creationId xmlns:a16="http://schemas.microsoft.com/office/drawing/2014/main" id="{DA1664A8-3DF3-41F7-BBFA-9727344715BF}"/>
+                <a16:creationId xmlns:a16="http://schemas.microsoft.com/office/drawing/2014/main" xmlns="" id="{DA1664A8-3DF3-41F7-BBFA-9727344715BF}"/>
               </a:ext>
             </a:extLst>
           </p:cNvPr>
@@ -6068,7 +6057,7 @@
     </p:spTree>
     <p:extLst>
       <p:ext uri="{BB962C8B-B14F-4D97-AF65-F5344CB8AC3E}">
-        <p14:creationId xmlns:p14="http://schemas.microsoft.com/office/powerpoint/2010/main" val="1893057290"/>
+        <p14:creationId xmlns:p14="http://schemas.microsoft.com/office/powerpoint/2010/main" xmlns="" val="1893057290"/>
       </p:ext>
     </p:extLst>
   </p:cSld>
@@ -6100,7 +6089,7 @@
           <p:cNvPr id="4" name="Title 3">
             <a:extLst>
               <a:ext uri="{FF2B5EF4-FFF2-40B4-BE49-F238E27FC236}">
-                <a16:creationId xmlns:a16="http://schemas.microsoft.com/office/drawing/2014/main" id="{EA8558A0-16AF-40A2-94AF-AFFDBFB63E72}"/>
+                <a16:creationId xmlns:a16="http://schemas.microsoft.com/office/drawing/2014/main" xmlns="" id="{EA8558A0-16AF-40A2-94AF-AFFDBFB63E72}"/>
               </a:ext>
             </a:extLst>
           </p:cNvPr>
@@ -6127,7 +6116,7 @@
     </p:spTree>
     <p:extLst>
       <p:ext uri="{BB962C8B-B14F-4D97-AF65-F5344CB8AC3E}">
-        <p14:creationId xmlns:p14="http://schemas.microsoft.com/office/powerpoint/2010/main" val="1776534027"/>
+        <p14:creationId xmlns:p14="http://schemas.microsoft.com/office/powerpoint/2010/main" xmlns="" val="1776534027"/>
       </p:ext>
     </p:extLst>
   </p:cSld>
@@ -6159,7 +6148,7 @@
           <p:cNvPr id="6" name="Table 6">
             <a:extLst>
               <a:ext uri="{FF2B5EF4-FFF2-40B4-BE49-F238E27FC236}">
-                <a16:creationId xmlns:a16="http://schemas.microsoft.com/office/drawing/2014/main" id="{CB7F9990-9C40-46C7-9344-5C62E1A6399F}"/>
+                <a16:creationId xmlns:a16="http://schemas.microsoft.com/office/drawing/2014/main" xmlns="" id="{CB7F9990-9C40-46C7-9344-5C62E1A6399F}"/>
               </a:ext>
             </a:extLst>
           </p:cNvPr>
@@ -6169,7 +6158,7 @@
           <p:nvPr>
             <p:extLst>
               <p:ext uri="{D42A27DB-BD31-4B8C-83A1-F6EECF244321}">
-                <p14:modId xmlns:p14="http://schemas.microsoft.com/office/powerpoint/2010/main" val="699020302"/>
+                <p14:modId xmlns:p14="http://schemas.microsoft.com/office/powerpoint/2010/main" xmlns="" val="699020302"/>
               </p:ext>
             </p:extLst>
           </p:nvPr>
@@ -6188,7 +6177,7 @@
                 <a:gridCol w="10650827">
                   <a:extLst>
                     <a:ext uri="{9D8B030D-6E8A-4147-A177-3AD203B41FA5}">
-                      <a16:colId xmlns:a16="http://schemas.microsoft.com/office/drawing/2014/main" val="2675881179"/>
+                      <a16:colId xmlns:a16="http://schemas.microsoft.com/office/drawing/2014/main" xmlns="" val="2675881179"/>
                     </a:ext>
                   </a:extLst>
                 </a:gridCol>
@@ -6225,7 +6214,7 @@
                 </a:tc>
                 <a:extLst>
                   <a:ext uri="{0D108BD9-81ED-4DB2-BD59-A6C34878D82A}">
-                    <a16:rowId xmlns:a16="http://schemas.microsoft.com/office/drawing/2014/main" val="1860974357"/>
+                    <a16:rowId xmlns:a16="http://schemas.microsoft.com/office/drawing/2014/main" xmlns="" val="1860974357"/>
                   </a:ext>
                 </a:extLst>
               </a:tr>
@@ -6257,7 +6246,7 @@
                 </a:tc>
                 <a:extLst>
                   <a:ext uri="{0D108BD9-81ED-4DB2-BD59-A6C34878D82A}">
-                    <a16:rowId xmlns:a16="http://schemas.microsoft.com/office/drawing/2014/main" val="409087649"/>
+                    <a16:rowId xmlns:a16="http://schemas.microsoft.com/office/drawing/2014/main" xmlns="" val="409087649"/>
                   </a:ext>
                 </a:extLst>
               </a:tr>
@@ -6279,7 +6268,7 @@
                 </a:tc>
                 <a:extLst>
                   <a:ext uri="{0D108BD9-81ED-4DB2-BD59-A6C34878D82A}">
-                    <a16:rowId xmlns:a16="http://schemas.microsoft.com/office/drawing/2014/main" val="765782626"/>
+                    <a16:rowId xmlns:a16="http://schemas.microsoft.com/office/drawing/2014/main" xmlns="" val="765782626"/>
                   </a:ext>
                 </a:extLst>
               </a:tr>
@@ -6301,7 +6290,7 @@
                 </a:tc>
                 <a:extLst>
                   <a:ext uri="{0D108BD9-81ED-4DB2-BD59-A6C34878D82A}">
-                    <a16:rowId xmlns:a16="http://schemas.microsoft.com/office/drawing/2014/main" val="1128996750"/>
+                    <a16:rowId xmlns:a16="http://schemas.microsoft.com/office/drawing/2014/main" xmlns="" val="1128996750"/>
                   </a:ext>
                 </a:extLst>
               </a:tr>
@@ -6323,7 +6312,7 @@
                 </a:tc>
                 <a:extLst>
                   <a:ext uri="{0D108BD9-81ED-4DB2-BD59-A6C34878D82A}">
-                    <a16:rowId xmlns:a16="http://schemas.microsoft.com/office/drawing/2014/main" val="1008741632"/>
+                    <a16:rowId xmlns:a16="http://schemas.microsoft.com/office/drawing/2014/main" xmlns="" val="1008741632"/>
                   </a:ext>
                 </a:extLst>
               </a:tr>
@@ -6345,7 +6334,7 @@
                 </a:tc>
                 <a:extLst>
                   <a:ext uri="{0D108BD9-81ED-4DB2-BD59-A6C34878D82A}">
-                    <a16:rowId xmlns:a16="http://schemas.microsoft.com/office/drawing/2014/main" val="3352079054"/>
+                    <a16:rowId xmlns:a16="http://schemas.microsoft.com/office/drawing/2014/main" xmlns="" val="3352079054"/>
                   </a:ext>
                 </a:extLst>
               </a:tr>
@@ -6367,7 +6356,7 @@
                 </a:tc>
                 <a:extLst>
                   <a:ext uri="{0D108BD9-81ED-4DB2-BD59-A6C34878D82A}">
-                    <a16:rowId xmlns:a16="http://schemas.microsoft.com/office/drawing/2014/main" val="2798619437"/>
+                    <a16:rowId xmlns:a16="http://schemas.microsoft.com/office/drawing/2014/main" xmlns="" val="2798619437"/>
                   </a:ext>
                 </a:extLst>
               </a:tr>
@@ -6389,7 +6378,7 @@
                 </a:tc>
                 <a:extLst>
                   <a:ext uri="{0D108BD9-81ED-4DB2-BD59-A6C34878D82A}">
-                    <a16:rowId xmlns:a16="http://schemas.microsoft.com/office/drawing/2014/main" val="593255592"/>
+                    <a16:rowId xmlns:a16="http://schemas.microsoft.com/office/drawing/2014/main" xmlns="" val="593255592"/>
                   </a:ext>
                 </a:extLst>
               </a:tr>
@@ -6411,7 +6400,7 @@
                 </a:tc>
                 <a:extLst>
                   <a:ext uri="{0D108BD9-81ED-4DB2-BD59-A6C34878D82A}">
-                    <a16:rowId xmlns:a16="http://schemas.microsoft.com/office/drawing/2014/main" val="616575745"/>
+                    <a16:rowId xmlns:a16="http://schemas.microsoft.com/office/drawing/2014/main" xmlns="" val="616575745"/>
                   </a:ext>
                 </a:extLst>
               </a:tr>
@@ -6422,7 +6411,7 @@
     </p:spTree>
     <p:extLst>
       <p:ext uri="{BB962C8B-B14F-4D97-AF65-F5344CB8AC3E}">
-        <p14:creationId xmlns:p14="http://schemas.microsoft.com/office/powerpoint/2010/main" val="737623031"/>
+        <p14:creationId xmlns:p14="http://schemas.microsoft.com/office/powerpoint/2010/main" xmlns="" val="737623031"/>
       </p:ext>
     </p:extLst>
   </p:cSld>
@@ -6540,7 +6529,7 @@
           <p:cNvPr id="5" name="Title 4">
             <a:extLst>
               <a:ext uri="{FF2B5EF4-FFF2-40B4-BE49-F238E27FC236}">
-                <a16:creationId xmlns:a16="http://schemas.microsoft.com/office/drawing/2014/main" id="{AF5A2BDD-B148-4F27-8921-CB48343D26A4}"/>
+                <a16:creationId xmlns:a16="http://schemas.microsoft.com/office/drawing/2014/main" xmlns="" id="{AF5A2BDD-B148-4F27-8921-CB48343D26A4}"/>
               </a:ext>
             </a:extLst>
           </p:cNvPr>
@@ -6569,7 +6558,7 @@
           <p:cNvPr id="6" name="Content Placeholder 5">
             <a:extLst>
               <a:ext uri="{FF2B5EF4-FFF2-40B4-BE49-F238E27FC236}">
-                <a16:creationId xmlns:a16="http://schemas.microsoft.com/office/drawing/2014/main" id="{DA1664A8-3DF3-41F7-BBFA-9727344715BF}"/>
+                <a16:creationId xmlns:a16="http://schemas.microsoft.com/office/drawing/2014/main" xmlns="" id="{DA1664A8-3DF3-41F7-BBFA-9727344715BF}"/>
               </a:ext>
             </a:extLst>
           </p:cNvPr>
@@ -6580,10 +6569,93 @@
             <p:ph idx="1"/>
           </p:nvPr>
         </p:nvSpPr>
-        <p:spPr/>
+        <p:spPr>
+          <a:xfrm>
+            <a:off x="838200" y="1604513"/>
+            <a:ext cx="10515600" cy="4572449"/>
+          </a:xfrm>
+        </p:spPr>
         <p:txBody>
           <a:bodyPr/>
           <a:lstStyle/>
+          <a:p>
+            <a:pPr>
+              <a:buNone/>
+            </a:pPr>
+            <a:endParaRPr lang="en-US" dirty="0" smtClean="0"/>
+          </a:p>
+          <a:p>
+            <a:r>
+              <a:rPr lang="en-US" dirty="0" smtClean="0"/>
+              <a:t>S</a:t>
+            </a:r>
+            <a:r>
+              <a:rPr lang="en-US" dirty="0" smtClean="0"/>
+              <a:t>tudents </a:t>
+            </a:r>
+            <a:r>
+              <a:rPr lang="en-US" dirty="0" smtClean="0"/>
+              <a:t>can’t find the right job</a:t>
+            </a:r>
+            <a:r>
+              <a:rPr lang="en-US" dirty="0" smtClean="0"/>
+              <a:t>.</a:t>
+            </a:r>
+            <a:endParaRPr lang="en-US" dirty="0" smtClean="0"/>
+          </a:p>
+          <a:p>
+            <a:r>
+              <a:rPr lang="en-US" dirty="0" smtClean="0"/>
+              <a:t>R</a:t>
+            </a:r>
+            <a:r>
+              <a:rPr lang="en-US" dirty="0" smtClean="0"/>
+              <a:t>ecruiters can’t </a:t>
+            </a:r>
+            <a:r>
+              <a:rPr lang="en-US" dirty="0" smtClean="0"/>
+              <a:t>access </a:t>
+            </a:r>
+            <a:r>
+              <a:rPr lang="en-US" dirty="0" smtClean="0"/>
+              <a:t>student </a:t>
+            </a:r>
+            <a:r>
+              <a:rPr lang="en-US" dirty="0" smtClean="0"/>
+              <a:t>details.</a:t>
+            </a:r>
+          </a:p>
+          <a:p>
+            <a:r>
+              <a:rPr lang="en-US" dirty="0" smtClean="0"/>
+              <a:t>Important functions may be missed</a:t>
+            </a:r>
+            <a:r>
+              <a:rPr lang="en-US" dirty="0" smtClean="0"/>
+              <a:t>.</a:t>
+            </a:r>
+            <a:endParaRPr lang="en-US" dirty="0" smtClean="0"/>
+          </a:p>
+          <a:p>
+            <a:r>
+              <a:rPr lang="en-US" dirty="0" smtClean="0"/>
+              <a:t>Students miss recruiter updates.</a:t>
+            </a:r>
+            <a:endParaRPr lang="en-US" dirty="0" smtClean="0"/>
+          </a:p>
+          <a:p>
+            <a:r>
+              <a:rPr lang="en-US" dirty="0" smtClean="0"/>
+              <a:t>No effective placement cell management.</a:t>
+            </a:r>
+            <a:endParaRPr lang="en-US" dirty="0" smtClean="0"/>
+          </a:p>
+          <a:p>
+            <a:endParaRPr lang="en-US" dirty="0" smtClean="0"/>
+          </a:p>
+          <a:p>
+            <a:endParaRPr lang="en-US" dirty="0" smtClean="0"/>
+          </a:p>
           <a:p>
             <a:endParaRPr lang="en-GB" dirty="0"/>
           </a:p>
@@ -6592,7 +6664,7 @@
     </p:spTree>
     <p:extLst>
       <p:ext uri="{BB962C8B-B14F-4D97-AF65-F5344CB8AC3E}">
-        <p14:creationId xmlns:p14="http://schemas.microsoft.com/office/powerpoint/2010/main" val="2036609944"/>
+        <p14:creationId xmlns:p14="http://schemas.microsoft.com/office/powerpoint/2010/main" xmlns="" val="2036609944"/>
       </p:ext>
     </p:extLst>
   </p:cSld>
@@ -6624,7 +6696,7 @@
           <p:cNvPr id="5" name="Title 4">
             <a:extLst>
               <a:ext uri="{FF2B5EF4-FFF2-40B4-BE49-F238E27FC236}">
-                <a16:creationId xmlns:a16="http://schemas.microsoft.com/office/drawing/2014/main" id="{AF5A2BDD-B148-4F27-8921-CB48343D26A4}"/>
+                <a16:creationId xmlns:a16="http://schemas.microsoft.com/office/drawing/2014/main" xmlns="" id="{AF5A2BDD-B148-4F27-8921-CB48343D26A4}"/>
               </a:ext>
             </a:extLst>
           </p:cNvPr>
@@ -6653,7 +6725,7 @@
           <p:cNvPr id="6" name="Content Placeholder 5">
             <a:extLst>
               <a:ext uri="{FF2B5EF4-FFF2-40B4-BE49-F238E27FC236}">
-                <a16:creationId xmlns:a16="http://schemas.microsoft.com/office/drawing/2014/main" id="{DA1664A8-3DF3-41F7-BBFA-9727344715BF}"/>
+                <a16:creationId xmlns:a16="http://schemas.microsoft.com/office/drawing/2014/main" xmlns="" id="{DA1664A8-3DF3-41F7-BBFA-9727344715BF}"/>
               </a:ext>
             </a:extLst>
           </p:cNvPr>
@@ -6664,19 +6736,138 @@
             <p:ph idx="1"/>
           </p:nvPr>
         </p:nvSpPr>
-        <p:spPr/>
+        <p:spPr>
+          <a:xfrm>
+            <a:off x="812321" y="1816999"/>
+            <a:ext cx="10515600" cy="4351338"/>
+          </a:xfrm>
+        </p:spPr>
         <p:txBody>
           <a:bodyPr/>
           <a:lstStyle/>
           <a:p>
-            <a:endParaRPr lang="en-GB"/>
+            <a:r>
+              <a:rPr lang="en-GB" dirty="0" smtClean="0"/>
+              <a:t>P</a:t>
+            </a:r>
+            <a:r>
+              <a:rPr lang="en-GB" dirty="0" smtClean="0"/>
+              <a:t>rovide </a:t>
+            </a:r>
+            <a:r>
+              <a:rPr lang="en-GB" dirty="0" smtClean="0"/>
+              <a:t>a user-friendly recruitment portal platform.</a:t>
+            </a:r>
+          </a:p>
+          <a:p>
+            <a:r>
+              <a:rPr lang="en-GB" dirty="0" smtClean="0"/>
+              <a:t>E</a:t>
+            </a:r>
+            <a:r>
+              <a:rPr lang="en-GB" dirty="0" smtClean="0"/>
+              <a:t>ase </a:t>
+            </a:r>
+            <a:r>
+              <a:rPr lang="en-GB" dirty="0" smtClean="0"/>
+              <a:t>the work </a:t>
+            </a:r>
+            <a:r>
+              <a:rPr lang="en-GB" dirty="0" smtClean="0"/>
+              <a:t>of </a:t>
+            </a:r>
+            <a:r>
+              <a:rPr lang="en-GB" dirty="0" smtClean="0"/>
+              <a:t>staffs</a:t>
+            </a:r>
+            <a:r>
+              <a:rPr lang="en-GB" dirty="0" smtClean="0"/>
+              <a:t>.</a:t>
+            </a:r>
+          </a:p>
+          <a:p>
+            <a:r>
+              <a:rPr lang="en-GB" dirty="0" smtClean="0"/>
+              <a:t>P</a:t>
+            </a:r>
+            <a:r>
+              <a:rPr lang="en-GB" dirty="0" smtClean="0"/>
+              <a:t>rovide </a:t>
+            </a:r>
+            <a:r>
+              <a:rPr lang="en-GB" dirty="0" smtClean="0"/>
+              <a:t>medium </a:t>
+            </a:r>
+            <a:r>
+              <a:rPr lang="en-GB" dirty="0" smtClean="0"/>
+              <a:t>to</a:t>
+            </a:r>
+            <a:r>
+              <a:rPr lang="en-GB" dirty="0" smtClean="0"/>
+              <a:t> choose </a:t>
+            </a:r>
+            <a:r>
+              <a:rPr lang="en-GB" dirty="0" smtClean="0"/>
+              <a:t>best companies and employees.</a:t>
+            </a:r>
+          </a:p>
+          <a:p>
+            <a:r>
+              <a:rPr lang="en-GB" dirty="0" smtClean="0"/>
+              <a:t>P</a:t>
+            </a:r>
+            <a:r>
+              <a:rPr lang="en-GB" dirty="0" smtClean="0"/>
+              <a:t>rovide </a:t>
+            </a:r>
+            <a:r>
+              <a:rPr lang="en-GB" dirty="0" smtClean="0"/>
+              <a:t>categorized and suitable jobs.</a:t>
+            </a:r>
+          </a:p>
+          <a:p>
+            <a:r>
+              <a:rPr lang="en-GB" dirty="0" smtClean="0"/>
+              <a:t>I</a:t>
+            </a:r>
+            <a:r>
+              <a:rPr lang="en-GB" dirty="0" smtClean="0"/>
+              <a:t>ncrease </a:t>
+            </a:r>
+            <a:r>
+              <a:rPr lang="en-GB" dirty="0" smtClean="0"/>
+              <a:t>knowledge about </a:t>
+            </a:r>
+            <a:r>
+              <a:rPr lang="en-GB" dirty="0" smtClean="0"/>
+              <a:t>job </a:t>
+            </a:r>
+            <a:r>
+              <a:rPr lang="en-GB" dirty="0" smtClean="0"/>
+              <a:t>resources.</a:t>
+            </a:r>
+          </a:p>
+          <a:p>
+            <a:pPr>
+              <a:buNone/>
+            </a:pPr>
+            <a:endParaRPr lang="en-GB" dirty="0" smtClean="0"/>
+          </a:p>
+          <a:p>
+            <a:endParaRPr lang="en-GB" dirty="0" smtClean="0"/>
+          </a:p>
+          <a:p>
+            <a:endParaRPr lang="en-GB" dirty="0" smtClean="0"/>
+          </a:p>
+          <a:p>
+            <a:endParaRPr lang="en-GB" dirty="0"/>
           </a:p>
         </p:txBody>
       </p:sp>
     </p:spTree>
     <p:extLst>
       <p:ext uri="{BB962C8B-B14F-4D97-AF65-F5344CB8AC3E}">
-        <p14:creationId xmlns:p14="http://schemas.microsoft.com/office/powerpoint/2010/main" val="1061575583"/>
+        <p14:creationId xmlns:p14="http://schemas.microsoft.com/office/powerpoint/2010/main" xmlns="" val="1061575583"/>
       </p:ext>
     </p:extLst>
   </p:cSld>
@@ -6708,7 +6899,7 @@
           <p:cNvPr id="5" name="Title 4">
             <a:extLst>
               <a:ext uri="{FF2B5EF4-FFF2-40B4-BE49-F238E27FC236}">
-                <a16:creationId xmlns:a16="http://schemas.microsoft.com/office/drawing/2014/main" id="{AF5A2BDD-B148-4F27-8921-CB48343D26A4}"/>
+                <a16:creationId xmlns:a16="http://schemas.microsoft.com/office/drawing/2014/main" xmlns="" id="{AF5A2BDD-B148-4F27-8921-CB48343D26A4}"/>
               </a:ext>
             </a:extLst>
           </p:cNvPr>
@@ -6737,7 +6928,7 @@
           <p:cNvPr id="6" name="Content Placeholder 5">
             <a:extLst>
               <a:ext uri="{FF2B5EF4-FFF2-40B4-BE49-F238E27FC236}">
-                <a16:creationId xmlns:a16="http://schemas.microsoft.com/office/drawing/2014/main" id="{DA1664A8-3DF3-41F7-BBFA-9727344715BF}"/>
+                <a16:creationId xmlns:a16="http://schemas.microsoft.com/office/drawing/2014/main" xmlns="" id="{DA1664A8-3DF3-41F7-BBFA-9727344715BF}"/>
               </a:ext>
             </a:extLst>
           </p:cNvPr>
@@ -6753,14 +6944,63 @@
           <a:bodyPr/>
           <a:lstStyle/>
           <a:p>
-            <a:endParaRPr lang="en-GB"/>
+            <a:r>
+              <a:rPr lang="en-GB" dirty="0" smtClean="0"/>
+              <a:t>Developing a web application for career information and recruitment.</a:t>
+            </a:r>
+          </a:p>
+          <a:p>
+            <a:r>
+              <a:rPr lang="en-GB" dirty="0" smtClean="0"/>
+              <a:t>Connect students, recruiters and alumni.</a:t>
+            </a:r>
+            <a:endParaRPr lang="en-GB" dirty="0" smtClean="0"/>
+          </a:p>
+          <a:p>
+            <a:r>
+              <a:rPr lang="en-GB" dirty="0" smtClean="0"/>
+              <a:t>Ease of job application.</a:t>
+            </a:r>
+            <a:endParaRPr lang="en-GB" dirty="0" smtClean="0"/>
+          </a:p>
+          <a:p>
+            <a:r>
+              <a:rPr lang="en-GB" dirty="0" smtClean="0"/>
+              <a:t>Easily maintain job information and applications.</a:t>
+            </a:r>
+            <a:endParaRPr lang="en-GB" dirty="0" smtClean="0"/>
+          </a:p>
+          <a:p>
+            <a:r>
+              <a:rPr lang="en-GB" dirty="0" smtClean="0"/>
+              <a:t>Easily review CV of student or alumni.</a:t>
+            </a:r>
+          </a:p>
+          <a:p>
+            <a:r>
+              <a:rPr lang="en-GB" dirty="0" smtClean="0"/>
+              <a:t> Recruiters </a:t>
+            </a:r>
+            <a:r>
+              <a:rPr lang="en-GB" smtClean="0"/>
+              <a:t>can easily maintain </a:t>
+            </a:r>
+            <a:r>
+              <a:rPr lang="en-GB" dirty="0" smtClean="0"/>
+              <a:t>job details</a:t>
+            </a:r>
+            <a:r>
+              <a:rPr lang="en-GB" dirty="0" smtClean="0"/>
+              <a:t>.</a:t>
+            </a:r>
+            <a:endParaRPr lang="en-GB" dirty="0" smtClean="0"/>
           </a:p>
         </p:txBody>
       </p:sp>
     </p:spTree>
     <p:extLst>
       <p:ext uri="{BB962C8B-B14F-4D97-AF65-F5344CB8AC3E}">
-        <p14:creationId xmlns:p14="http://schemas.microsoft.com/office/powerpoint/2010/main" val="727587980"/>
+        <p14:creationId xmlns:p14="http://schemas.microsoft.com/office/powerpoint/2010/main" xmlns="" val="727587980"/>
       </p:ext>
     </p:extLst>
   </p:cSld>
@@ -6792,7 +7032,7 @@
           <p:cNvPr id="5" name="Title 4">
             <a:extLst>
               <a:ext uri="{FF2B5EF4-FFF2-40B4-BE49-F238E27FC236}">
-                <a16:creationId xmlns:a16="http://schemas.microsoft.com/office/drawing/2014/main" id="{AF5A2BDD-B148-4F27-8921-CB48343D26A4}"/>
+                <a16:creationId xmlns:a16="http://schemas.microsoft.com/office/drawing/2014/main" xmlns="" id="{AF5A2BDD-B148-4F27-8921-CB48343D26A4}"/>
               </a:ext>
             </a:extLst>
           </p:cNvPr>
@@ -6821,7 +7061,7 @@
           <p:cNvPr id="4" name="Text Placeholder 3">
             <a:extLst>
               <a:ext uri="{FF2B5EF4-FFF2-40B4-BE49-F238E27FC236}">
-                <a16:creationId xmlns:a16="http://schemas.microsoft.com/office/drawing/2014/main" id="{B17C4877-D59E-499B-AC75-997B4B8ADECE}"/>
+                <a16:creationId xmlns:a16="http://schemas.microsoft.com/office/drawing/2014/main" xmlns="" id="{B17C4877-D59E-499B-AC75-997B4B8ADECE}"/>
               </a:ext>
             </a:extLst>
           </p:cNvPr>
@@ -6850,7 +7090,7 @@
           <p:cNvPr id="12" name="Content Placeholder 11">
             <a:extLst>
               <a:ext uri="{FF2B5EF4-FFF2-40B4-BE49-F238E27FC236}">
-                <a16:creationId xmlns:a16="http://schemas.microsoft.com/office/drawing/2014/main" id="{BF1A91E2-1922-44C8-AA0E-2FB234681C90}"/>
+                <a16:creationId xmlns:a16="http://schemas.microsoft.com/office/drawing/2014/main" xmlns="" id="{BF1A91E2-1922-44C8-AA0E-2FB234681C90}"/>
               </a:ext>
             </a:extLst>
           </p:cNvPr>
@@ -6875,7 +7115,7 @@
           <p:cNvPr id="8" name="Text Placeholder 7">
             <a:extLst>
               <a:ext uri="{FF2B5EF4-FFF2-40B4-BE49-F238E27FC236}">
-                <a16:creationId xmlns:a16="http://schemas.microsoft.com/office/drawing/2014/main" id="{AB43F67B-8E3A-4AEA-AF5B-F759144DABD7}"/>
+                <a16:creationId xmlns:a16="http://schemas.microsoft.com/office/drawing/2014/main" xmlns="" id="{AB43F67B-8E3A-4AEA-AF5B-F759144DABD7}"/>
               </a:ext>
             </a:extLst>
           </p:cNvPr>
@@ -6907,7 +7147,7 @@
           <p:cNvPr id="13" name="Content Placeholder 12">
             <a:extLst>
               <a:ext uri="{FF2B5EF4-FFF2-40B4-BE49-F238E27FC236}">
-                <a16:creationId xmlns:a16="http://schemas.microsoft.com/office/drawing/2014/main" id="{AEDFC6B5-A21A-4E72-BD28-278E7E379F23}"/>
+                <a16:creationId xmlns:a16="http://schemas.microsoft.com/office/drawing/2014/main" xmlns="" id="{AEDFC6B5-A21A-4E72-BD28-278E7E379F23}"/>
               </a:ext>
             </a:extLst>
           </p:cNvPr>
@@ -6932,7 +7172,7 @@
           <p:cNvPr id="14" name="Text Placeholder 13">
             <a:extLst>
               <a:ext uri="{FF2B5EF4-FFF2-40B4-BE49-F238E27FC236}">
-                <a16:creationId xmlns:a16="http://schemas.microsoft.com/office/drawing/2014/main" id="{F97F84DA-CC92-40BE-90A0-EAFC0F77ACD5}"/>
+                <a16:creationId xmlns:a16="http://schemas.microsoft.com/office/drawing/2014/main" xmlns="" id="{F97F84DA-CC92-40BE-90A0-EAFC0F77ACD5}"/>
               </a:ext>
             </a:extLst>
           </p:cNvPr>
@@ -6964,7 +7204,7 @@
           <p:cNvPr id="15" name="Content Placeholder 14">
             <a:extLst>
               <a:ext uri="{FF2B5EF4-FFF2-40B4-BE49-F238E27FC236}">
-                <a16:creationId xmlns:a16="http://schemas.microsoft.com/office/drawing/2014/main" id="{65EDAF3D-0C05-40EA-9B5E-AE4B6B652DAB}"/>
+                <a16:creationId xmlns:a16="http://schemas.microsoft.com/office/drawing/2014/main" xmlns="" id="{65EDAF3D-0C05-40EA-9B5E-AE4B6B652DAB}"/>
               </a:ext>
             </a:extLst>
           </p:cNvPr>
@@ -6987,7 +7227,7 @@
     </p:spTree>
     <p:extLst>
       <p:ext uri="{BB962C8B-B14F-4D97-AF65-F5344CB8AC3E}">
-        <p14:creationId xmlns:p14="http://schemas.microsoft.com/office/powerpoint/2010/main" val="2874176155"/>
+        <p14:creationId xmlns:p14="http://schemas.microsoft.com/office/powerpoint/2010/main" xmlns="" val="2874176155"/>
       </p:ext>
     </p:extLst>
   </p:cSld>
@@ -7019,7 +7259,7 @@
           <p:cNvPr id="5" name="Title 4">
             <a:extLst>
               <a:ext uri="{FF2B5EF4-FFF2-40B4-BE49-F238E27FC236}">
-                <a16:creationId xmlns:a16="http://schemas.microsoft.com/office/drawing/2014/main" id="{AF5A2BDD-B148-4F27-8921-CB48343D26A4}"/>
+                <a16:creationId xmlns:a16="http://schemas.microsoft.com/office/drawing/2014/main" xmlns="" id="{AF5A2BDD-B148-4F27-8921-CB48343D26A4}"/>
               </a:ext>
             </a:extLst>
           </p:cNvPr>
@@ -7050,7 +7290,7 @@
           <p:cNvPr id="2" name="Text Placeholder 1">
             <a:extLst>
               <a:ext uri="{FF2B5EF4-FFF2-40B4-BE49-F238E27FC236}">
-                <a16:creationId xmlns:a16="http://schemas.microsoft.com/office/drawing/2014/main" id="{D7276472-8EFD-439B-9D3B-ACDA0172BF56}"/>
+                <a16:creationId xmlns:a16="http://schemas.microsoft.com/office/drawing/2014/main" xmlns="" id="{D7276472-8EFD-439B-9D3B-ACDA0172BF56}"/>
               </a:ext>
             </a:extLst>
           </p:cNvPr>
@@ -7081,7 +7321,7 @@
           <p:cNvPr id="3" name="Content Placeholder 2">
             <a:extLst>
               <a:ext uri="{FF2B5EF4-FFF2-40B4-BE49-F238E27FC236}">
-                <a16:creationId xmlns:a16="http://schemas.microsoft.com/office/drawing/2014/main" id="{8A9C7322-9FFF-44B3-BAF6-3BD4F1958299}"/>
+                <a16:creationId xmlns:a16="http://schemas.microsoft.com/office/drawing/2014/main" xmlns="" id="{8A9C7322-9FFF-44B3-BAF6-3BD4F1958299}"/>
               </a:ext>
             </a:extLst>
           </p:cNvPr>
@@ -7106,7 +7346,7 @@
           <p:cNvPr id="4" name="Text Placeholder 3">
             <a:extLst>
               <a:ext uri="{FF2B5EF4-FFF2-40B4-BE49-F238E27FC236}">
-                <a16:creationId xmlns:a16="http://schemas.microsoft.com/office/drawing/2014/main" id="{8F20AA0B-4926-4923-A0C9-5042003261EB}"/>
+                <a16:creationId xmlns:a16="http://schemas.microsoft.com/office/drawing/2014/main" xmlns="" id="{8F20AA0B-4926-4923-A0C9-5042003261EB}"/>
               </a:ext>
             </a:extLst>
           </p:cNvPr>
@@ -7140,7 +7380,7 @@
           <p:cNvPr id="7" name="Content Placeholder 6">
             <a:extLst>
               <a:ext uri="{FF2B5EF4-FFF2-40B4-BE49-F238E27FC236}">
-                <a16:creationId xmlns:a16="http://schemas.microsoft.com/office/drawing/2014/main" id="{ABA42A89-7ED1-4972-8341-EB283F8AB96F}"/>
+                <a16:creationId xmlns:a16="http://schemas.microsoft.com/office/drawing/2014/main" xmlns="" id="{ABA42A89-7ED1-4972-8341-EB283F8AB96F}"/>
               </a:ext>
             </a:extLst>
           </p:cNvPr>
@@ -7165,7 +7405,7 @@
           <p:cNvPr id="8" name="Text Placeholder 7">
             <a:extLst>
               <a:ext uri="{FF2B5EF4-FFF2-40B4-BE49-F238E27FC236}">
-                <a16:creationId xmlns:a16="http://schemas.microsoft.com/office/drawing/2014/main" id="{77D946F0-DD75-4E57-91F4-B3F43F8ABD86}"/>
+                <a16:creationId xmlns:a16="http://schemas.microsoft.com/office/drawing/2014/main" xmlns="" id="{77D946F0-DD75-4E57-91F4-B3F43F8ABD86}"/>
               </a:ext>
             </a:extLst>
           </p:cNvPr>
@@ -7199,7 +7439,7 @@
           <p:cNvPr id="9" name="Content Placeholder 8">
             <a:extLst>
               <a:ext uri="{FF2B5EF4-FFF2-40B4-BE49-F238E27FC236}">
-                <a16:creationId xmlns:a16="http://schemas.microsoft.com/office/drawing/2014/main" id="{A7E9C391-A46A-40F8-952B-E71F2AE689E7}"/>
+                <a16:creationId xmlns:a16="http://schemas.microsoft.com/office/drawing/2014/main" xmlns="" id="{A7E9C391-A46A-40F8-952B-E71F2AE689E7}"/>
               </a:ext>
             </a:extLst>
           </p:cNvPr>
@@ -7222,7 +7462,7 @@
     </p:spTree>
     <p:extLst>
       <p:ext uri="{BB962C8B-B14F-4D97-AF65-F5344CB8AC3E}">
-        <p14:creationId xmlns:p14="http://schemas.microsoft.com/office/powerpoint/2010/main" val="899812988"/>
+        <p14:creationId xmlns:p14="http://schemas.microsoft.com/office/powerpoint/2010/main" xmlns="" val="899812988"/>
       </p:ext>
     </p:extLst>
   </p:cSld>
@@ -7254,7 +7494,7 @@
           <p:cNvPr id="5" name="Title 4">
             <a:extLst>
               <a:ext uri="{FF2B5EF4-FFF2-40B4-BE49-F238E27FC236}">
-                <a16:creationId xmlns:a16="http://schemas.microsoft.com/office/drawing/2014/main" id="{AF5A2BDD-B148-4F27-8921-CB48343D26A4}"/>
+                <a16:creationId xmlns:a16="http://schemas.microsoft.com/office/drawing/2014/main" xmlns="" id="{AF5A2BDD-B148-4F27-8921-CB48343D26A4}"/>
               </a:ext>
             </a:extLst>
           </p:cNvPr>
@@ -7283,7 +7523,7 @@
           <p:cNvPr id="6" name="Content Placeholder 5">
             <a:extLst>
               <a:ext uri="{FF2B5EF4-FFF2-40B4-BE49-F238E27FC236}">
-                <a16:creationId xmlns:a16="http://schemas.microsoft.com/office/drawing/2014/main" id="{DA1664A8-3DF3-41F7-BBFA-9727344715BF}"/>
+                <a16:creationId xmlns:a16="http://schemas.microsoft.com/office/drawing/2014/main" xmlns="" id="{DA1664A8-3DF3-41F7-BBFA-9727344715BF}"/>
               </a:ext>
             </a:extLst>
           </p:cNvPr>
@@ -7323,7 +7563,7 @@
     </p:spTree>
     <p:extLst>
       <p:ext uri="{BB962C8B-B14F-4D97-AF65-F5344CB8AC3E}">
-        <p14:creationId xmlns:p14="http://schemas.microsoft.com/office/powerpoint/2010/main" val="4081839589"/>
+        <p14:creationId xmlns:p14="http://schemas.microsoft.com/office/powerpoint/2010/main" xmlns="" val="4081839589"/>
       </p:ext>
     </p:extLst>
   </p:cSld>
@@ -7355,7 +7595,7 @@
           <p:cNvPr id="5" name="Title 4">
             <a:extLst>
               <a:ext uri="{FF2B5EF4-FFF2-40B4-BE49-F238E27FC236}">
-                <a16:creationId xmlns:a16="http://schemas.microsoft.com/office/drawing/2014/main" id="{AF5A2BDD-B148-4F27-8921-CB48343D26A4}"/>
+                <a16:creationId xmlns:a16="http://schemas.microsoft.com/office/drawing/2014/main" xmlns="" id="{AF5A2BDD-B148-4F27-8921-CB48343D26A4}"/>
               </a:ext>
             </a:extLst>
           </p:cNvPr>
@@ -7384,7 +7624,7 @@
           <p:cNvPr id="6" name="Content Placeholder 5">
             <a:extLst>
               <a:ext uri="{FF2B5EF4-FFF2-40B4-BE49-F238E27FC236}">
-                <a16:creationId xmlns:a16="http://schemas.microsoft.com/office/drawing/2014/main" id="{DA1664A8-3DF3-41F7-BBFA-9727344715BF}"/>
+                <a16:creationId xmlns:a16="http://schemas.microsoft.com/office/drawing/2014/main" xmlns="" id="{DA1664A8-3DF3-41F7-BBFA-9727344715BF}"/>
               </a:ext>
             </a:extLst>
           </p:cNvPr>
@@ -7407,7 +7647,7 @@
     </p:spTree>
     <p:extLst>
       <p:ext uri="{BB962C8B-B14F-4D97-AF65-F5344CB8AC3E}">
-        <p14:creationId xmlns:p14="http://schemas.microsoft.com/office/powerpoint/2010/main" val="2481002695"/>
+        <p14:creationId xmlns:p14="http://schemas.microsoft.com/office/powerpoint/2010/main" xmlns="" val="2481002695"/>
       </p:ext>
     </p:extLst>
   </p:cSld>
@@ -7460,7 +7700,7 @@
     </a:clrScheme>
     <a:fontScheme name="Tw Cen MT">
       <a:majorFont>
-        <a:latin typeface="Tw Cen MT" panose="020B0602020104020603"/>
+        <a:latin typeface="Tw Cen MT"/>
         <a:ea typeface=""/>
         <a:cs typeface=""/>
         <a:font script="Grek" typeface="Calibri"/>
@@ -7497,7 +7737,7 @@
         <a:font script="Geor" typeface="Sylfaen"/>
       </a:majorFont>
       <a:minorFont>
-        <a:latin typeface="Tw Cen MT" panose="020B0602020104020603"/>
+        <a:latin typeface="Tw Cen MT"/>
         <a:ea typeface=""/>
         <a:cs typeface=""/>
         <a:font script="Grek" typeface="Calibri"/>
@@ -7676,7 +7916,7 @@
   <a:extraClrSchemeLst/>
   <a:extLst>
     <a:ext uri="{05A4C25C-085E-4340-85A3-A5531E510DB2}">
-      <thm15:themeFamily xmlns:thm15="http://schemas.microsoft.com/office/thememl/2012/main" name="Office Theme" id="{62F939B6-93AF-4DB8-9C6B-D6C7DFDC589F}" vid="{4A3C46E8-61CC-4603-A589-7422A47A8E4A}"/>
+      <thm15:themeFamily xmlns:thm15="http://schemas.microsoft.com/office/thememl/2012/main" xmlns="" name="Office Theme" id="{62F939B6-93AF-4DB8-9C6B-D6C7DFDC589F}" vid="{4A3C46E8-61CC-4603-A589-7422A47A8E4A}"/>
     </a:ext>
   </a:extLst>
 </a:theme>
@@ -7725,7 +7965,7 @@
     </a:clrScheme>
     <a:fontScheme name="Office">
       <a:majorFont>
-        <a:latin typeface="Calibri Light" panose="020F0302020204030204"/>
+        <a:latin typeface="Calibri Light"/>
         <a:ea typeface=""/>
         <a:cs typeface=""/>
         <a:font script="Jpan" typeface="游ゴシック Light"/>
@@ -7777,7 +8017,7 @@
         <a:font script="Tfng" typeface="Ebrima"/>
       </a:majorFont>
       <a:minorFont>
-        <a:latin typeface="Calibri" panose="020F0502020204030204"/>
+        <a:latin typeface="Calibri"/>
         <a:ea typeface=""/>
         <a:cs typeface=""/>
         <a:font script="Jpan" typeface="游ゴシック"/>
@@ -7971,7 +8211,7 @@
   <a:extraClrSchemeLst/>
   <a:extLst>
     <a:ext uri="{05A4C25C-085E-4340-85A3-A5531E510DB2}">
-      <thm15:themeFamily xmlns:thm15="http://schemas.microsoft.com/office/thememl/2012/main" name="Office Theme" id="{62F939B6-93AF-4DB8-9C6B-D6C7DFDC589F}" vid="{4A3C46E8-61CC-4603-A589-7422A47A8E4A}"/>
+      <thm15:themeFamily xmlns:thm15="http://schemas.microsoft.com/office/thememl/2012/main" xmlns="" name="Office Theme" id="{62F939B6-93AF-4DB8-9C6B-D6C7DFDC589F}" vid="{4A3C46E8-61CC-4603-A589-7422A47A8E4A}"/>
     </a:ext>
   </a:extLst>
 </a:theme>

</xml_diff>

<commit_message>
Final PPT for Zeroth review
</commit_message>
<xml_diff>
--- a/Presentation for zeroth review/PPT for zeroth review.pptx
+++ b/Presentation for zeroth review/PPT for zeroth review.pptx
@@ -5,7 +5,7 @@
     <p:sldMasterId id="2147483648" r:id="rId1"/>
   </p:sldMasterIdLst>
   <p:notesMasterIdLst>
-    <p:notesMasterId r:id="rId13"/>
+    <p:notesMasterId r:id="rId40"/>
   </p:notesMasterIdLst>
   <p:sldIdLst>
     <p:sldId id="257" r:id="rId2"/>
@@ -17,8 +17,35 @@
     <p:sldId id="263" r:id="rId8"/>
     <p:sldId id="264" r:id="rId9"/>
     <p:sldId id="266" r:id="rId10"/>
-    <p:sldId id="265" r:id="rId11"/>
-    <p:sldId id="267" r:id="rId12"/>
+    <p:sldId id="298" r:id="rId11"/>
+    <p:sldId id="297" r:id="rId12"/>
+    <p:sldId id="271" r:id="rId13"/>
+    <p:sldId id="272" r:id="rId14"/>
+    <p:sldId id="273" r:id="rId15"/>
+    <p:sldId id="274" r:id="rId16"/>
+    <p:sldId id="275" r:id="rId17"/>
+    <p:sldId id="276" r:id="rId18"/>
+    <p:sldId id="277" r:id="rId19"/>
+    <p:sldId id="278" r:id="rId20"/>
+    <p:sldId id="279" r:id="rId21"/>
+    <p:sldId id="280" r:id="rId22"/>
+    <p:sldId id="281" r:id="rId23"/>
+    <p:sldId id="282" r:id="rId24"/>
+    <p:sldId id="283" r:id="rId25"/>
+    <p:sldId id="284" r:id="rId26"/>
+    <p:sldId id="285" r:id="rId27"/>
+    <p:sldId id="286" r:id="rId28"/>
+    <p:sldId id="287" r:id="rId29"/>
+    <p:sldId id="288" r:id="rId30"/>
+    <p:sldId id="289" r:id="rId31"/>
+    <p:sldId id="290" r:id="rId32"/>
+    <p:sldId id="291" r:id="rId33"/>
+    <p:sldId id="292" r:id="rId34"/>
+    <p:sldId id="293" r:id="rId35"/>
+    <p:sldId id="294" r:id="rId36"/>
+    <p:sldId id="295" r:id="rId37"/>
+    <p:sldId id="265" r:id="rId38"/>
+    <p:sldId id="296" r:id="rId39"/>
   </p:sldIdLst>
   <p:sldSz cx="12192000" cy="6858000"/>
   <p:notesSz cx="6858000" cy="9144000"/>
@@ -131,8 +158,35 @@
             <p14:sldId id="263"/>
             <p14:sldId id="264"/>
             <p14:sldId id="266"/>
+            <p14:sldId id="298"/>
+            <p14:sldId id="297"/>
+            <p14:sldId id="271"/>
+            <p14:sldId id="272"/>
+            <p14:sldId id="273"/>
+            <p14:sldId id="274"/>
+            <p14:sldId id="275"/>
+            <p14:sldId id="276"/>
+            <p14:sldId id="277"/>
+            <p14:sldId id="278"/>
+            <p14:sldId id="279"/>
+            <p14:sldId id="280"/>
+            <p14:sldId id="281"/>
+            <p14:sldId id="282"/>
+            <p14:sldId id="283"/>
+            <p14:sldId id="284"/>
+            <p14:sldId id="285"/>
+            <p14:sldId id="286"/>
+            <p14:sldId id="287"/>
+            <p14:sldId id="288"/>
+            <p14:sldId id="289"/>
+            <p14:sldId id="290"/>
+            <p14:sldId id="291"/>
+            <p14:sldId id="292"/>
+            <p14:sldId id="293"/>
+            <p14:sldId id="294"/>
+            <p14:sldId id="295"/>
             <p14:sldId id="265"/>
-            <p14:sldId id="267"/>
+            <p14:sldId id="296"/>
           </p14:sldIdLst>
         </p14:section>
       </p14:sectionLst>
@@ -5975,41 +6029,65 @@
         </p:nvSpPr>
         <p:spPr>
           <a:xfrm>
-            <a:off x="-1" y="2178824"/>
-            <a:ext cx="4954555" cy="1086889"/>
+            <a:off x="-2" y="2178824"/>
+            <a:ext cx="6277972" cy="1250176"/>
           </a:xfrm>
         </p:spPr>
         <p:txBody>
-          <a:bodyPr>
-            <a:normAutofit fontScale="70000" lnSpcReduction="20000"/>
+          <a:bodyPr anchor="ctr">
+            <a:normAutofit/>
           </a:bodyPr>
           <a:lstStyle/>
           <a:p>
-            <a:r>
-              <a:rPr lang="en-US" dirty="0"/>
+            <a:pPr>
+              <a:lnSpc>
+                <a:spcPts val="2040"/>
+              </a:lnSpc>
+              <a:spcBef>
+                <a:spcPts val="0"/>
+              </a:spcBef>
+            </a:pPr>
+            <a:r>
+              <a:rPr lang="en-US" sz="2200" dirty="0"/>
               <a:t>Project Guide: Ms. </a:t>
             </a:r>
             <a:r>
-              <a:rPr lang="en-US" dirty="0" err="1"/>
+              <a:rPr lang="en-US" sz="2200" dirty="0" err="1"/>
               <a:t>Sruthimol</a:t>
             </a:r>
             <a:r>
-              <a:rPr lang="en-US" dirty="0"/>
+              <a:rPr lang="en-US" sz="2200" dirty="0"/>
               <a:t> M P</a:t>
             </a:r>
           </a:p>
           <a:p>
-            <a:r>
-              <a:rPr lang="en-US" dirty="0"/>
+            <a:pPr>
+              <a:lnSpc>
+                <a:spcPts val="2040"/>
+              </a:lnSpc>
+              <a:spcBef>
+                <a:spcPts val="0"/>
+              </a:spcBef>
+            </a:pPr>
+            <a:r>
+              <a:rPr lang="en-US" sz="2200" dirty="0"/>
               <a:t>                      Lecturer</a:t>
             </a:r>
           </a:p>
           <a:p>
-            <a:r>
-              <a:rPr lang="en-US" dirty="0"/>
+            <a:pPr>
+              <a:lnSpc>
+                <a:spcPts val="2040"/>
+              </a:lnSpc>
+              <a:spcBef>
+                <a:spcPts val="0"/>
+              </a:spcBef>
+            </a:pPr>
+            <a:r>
+              <a:rPr lang="en-US" sz="2200" dirty="0"/>
               <a:t>                      Department of Information Technology</a:t>
             </a:r>
-            <a:endParaRPr lang="en-GB" dirty="0"/>
+            <a:endParaRPr lang="en-GB" sz="2200" dirty="0"/>
           </a:p>
         </p:txBody>
       </p:sp>
@@ -6045,10 +6123,10 @@
       </p:grpSpPr>
       <p:sp>
         <p:nvSpPr>
-          <p:cNvPr id="5" name="Title 4">
-            <a:extLst>
-              <a:ext uri="{FF2B5EF4-FFF2-40B4-BE49-F238E27FC236}">
-                <a16:creationId xmlns:a16="http://schemas.microsoft.com/office/drawing/2014/main" id="{AF5A2BDD-B148-4F27-8921-CB48343D26A4}"/>
+          <p:cNvPr id="2" name="Title 1">
+            <a:extLst>
+              <a:ext uri="{FF2B5EF4-FFF2-40B4-BE49-F238E27FC236}">
+                <a16:creationId xmlns:a16="http://schemas.microsoft.com/office/drawing/2014/main" id="{520F51B3-5A6F-4B80-BFAA-D31756C76A6A}"/>
               </a:ext>
             </a:extLst>
           </p:cNvPr>
@@ -6059,48 +6137,37 @@
             <p:ph type="title"/>
           </p:nvPr>
         </p:nvSpPr>
-        <p:spPr/>
+        <p:spPr>
+          <a:xfrm>
+            <a:off x="974678" y="3034506"/>
+            <a:ext cx="10515600" cy="788988"/>
+          </a:xfrm>
+        </p:spPr>
         <p:txBody>
           <a:bodyPr/>
           <a:lstStyle/>
           <a:p>
-            <a:r>
-              <a:rPr lang="en-US" dirty="0"/>
-              <a:t>REFERENCES</a:t>
-            </a:r>
-            <a:endParaRPr lang="en-GB" dirty="0"/>
-          </a:p>
-        </p:txBody>
-      </p:sp>
-      <p:sp>
-        <p:nvSpPr>
-          <p:cNvPr id="6" name="Content Placeholder 5">
-            <a:extLst>
-              <a:ext uri="{FF2B5EF4-FFF2-40B4-BE49-F238E27FC236}">
-                <a16:creationId xmlns:a16="http://schemas.microsoft.com/office/drawing/2014/main" id="{DA1664A8-3DF3-41F7-BBFA-9727344715BF}"/>
-              </a:ext>
-            </a:extLst>
-          </p:cNvPr>
-          <p:cNvSpPr>
-            <a:spLocks noGrp="1"/>
-          </p:cNvSpPr>
-          <p:nvPr>
-            <p:ph idx="1"/>
-          </p:nvPr>
-        </p:nvSpPr>
-        <p:spPr/>
-        <p:txBody>
-          <a:bodyPr/>
-          <a:lstStyle/>
-          <a:p>
-            <a:endParaRPr lang="en-GB"/>
+            <a:pPr algn="ctr"/>
+            <a:r>
+              <a:rPr lang="en-US" dirty="0">
+                <a:solidFill>
+                  <a:srgbClr val="2D3E50"/>
+                </a:solidFill>
+              </a:rPr>
+              <a:t>DATA FLOW DIAGRAMS</a:t>
+            </a:r>
+            <a:endParaRPr lang="en-GB" dirty="0">
+              <a:solidFill>
+                <a:srgbClr val="2D3E50"/>
+              </a:solidFill>
+            </a:endParaRPr>
           </a:p>
         </p:txBody>
       </p:sp>
     </p:spTree>
     <p:extLst>
       <p:ext uri="{BB962C8B-B14F-4D97-AF65-F5344CB8AC3E}">
-        <p14:creationId xmlns:p14="http://schemas.microsoft.com/office/powerpoint/2010/main" val="1893057290"/>
+        <p14:creationId xmlns:p14="http://schemas.microsoft.com/office/powerpoint/2010/main" val="2560910500"/>
       </p:ext>
     </p:extLst>
   </p:cSld>
@@ -6127,39 +6194,964 @@
           <a:chExt cx="0" cy="0"/>
         </a:xfrm>
       </p:grpSpPr>
+      <p:pic>
+        <p:nvPicPr>
+          <p:cNvPr id="3" name="Content Placeholder 2">
+            <a:extLst>
+              <a:ext uri="{FF2B5EF4-FFF2-40B4-BE49-F238E27FC236}">
+                <a16:creationId xmlns:a16="http://schemas.microsoft.com/office/drawing/2014/main" id="{B43A98F5-15E6-4A67-9CD6-F54700711DD1}"/>
+              </a:ext>
+            </a:extLst>
+          </p:cNvPr>
+          <p:cNvPicPr>
+            <a:picLocks noGrp="1" noChangeAspect="1"/>
+          </p:cNvPicPr>
+          <p:nvPr>
+            <p:ph idx="1"/>
+          </p:nvPr>
+        </p:nvPicPr>
+        <p:blipFill>
+          <a:blip r:embed="rId2">
+            <a:extLst>
+              <a:ext uri="{28A0092B-C50C-407E-A947-70E740481C1C}">
+                <a14:useLocalDpi xmlns:a14="http://schemas.microsoft.com/office/drawing/2010/main" val="0"/>
+              </a:ext>
+            </a:extLst>
+          </a:blip>
+          <a:stretch>
+            <a:fillRect/>
+          </a:stretch>
+        </p:blipFill>
+        <p:spPr>
+          <a:xfrm>
+            <a:off x="2680493" y="1162190"/>
+            <a:ext cx="7542774" cy="5143076"/>
+          </a:xfrm>
+        </p:spPr>
+      </p:pic>
       <p:sp>
         <p:nvSpPr>
-          <p:cNvPr id="4" name="Title 3">
-            <a:extLst>
-              <a:ext uri="{FF2B5EF4-FFF2-40B4-BE49-F238E27FC236}">
-                <a16:creationId xmlns:a16="http://schemas.microsoft.com/office/drawing/2014/main" id="{EA8558A0-16AF-40A2-94AF-AFFDBFB63E72}"/>
-              </a:ext>
-            </a:extLst>
-          </p:cNvPr>
-          <p:cNvSpPr>
-            <a:spLocks noGrp="1"/>
-          </p:cNvSpPr>
-          <p:nvPr>
-            <p:ph type="title"/>
-          </p:nvPr>
+          <p:cNvPr id="4" name="TextBox 3">
+            <a:extLst>
+              <a:ext uri="{FF2B5EF4-FFF2-40B4-BE49-F238E27FC236}">
+                <a16:creationId xmlns:a16="http://schemas.microsoft.com/office/drawing/2014/main" id="{DCCE8BF0-9E94-4090-95ED-C5D9BDAEF2A6}"/>
+              </a:ext>
+            </a:extLst>
+          </p:cNvPr>
+          <p:cNvSpPr txBox="1"/>
+          <p:nvPr/>
         </p:nvSpPr>
-        <p:spPr/>
+        <p:spPr>
+          <a:xfrm>
+            <a:off x="941033" y="765158"/>
+            <a:ext cx="10836985" cy="397032"/>
+          </a:xfrm>
+          <a:prstGeom prst="rect">
+            <a:avLst/>
+          </a:prstGeom>
+          <a:noFill/>
+        </p:spPr>
         <p:txBody>
-          <a:bodyPr/>
+          <a:bodyPr wrap="square" rtlCol="0">
+            <a:spAutoFit/>
+          </a:bodyPr>
           <a:lstStyle/>
           <a:p>
-            <a:r>
-              <a:rPr lang="en-US" dirty="0"/>
-              <a:t>THANK YOU!</a:t>
-            </a:r>
-            <a:endParaRPr lang="en-GB" dirty="0"/>
+            <a:pPr>
+              <a:lnSpc>
+                <a:spcPct val="90000"/>
+              </a:lnSpc>
+              <a:spcBef>
+                <a:spcPts val="1000"/>
+              </a:spcBef>
+            </a:pPr>
+            <a:r>
+              <a:rPr lang="en-IN" sz="2200" b="1" dirty="0">
+                <a:solidFill>
+                  <a:srgbClr val="123E62"/>
+                </a:solidFill>
+              </a:rPr>
+              <a:t>LEVEL 0 : CONTEXT DIAGRAM FOR CAREER INFORMATION AND RECRUITMENT PORTAL</a:t>
+            </a:r>
           </a:p>
         </p:txBody>
       </p:sp>
     </p:spTree>
     <p:extLst>
       <p:ext uri="{BB962C8B-B14F-4D97-AF65-F5344CB8AC3E}">
-        <p14:creationId xmlns:p14="http://schemas.microsoft.com/office/powerpoint/2010/main" val="1776534027"/>
+        <p14:creationId xmlns:p14="http://schemas.microsoft.com/office/powerpoint/2010/main" val="2108377738"/>
+      </p:ext>
+    </p:extLst>
+  </p:cSld>
+  <p:clrMapOvr>
+    <a:masterClrMapping/>
+  </p:clrMapOvr>
+</p:sld>
+</file>
+
+<file path=ppt/slides/slide12.xml><?xml version="1.0" encoding="utf-8"?>
+<p:sld xmlns:a="http://schemas.openxmlformats.org/drawingml/2006/main" xmlns:r="http://schemas.openxmlformats.org/officeDocument/2006/relationships" xmlns:p="http://schemas.openxmlformats.org/presentationml/2006/main">
+  <p:cSld>
+    <p:spTree>
+      <p:nvGrpSpPr>
+        <p:cNvPr id="1" name=""/>
+        <p:cNvGrpSpPr/>
+        <p:nvPr/>
+      </p:nvGrpSpPr>
+      <p:grpSpPr>
+        <a:xfrm>
+          <a:off x="0" y="0"/>
+          <a:ext cx="0" cy="0"/>
+          <a:chOff x="0" y="0"/>
+          <a:chExt cx="0" cy="0"/>
+        </a:xfrm>
+      </p:grpSpPr>
+      <p:pic>
+        <p:nvPicPr>
+          <p:cNvPr id="3" name="Picture 2">
+            <a:extLst>
+              <a:ext uri="{FF2B5EF4-FFF2-40B4-BE49-F238E27FC236}">
+                <a16:creationId xmlns:a16="http://schemas.microsoft.com/office/drawing/2014/main" id="{DDC4C7F0-5A6E-4A32-98CD-A46D0C35D1D0}"/>
+              </a:ext>
+            </a:extLst>
+          </p:cNvPr>
+          <p:cNvPicPr>
+            <a:picLocks noChangeAspect="1"/>
+          </p:cNvPicPr>
+          <p:nvPr/>
+        </p:nvPicPr>
+        <p:blipFill>
+          <a:blip r:embed="rId2">
+            <a:extLst>
+              <a:ext uri="{28A0092B-C50C-407E-A947-70E740481C1C}">
+                <a14:useLocalDpi xmlns:a14="http://schemas.microsoft.com/office/drawing/2010/main" val="0"/>
+              </a:ext>
+            </a:extLst>
+          </a:blip>
+          <a:stretch>
+            <a:fillRect/>
+          </a:stretch>
+        </p:blipFill>
+        <p:spPr>
+          <a:xfrm>
+            <a:off x="2041864" y="1056442"/>
+            <a:ext cx="6977849" cy="4745115"/>
+          </a:xfrm>
+          <a:prstGeom prst="rect">
+            <a:avLst/>
+          </a:prstGeom>
+        </p:spPr>
+      </p:pic>
+      <p:sp>
+        <p:nvSpPr>
+          <p:cNvPr id="5" name="TextBox 4">
+            <a:extLst>
+              <a:ext uri="{FF2B5EF4-FFF2-40B4-BE49-F238E27FC236}">
+                <a16:creationId xmlns:a16="http://schemas.microsoft.com/office/drawing/2014/main" id="{8BDC8284-EDA6-4530-867C-5AF81D30B49C}"/>
+              </a:ext>
+            </a:extLst>
+          </p:cNvPr>
+          <p:cNvSpPr txBox="1"/>
+          <p:nvPr/>
+        </p:nvSpPr>
+        <p:spPr>
+          <a:xfrm>
+            <a:off x="696897" y="687110"/>
+            <a:ext cx="9667782" cy="430887"/>
+          </a:xfrm>
+          <a:prstGeom prst="rect">
+            <a:avLst/>
+          </a:prstGeom>
+          <a:noFill/>
+        </p:spPr>
+        <p:txBody>
+          <a:bodyPr wrap="square" rtlCol="0">
+            <a:spAutoFit/>
+          </a:bodyPr>
+          <a:lstStyle/>
+          <a:p>
+            <a:r>
+              <a:rPr lang="en-IN" sz="2200" b="1" dirty="0">
+                <a:solidFill>
+                  <a:srgbClr val="123E62"/>
+                </a:solidFill>
+              </a:rPr>
+              <a:t>LEVEL</a:t>
+            </a:r>
+            <a:r>
+              <a:rPr lang="en-IN" dirty="0"/>
+              <a:t> </a:t>
+            </a:r>
+            <a:r>
+              <a:rPr lang="en-IN" sz="2200" b="1" dirty="0">
+                <a:solidFill>
+                  <a:srgbClr val="123E62"/>
+                </a:solidFill>
+              </a:rPr>
+              <a:t>1 DIAGRAMS</a:t>
+            </a:r>
+          </a:p>
+        </p:txBody>
+      </p:sp>
+      <p:sp>
+        <p:nvSpPr>
+          <p:cNvPr id="6" name="TextBox 5">
+            <a:extLst>
+              <a:ext uri="{FF2B5EF4-FFF2-40B4-BE49-F238E27FC236}">
+                <a16:creationId xmlns:a16="http://schemas.microsoft.com/office/drawing/2014/main" id="{82AFD5F1-040F-4A87-B3F7-91A216D89ED5}"/>
+              </a:ext>
+            </a:extLst>
+          </p:cNvPr>
+          <p:cNvSpPr txBox="1"/>
+          <p:nvPr/>
+        </p:nvSpPr>
+        <p:spPr>
+          <a:xfrm>
+            <a:off x="2778711" y="5865464"/>
+            <a:ext cx="4314547" cy="369332"/>
+          </a:xfrm>
+          <a:prstGeom prst="rect">
+            <a:avLst/>
+          </a:prstGeom>
+          <a:noFill/>
+        </p:spPr>
+        <p:txBody>
+          <a:bodyPr wrap="square" rtlCol="0">
+            <a:spAutoFit/>
+          </a:bodyPr>
+          <a:lstStyle/>
+          <a:p>
+            <a:r>
+              <a:rPr lang="en-IN" dirty="0"/>
+              <a:t>Level 1.1 user module implemented as class)</a:t>
+            </a:r>
+          </a:p>
+        </p:txBody>
+      </p:sp>
+    </p:spTree>
+    <p:extLst>
+      <p:ext uri="{BB962C8B-B14F-4D97-AF65-F5344CB8AC3E}">
+        <p14:creationId xmlns:p14="http://schemas.microsoft.com/office/powerpoint/2010/main" val="3830599063"/>
+      </p:ext>
+    </p:extLst>
+  </p:cSld>
+  <p:clrMapOvr>
+    <a:masterClrMapping/>
+  </p:clrMapOvr>
+</p:sld>
+</file>
+
+<file path=ppt/slides/slide13.xml><?xml version="1.0" encoding="utf-8"?>
+<p:sld xmlns:a="http://schemas.openxmlformats.org/drawingml/2006/main" xmlns:r="http://schemas.openxmlformats.org/officeDocument/2006/relationships" xmlns:p="http://schemas.openxmlformats.org/presentationml/2006/main">
+  <p:cSld>
+    <p:spTree>
+      <p:nvGrpSpPr>
+        <p:cNvPr id="1" name=""/>
+        <p:cNvGrpSpPr/>
+        <p:nvPr/>
+      </p:nvGrpSpPr>
+      <p:grpSpPr>
+        <a:xfrm>
+          <a:off x="0" y="0"/>
+          <a:ext cx="0" cy="0"/>
+          <a:chOff x="0" y="0"/>
+          <a:chExt cx="0" cy="0"/>
+        </a:xfrm>
+      </p:grpSpPr>
+      <p:pic>
+        <p:nvPicPr>
+          <p:cNvPr id="3" name="Picture 2">
+            <a:extLst>
+              <a:ext uri="{FF2B5EF4-FFF2-40B4-BE49-F238E27FC236}">
+                <a16:creationId xmlns:a16="http://schemas.microsoft.com/office/drawing/2014/main" id="{D43655A1-1E07-4972-A0FA-C0F9A89E0053}"/>
+              </a:ext>
+            </a:extLst>
+          </p:cNvPr>
+          <p:cNvPicPr>
+            <a:picLocks noChangeAspect="1"/>
+          </p:cNvPicPr>
+          <p:nvPr/>
+        </p:nvPicPr>
+        <p:blipFill>
+          <a:blip r:embed="rId2">
+            <a:extLst>
+              <a:ext uri="{28A0092B-C50C-407E-A947-70E740481C1C}">
+                <a14:useLocalDpi xmlns:a14="http://schemas.microsoft.com/office/drawing/2010/main" val="0"/>
+              </a:ext>
+            </a:extLst>
+          </a:blip>
+          <a:stretch>
+            <a:fillRect/>
+          </a:stretch>
+        </p:blipFill>
+        <p:spPr>
+          <a:xfrm>
+            <a:off x="967665" y="662781"/>
+            <a:ext cx="9756559" cy="5024276"/>
+          </a:xfrm>
+          <a:prstGeom prst="rect">
+            <a:avLst/>
+          </a:prstGeom>
+        </p:spPr>
+      </p:pic>
+      <p:sp>
+        <p:nvSpPr>
+          <p:cNvPr id="4" name="TextBox 3">
+            <a:extLst>
+              <a:ext uri="{FF2B5EF4-FFF2-40B4-BE49-F238E27FC236}">
+                <a16:creationId xmlns:a16="http://schemas.microsoft.com/office/drawing/2014/main" id="{A7DF4A99-FD8C-4EB7-B73A-2F242B17CB0E}"/>
+              </a:ext>
+            </a:extLst>
+          </p:cNvPr>
+          <p:cNvSpPr txBox="1"/>
+          <p:nvPr/>
+        </p:nvSpPr>
+        <p:spPr>
+          <a:xfrm>
+            <a:off x="967666" y="5717220"/>
+            <a:ext cx="9756559" cy="369332"/>
+          </a:xfrm>
+          <a:prstGeom prst="rect">
+            <a:avLst/>
+          </a:prstGeom>
+          <a:noFill/>
+        </p:spPr>
+        <p:txBody>
+          <a:bodyPr wrap="square" rtlCol="0">
+            <a:spAutoFit/>
+          </a:bodyPr>
+          <a:lstStyle/>
+          <a:p>
+            <a:r>
+              <a:rPr lang="en-US" dirty="0"/>
+              <a:t> Level 1.1.1 -privileged User (sub-module of User (1.1), implemented via interfaces only) </a:t>
+            </a:r>
+            <a:endParaRPr lang="en-IN" dirty="0"/>
+          </a:p>
+        </p:txBody>
+      </p:sp>
+    </p:spTree>
+    <p:extLst>
+      <p:ext uri="{BB962C8B-B14F-4D97-AF65-F5344CB8AC3E}">
+        <p14:creationId xmlns:p14="http://schemas.microsoft.com/office/powerpoint/2010/main" val="3214945842"/>
+      </p:ext>
+    </p:extLst>
+  </p:cSld>
+  <p:clrMapOvr>
+    <a:masterClrMapping/>
+  </p:clrMapOvr>
+</p:sld>
+</file>
+
+<file path=ppt/slides/slide14.xml><?xml version="1.0" encoding="utf-8"?>
+<p:sld xmlns:a="http://schemas.openxmlformats.org/drawingml/2006/main" xmlns:r="http://schemas.openxmlformats.org/officeDocument/2006/relationships" xmlns:p="http://schemas.openxmlformats.org/presentationml/2006/main">
+  <p:cSld>
+    <p:spTree>
+      <p:nvGrpSpPr>
+        <p:cNvPr id="1" name=""/>
+        <p:cNvGrpSpPr/>
+        <p:nvPr/>
+      </p:nvGrpSpPr>
+      <p:grpSpPr>
+        <a:xfrm>
+          <a:off x="0" y="0"/>
+          <a:ext cx="0" cy="0"/>
+          <a:chOff x="0" y="0"/>
+          <a:chExt cx="0" cy="0"/>
+        </a:xfrm>
+      </p:grpSpPr>
+      <p:pic>
+        <p:nvPicPr>
+          <p:cNvPr id="3" name="Picture 2">
+            <a:extLst>
+              <a:ext uri="{FF2B5EF4-FFF2-40B4-BE49-F238E27FC236}">
+                <a16:creationId xmlns:a16="http://schemas.microsoft.com/office/drawing/2014/main" id="{62185528-CC99-42C5-B60D-C6D4521B5470}"/>
+              </a:ext>
+            </a:extLst>
+          </p:cNvPr>
+          <p:cNvPicPr>
+            <a:picLocks noChangeAspect="1"/>
+          </p:cNvPicPr>
+          <p:nvPr/>
+        </p:nvPicPr>
+        <p:blipFill>
+          <a:blip r:embed="rId2">
+            <a:extLst>
+              <a:ext uri="{28A0092B-C50C-407E-A947-70E740481C1C}">
+                <a14:useLocalDpi xmlns:a14="http://schemas.microsoft.com/office/drawing/2010/main" val="0"/>
+              </a:ext>
+            </a:extLst>
+          </a:blip>
+          <a:stretch>
+            <a:fillRect/>
+          </a:stretch>
+        </p:blipFill>
+        <p:spPr>
+          <a:xfrm>
+            <a:off x="1037972" y="682388"/>
+            <a:ext cx="9357982" cy="5104263"/>
+          </a:xfrm>
+          <a:prstGeom prst="rect">
+            <a:avLst/>
+          </a:prstGeom>
+        </p:spPr>
+      </p:pic>
+      <p:sp>
+        <p:nvSpPr>
+          <p:cNvPr id="4" name="TextBox 3">
+            <a:extLst>
+              <a:ext uri="{FF2B5EF4-FFF2-40B4-BE49-F238E27FC236}">
+                <a16:creationId xmlns:a16="http://schemas.microsoft.com/office/drawing/2014/main" id="{2CDD15FC-5DB6-424E-9199-EF2DA9F03AD8}"/>
+              </a:ext>
+            </a:extLst>
+          </p:cNvPr>
+          <p:cNvSpPr txBox="1"/>
+          <p:nvPr/>
+        </p:nvSpPr>
+        <p:spPr>
+          <a:xfrm>
+            <a:off x="1447060" y="5952477"/>
+            <a:ext cx="8913181" cy="369332"/>
+          </a:xfrm>
+          <a:prstGeom prst="rect">
+            <a:avLst/>
+          </a:prstGeom>
+          <a:noFill/>
+        </p:spPr>
+        <p:txBody>
+          <a:bodyPr wrap="square" rtlCol="0">
+            <a:spAutoFit/>
+          </a:bodyPr>
+          <a:lstStyle/>
+          <a:p>
+            <a:r>
+              <a:rPr lang="en-US" dirty="0"/>
+              <a:t> Level 1.1.1.1 - College module (implements Privileged User interface, implemented as class) </a:t>
+            </a:r>
+            <a:endParaRPr lang="en-IN" dirty="0"/>
+          </a:p>
+        </p:txBody>
+      </p:sp>
+    </p:spTree>
+    <p:extLst>
+      <p:ext uri="{BB962C8B-B14F-4D97-AF65-F5344CB8AC3E}">
+        <p14:creationId xmlns:p14="http://schemas.microsoft.com/office/powerpoint/2010/main" val="3818699149"/>
+      </p:ext>
+    </p:extLst>
+  </p:cSld>
+  <p:clrMapOvr>
+    <a:masterClrMapping/>
+  </p:clrMapOvr>
+</p:sld>
+</file>
+
+<file path=ppt/slides/slide15.xml><?xml version="1.0" encoding="utf-8"?>
+<p:sld xmlns:a="http://schemas.openxmlformats.org/drawingml/2006/main" xmlns:r="http://schemas.openxmlformats.org/officeDocument/2006/relationships" xmlns:p="http://schemas.openxmlformats.org/presentationml/2006/main">
+  <p:cSld>
+    <p:spTree>
+      <p:nvGrpSpPr>
+        <p:cNvPr id="1" name=""/>
+        <p:cNvGrpSpPr/>
+        <p:nvPr/>
+      </p:nvGrpSpPr>
+      <p:grpSpPr>
+        <a:xfrm>
+          <a:off x="0" y="0"/>
+          <a:ext cx="0" cy="0"/>
+          <a:chOff x="0" y="0"/>
+          <a:chExt cx="0" cy="0"/>
+        </a:xfrm>
+      </p:grpSpPr>
+      <p:pic>
+        <p:nvPicPr>
+          <p:cNvPr id="3" name="Picture 2">
+            <a:extLst>
+              <a:ext uri="{FF2B5EF4-FFF2-40B4-BE49-F238E27FC236}">
+                <a16:creationId xmlns:a16="http://schemas.microsoft.com/office/drawing/2014/main" id="{3AE1A4C9-EECE-4BB9-A07E-AD49C48B8227}"/>
+              </a:ext>
+            </a:extLst>
+          </p:cNvPr>
+          <p:cNvPicPr>
+            <a:picLocks noChangeAspect="1"/>
+          </p:cNvPicPr>
+          <p:nvPr/>
+        </p:nvPicPr>
+        <p:blipFill>
+          <a:blip r:embed="rId2">
+            <a:extLst>
+              <a:ext uri="{28A0092B-C50C-407E-A947-70E740481C1C}">
+                <a14:useLocalDpi xmlns:a14="http://schemas.microsoft.com/office/drawing/2010/main" val="0"/>
+              </a:ext>
+            </a:extLst>
+          </a:blip>
+          <a:stretch>
+            <a:fillRect/>
+          </a:stretch>
+        </p:blipFill>
+        <p:spPr>
+          <a:xfrm>
+            <a:off x="949911" y="957880"/>
+            <a:ext cx="9525177" cy="4473929"/>
+          </a:xfrm>
+          <a:prstGeom prst="rect">
+            <a:avLst/>
+          </a:prstGeom>
+        </p:spPr>
+      </p:pic>
+      <p:sp>
+        <p:nvSpPr>
+          <p:cNvPr id="5" name="TextBox 4">
+            <a:extLst>
+              <a:ext uri="{FF2B5EF4-FFF2-40B4-BE49-F238E27FC236}">
+                <a16:creationId xmlns:a16="http://schemas.microsoft.com/office/drawing/2014/main" id="{9AB1AFD1-C8B3-476C-B654-659FE02D17BA}"/>
+              </a:ext>
+            </a:extLst>
+          </p:cNvPr>
+          <p:cNvSpPr txBox="1"/>
+          <p:nvPr/>
+        </p:nvSpPr>
+        <p:spPr>
+          <a:xfrm>
+            <a:off x="949911" y="5530788"/>
+            <a:ext cx="9055223" cy="369332"/>
+          </a:xfrm>
+          <a:prstGeom prst="rect">
+            <a:avLst/>
+          </a:prstGeom>
+          <a:noFill/>
+        </p:spPr>
+        <p:txBody>
+          <a:bodyPr wrap="square" rtlCol="0">
+            <a:spAutoFit/>
+          </a:bodyPr>
+          <a:lstStyle/>
+          <a:p>
+            <a:r>
+              <a:rPr lang="en-US" dirty="0"/>
+              <a:t> Level 1.1.1.2 - Recruiter module (implements Privileged User interface, implemented as class) </a:t>
+            </a:r>
+            <a:endParaRPr lang="en-IN" dirty="0"/>
+          </a:p>
+        </p:txBody>
+      </p:sp>
+    </p:spTree>
+    <p:extLst>
+      <p:ext uri="{BB962C8B-B14F-4D97-AF65-F5344CB8AC3E}">
+        <p14:creationId xmlns:p14="http://schemas.microsoft.com/office/powerpoint/2010/main" val="369156413"/>
+      </p:ext>
+    </p:extLst>
+  </p:cSld>
+  <p:clrMapOvr>
+    <a:masterClrMapping/>
+  </p:clrMapOvr>
+</p:sld>
+</file>
+
+<file path=ppt/slides/slide16.xml><?xml version="1.0" encoding="utf-8"?>
+<p:sld xmlns:a="http://schemas.openxmlformats.org/drawingml/2006/main" xmlns:r="http://schemas.openxmlformats.org/officeDocument/2006/relationships" xmlns:p="http://schemas.openxmlformats.org/presentationml/2006/main">
+  <p:cSld>
+    <p:spTree>
+      <p:nvGrpSpPr>
+        <p:cNvPr id="1" name=""/>
+        <p:cNvGrpSpPr/>
+        <p:nvPr/>
+      </p:nvGrpSpPr>
+      <p:grpSpPr>
+        <a:xfrm>
+          <a:off x="0" y="0"/>
+          <a:ext cx="0" cy="0"/>
+          <a:chOff x="0" y="0"/>
+          <a:chExt cx="0" cy="0"/>
+        </a:xfrm>
+      </p:grpSpPr>
+      <p:pic>
+        <p:nvPicPr>
+          <p:cNvPr id="3" name="Picture 2">
+            <a:extLst>
+              <a:ext uri="{FF2B5EF4-FFF2-40B4-BE49-F238E27FC236}">
+                <a16:creationId xmlns:a16="http://schemas.microsoft.com/office/drawing/2014/main" id="{0ED28B01-9E17-4C3E-9B13-D74F77F8D8BA}"/>
+              </a:ext>
+            </a:extLst>
+          </p:cNvPr>
+          <p:cNvPicPr>
+            <a:picLocks noChangeAspect="1"/>
+          </p:cNvPicPr>
+          <p:nvPr/>
+        </p:nvPicPr>
+        <p:blipFill>
+          <a:blip r:embed="rId2">
+            <a:extLst>
+              <a:ext uri="{28A0092B-C50C-407E-A947-70E740481C1C}">
+                <a14:useLocalDpi xmlns:a14="http://schemas.microsoft.com/office/drawing/2010/main" val="0"/>
+              </a:ext>
+            </a:extLst>
+          </a:blip>
+          <a:stretch>
+            <a:fillRect/>
+          </a:stretch>
+        </p:blipFill>
+        <p:spPr>
+          <a:xfrm>
+            <a:off x="1187355" y="450375"/>
+            <a:ext cx="9073593" cy="5587918"/>
+          </a:xfrm>
+          <a:prstGeom prst="rect">
+            <a:avLst/>
+          </a:prstGeom>
+        </p:spPr>
+      </p:pic>
+      <p:sp>
+        <p:nvSpPr>
+          <p:cNvPr id="4" name="TextBox 3">
+            <a:extLst>
+              <a:ext uri="{FF2B5EF4-FFF2-40B4-BE49-F238E27FC236}">
+                <a16:creationId xmlns:a16="http://schemas.microsoft.com/office/drawing/2014/main" id="{32A2EFEE-F463-4A0B-951D-02DE9B902F72}"/>
+              </a:ext>
+            </a:extLst>
+          </p:cNvPr>
+          <p:cNvSpPr txBox="1"/>
+          <p:nvPr/>
+        </p:nvSpPr>
+        <p:spPr>
+          <a:xfrm>
+            <a:off x="1349406" y="6038293"/>
+            <a:ext cx="7670307" cy="369332"/>
+          </a:xfrm>
+          <a:prstGeom prst="rect">
+            <a:avLst/>
+          </a:prstGeom>
+          <a:noFill/>
+        </p:spPr>
+        <p:txBody>
+          <a:bodyPr wrap="square" rtlCol="0">
+            <a:spAutoFit/>
+          </a:bodyPr>
+          <a:lstStyle/>
+          <a:p>
+            <a:r>
+              <a:rPr lang="en-US" dirty="0"/>
+              <a:t> Level 1.1.2 - Student (Sub-module of User (1.1), implemented as class) </a:t>
+            </a:r>
+            <a:endParaRPr lang="en-IN" dirty="0"/>
+          </a:p>
+        </p:txBody>
+      </p:sp>
+    </p:spTree>
+    <p:extLst>
+      <p:ext uri="{BB962C8B-B14F-4D97-AF65-F5344CB8AC3E}">
+        <p14:creationId xmlns:p14="http://schemas.microsoft.com/office/powerpoint/2010/main" val="3165330669"/>
+      </p:ext>
+    </p:extLst>
+  </p:cSld>
+  <p:clrMapOvr>
+    <a:masterClrMapping/>
+  </p:clrMapOvr>
+</p:sld>
+</file>
+
+<file path=ppt/slides/slide17.xml><?xml version="1.0" encoding="utf-8"?>
+<p:sld xmlns:a="http://schemas.openxmlformats.org/drawingml/2006/main" xmlns:r="http://schemas.openxmlformats.org/officeDocument/2006/relationships" xmlns:p="http://schemas.openxmlformats.org/presentationml/2006/main">
+  <p:cSld>
+    <p:spTree>
+      <p:nvGrpSpPr>
+        <p:cNvPr id="1" name=""/>
+        <p:cNvGrpSpPr/>
+        <p:nvPr/>
+      </p:nvGrpSpPr>
+      <p:grpSpPr>
+        <a:xfrm>
+          <a:off x="0" y="0"/>
+          <a:ext cx="0" cy="0"/>
+          <a:chOff x="0" y="0"/>
+          <a:chExt cx="0" cy="0"/>
+        </a:xfrm>
+      </p:grpSpPr>
+      <p:pic>
+        <p:nvPicPr>
+          <p:cNvPr id="3" name="Picture 2">
+            <a:extLst>
+              <a:ext uri="{FF2B5EF4-FFF2-40B4-BE49-F238E27FC236}">
+                <a16:creationId xmlns:a16="http://schemas.microsoft.com/office/drawing/2014/main" id="{872E91D2-B51E-43D6-AD45-B48EF2B237DF}"/>
+              </a:ext>
+            </a:extLst>
+          </p:cNvPr>
+          <p:cNvPicPr>
+            <a:picLocks noChangeAspect="1"/>
+          </p:cNvPicPr>
+          <p:nvPr/>
+        </p:nvPicPr>
+        <p:blipFill>
+          <a:blip r:embed="rId2">
+            <a:extLst>
+              <a:ext uri="{28A0092B-C50C-407E-A947-70E740481C1C}">
+                <a14:useLocalDpi xmlns:a14="http://schemas.microsoft.com/office/drawing/2010/main" val="0"/>
+              </a:ext>
+            </a:extLst>
+          </a:blip>
+          <a:stretch>
+            <a:fillRect/>
+          </a:stretch>
+        </p:blipFill>
+        <p:spPr>
+          <a:xfrm>
+            <a:off x="1282649" y="641445"/>
+            <a:ext cx="8149813" cy="4670212"/>
+          </a:xfrm>
+          <a:prstGeom prst="rect">
+            <a:avLst/>
+          </a:prstGeom>
+        </p:spPr>
+      </p:pic>
+      <p:sp>
+        <p:nvSpPr>
+          <p:cNvPr id="4" name="TextBox 3">
+            <a:extLst>
+              <a:ext uri="{FF2B5EF4-FFF2-40B4-BE49-F238E27FC236}">
+                <a16:creationId xmlns:a16="http://schemas.microsoft.com/office/drawing/2014/main" id="{0EF10CB8-D0DB-4E16-B120-CD7301CF6888}"/>
+              </a:ext>
+            </a:extLst>
+          </p:cNvPr>
+          <p:cNvSpPr txBox="1"/>
+          <p:nvPr/>
+        </p:nvSpPr>
+        <p:spPr>
+          <a:xfrm>
+            <a:off x="825623" y="5433134"/>
+            <a:ext cx="10652550" cy="923330"/>
+          </a:xfrm>
+          <a:prstGeom prst="rect">
+            <a:avLst/>
+          </a:prstGeom>
+          <a:noFill/>
+        </p:spPr>
+        <p:txBody>
+          <a:bodyPr wrap="square" rtlCol="0">
+            <a:spAutoFit/>
+          </a:bodyPr>
+          <a:lstStyle/>
+          <a:p>
+            <a:r>
+              <a:rPr lang="en-US" dirty="0"/>
+              <a:t> Level 1.2.1 - Request Recommendation (Recommendation module (1.2) has 2 functions - Request Recommendation and Recommend, both are implemented via separate interfaces and hence considered as sub-modules.) </a:t>
+            </a:r>
+          </a:p>
+          <a:p>
+            <a:r>
+              <a:rPr lang="en-US" dirty="0"/>
+              <a:t> </a:t>
+            </a:r>
+            <a:endParaRPr lang="en-IN" dirty="0"/>
+          </a:p>
+        </p:txBody>
+      </p:sp>
+    </p:spTree>
+    <p:extLst>
+      <p:ext uri="{BB962C8B-B14F-4D97-AF65-F5344CB8AC3E}">
+        <p14:creationId xmlns:p14="http://schemas.microsoft.com/office/powerpoint/2010/main" val="2249793489"/>
+      </p:ext>
+    </p:extLst>
+  </p:cSld>
+  <p:clrMapOvr>
+    <a:masterClrMapping/>
+  </p:clrMapOvr>
+</p:sld>
+</file>
+
+<file path=ppt/slides/slide18.xml><?xml version="1.0" encoding="utf-8"?>
+<p:sld xmlns:a="http://schemas.openxmlformats.org/drawingml/2006/main" xmlns:r="http://schemas.openxmlformats.org/officeDocument/2006/relationships" xmlns:p="http://schemas.openxmlformats.org/presentationml/2006/main">
+  <p:cSld>
+    <p:spTree>
+      <p:nvGrpSpPr>
+        <p:cNvPr id="1" name=""/>
+        <p:cNvGrpSpPr/>
+        <p:nvPr/>
+      </p:nvGrpSpPr>
+      <p:grpSpPr>
+        <a:xfrm>
+          <a:off x="0" y="0"/>
+          <a:ext cx="0" cy="0"/>
+          <a:chOff x="0" y="0"/>
+          <a:chExt cx="0" cy="0"/>
+        </a:xfrm>
+      </p:grpSpPr>
+      <p:pic>
+        <p:nvPicPr>
+          <p:cNvPr id="3" name="Picture 2">
+            <a:extLst>
+              <a:ext uri="{FF2B5EF4-FFF2-40B4-BE49-F238E27FC236}">
+                <a16:creationId xmlns:a16="http://schemas.microsoft.com/office/drawing/2014/main" id="{236DE233-D7C9-4B92-8E07-D2F6264AC8CC}"/>
+              </a:ext>
+            </a:extLst>
+          </p:cNvPr>
+          <p:cNvPicPr>
+            <a:picLocks noChangeAspect="1"/>
+          </p:cNvPicPr>
+          <p:nvPr/>
+        </p:nvPicPr>
+        <p:blipFill>
+          <a:blip r:embed="rId2">
+            <a:extLst>
+              <a:ext uri="{28A0092B-C50C-407E-A947-70E740481C1C}">
+                <a14:useLocalDpi xmlns:a14="http://schemas.microsoft.com/office/drawing/2010/main" val="0"/>
+              </a:ext>
+            </a:extLst>
+          </a:blip>
+          <a:stretch>
+            <a:fillRect/>
+          </a:stretch>
+        </p:blipFill>
+        <p:spPr>
+          <a:xfrm>
+            <a:off x="1109709" y="1419368"/>
+            <a:ext cx="10050070" cy="3649782"/>
+          </a:xfrm>
+          <a:prstGeom prst="rect">
+            <a:avLst/>
+          </a:prstGeom>
+        </p:spPr>
+      </p:pic>
+      <p:sp>
+        <p:nvSpPr>
+          <p:cNvPr id="4" name="TextBox 3">
+            <a:extLst>
+              <a:ext uri="{FF2B5EF4-FFF2-40B4-BE49-F238E27FC236}">
+                <a16:creationId xmlns:a16="http://schemas.microsoft.com/office/drawing/2014/main" id="{2F900F51-9B96-484A-B02D-CCD1A4476C11}"/>
+              </a:ext>
+            </a:extLst>
+          </p:cNvPr>
+          <p:cNvSpPr txBox="1"/>
+          <p:nvPr/>
+        </p:nvSpPr>
+        <p:spPr>
+          <a:xfrm>
+            <a:off x="1109709" y="5708343"/>
+            <a:ext cx="10182687" cy="655208"/>
+          </a:xfrm>
+          <a:prstGeom prst="rect">
+            <a:avLst/>
+          </a:prstGeom>
+          <a:noFill/>
+        </p:spPr>
+        <p:txBody>
+          <a:bodyPr wrap="square" rtlCol="0">
+            <a:spAutoFit/>
+          </a:bodyPr>
+          <a:lstStyle/>
+          <a:p>
+            <a:r>
+              <a:rPr lang="en-US" dirty="0"/>
+              <a:t>Level 1.2.2 - Recommend (Recommendation module (1.2) has 2 functions - Request Recommendation and        Recommend, both are implemented via separate interfaces and hence considered as sub-modules.) </a:t>
+            </a:r>
+            <a:endParaRPr lang="en-IN" dirty="0"/>
+          </a:p>
+        </p:txBody>
+      </p:sp>
+    </p:spTree>
+    <p:extLst>
+      <p:ext uri="{BB962C8B-B14F-4D97-AF65-F5344CB8AC3E}">
+        <p14:creationId xmlns:p14="http://schemas.microsoft.com/office/powerpoint/2010/main" val="3526035289"/>
+      </p:ext>
+    </p:extLst>
+  </p:cSld>
+  <p:clrMapOvr>
+    <a:masterClrMapping/>
+  </p:clrMapOvr>
+</p:sld>
+</file>
+
+<file path=ppt/slides/slide19.xml><?xml version="1.0" encoding="utf-8"?>
+<p:sld xmlns:a="http://schemas.openxmlformats.org/drawingml/2006/main" xmlns:r="http://schemas.openxmlformats.org/officeDocument/2006/relationships" xmlns:p="http://schemas.openxmlformats.org/presentationml/2006/main">
+  <p:cSld>
+    <p:spTree>
+      <p:nvGrpSpPr>
+        <p:cNvPr id="1" name=""/>
+        <p:cNvGrpSpPr/>
+        <p:nvPr/>
+      </p:nvGrpSpPr>
+      <p:grpSpPr>
+        <a:xfrm>
+          <a:off x="0" y="0"/>
+          <a:ext cx="0" cy="0"/>
+          <a:chOff x="0" y="0"/>
+          <a:chExt cx="0" cy="0"/>
+        </a:xfrm>
+      </p:grpSpPr>
+      <p:pic>
+        <p:nvPicPr>
+          <p:cNvPr id="3" name="Picture 2">
+            <a:extLst>
+              <a:ext uri="{FF2B5EF4-FFF2-40B4-BE49-F238E27FC236}">
+                <a16:creationId xmlns:a16="http://schemas.microsoft.com/office/drawing/2014/main" id="{59B85A43-A51D-496F-B876-BAB7582C27AA}"/>
+              </a:ext>
+            </a:extLst>
+          </p:cNvPr>
+          <p:cNvPicPr>
+            <a:picLocks noChangeAspect="1"/>
+          </p:cNvPicPr>
+          <p:nvPr/>
+        </p:nvPicPr>
+        <p:blipFill>
+          <a:blip r:embed="rId2">
+            <a:extLst>
+              <a:ext uri="{28A0092B-C50C-407E-A947-70E740481C1C}">
+                <a14:useLocalDpi xmlns:a14="http://schemas.microsoft.com/office/drawing/2010/main" val="0"/>
+              </a:ext>
+            </a:extLst>
+          </a:blip>
+          <a:stretch>
+            <a:fillRect/>
+          </a:stretch>
+        </p:blipFill>
+        <p:spPr>
+          <a:xfrm>
+            <a:off x="2197750" y="581828"/>
+            <a:ext cx="7505807" cy="5131511"/>
+          </a:xfrm>
+          <a:prstGeom prst="rect">
+            <a:avLst/>
+          </a:prstGeom>
+        </p:spPr>
+      </p:pic>
+      <p:sp>
+        <p:nvSpPr>
+          <p:cNvPr id="4" name="TextBox 3">
+            <a:extLst>
+              <a:ext uri="{FF2B5EF4-FFF2-40B4-BE49-F238E27FC236}">
+                <a16:creationId xmlns:a16="http://schemas.microsoft.com/office/drawing/2014/main" id="{31AF06E1-0DA1-437F-BFC2-05C90DF3CA92}"/>
+              </a:ext>
+            </a:extLst>
+          </p:cNvPr>
+          <p:cNvSpPr txBox="1"/>
+          <p:nvPr/>
+        </p:nvSpPr>
+        <p:spPr>
+          <a:xfrm>
+            <a:off x="1978291" y="5690331"/>
+            <a:ext cx="9516861" cy="369332"/>
+          </a:xfrm>
+          <a:prstGeom prst="rect">
+            <a:avLst/>
+          </a:prstGeom>
+          <a:noFill/>
+        </p:spPr>
+        <p:txBody>
+          <a:bodyPr wrap="square" rtlCol="0">
+            <a:spAutoFit/>
+          </a:bodyPr>
+          <a:lstStyle/>
+          <a:p>
+            <a:r>
+              <a:rPr lang="en-US"/>
+              <a:t> Level 1.3 -  Chat (Implemented via interfaces only, implemented by Recruiter and Student classes) </a:t>
+            </a:r>
+            <a:endParaRPr lang="en-IN"/>
+          </a:p>
+        </p:txBody>
+      </p:sp>
+    </p:spTree>
+    <p:extLst>
+      <p:ext uri="{BB962C8B-B14F-4D97-AF65-F5344CB8AC3E}">
+        <p14:creationId xmlns:p14="http://schemas.microsoft.com/office/powerpoint/2010/main" val="2037605157"/>
       </p:ext>
     </p:extLst>
   </p:cSld>
@@ -6550,6 +7542,1091 @@
 </p:sld>
 </file>
 
+<file path=ppt/slides/slide20.xml><?xml version="1.0" encoding="utf-8"?>
+<p:sld xmlns:a="http://schemas.openxmlformats.org/drawingml/2006/main" xmlns:r="http://schemas.openxmlformats.org/officeDocument/2006/relationships" xmlns:p="http://schemas.openxmlformats.org/presentationml/2006/main">
+  <p:cSld>
+    <p:spTree>
+      <p:nvGrpSpPr>
+        <p:cNvPr id="1" name=""/>
+        <p:cNvGrpSpPr/>
+        <p:nvPr/>
+      </p:nvGrpSpPr>
+      <p:grpSpPr>
+        <a:xfrm>
+          <a:off x="0" y="0"/>
+          <a:ext cx="0" cy="0"/>
+          <a:chOff x="0" y="0"/>
+          <a:chExt cx="0" cy="0"/>
+        </a:xfrm>
+      </p:grpSpPr>
+      <p:pic>
+        <p:nvPicPr>
+          <p:cNvPr id="3" name="Picture 2">
+            <a:extLst>
+              <a:ext uri="{FF2B5EF4-FFF2-40B4-BE49-F238E27FC236}">
+                <a16:creationId xmlns:a16="http://schemas.microsoft.com/office/drawing/2014/main" id="{019150A1-AC4D-41A0-89C7-57BEA4C3557F}"/>
+              </a:ext>
+            </a:extLst>
+          </p:cNvPr>
+          <p:cNvPicPr>
+            <a:picLocks noChangeAspect="1"/>
+          </p:cNvPicPr>
+          <p:nvPr/>
+        </p:nvPicPr>
+        <p:blipFill>
+          <a:blip r:embed="rId2">
+            <a:extLst>
+              <a:ext uri="{28A0092B-C50C-407E-A947-70E740481C1C}">
+                <a14:useLocalDpi xmlns:a14="http://schemas.microsoft.com/office/drawing/2010/main" val="0"/>
+              </a:ext>
+            </a:extLst>
+          </a:blip>
+          <a:stretch>
+            <a:fillRect/>
+          </a:stretch>
+        </p:blipFill>
+        <p:spPr>
+          <a:xfrm>
+            <a:off x="1575141" y="1405719"/>
+            <a:ext cx="8231371" cy="4125069"/>
+          </a:xfrm>
+          <a:prstGeom prst="rect">
+            <a:avLst/>
+          </a:prstGeom>
+        </p:spPr>
+      </p:pic>
+      <p:sp>
+        <p:nvSpPr>
+          <p:cNvPr id="4" name="TextBox 3">
+            <a:extLst>
+              <a:ext uri="{FF2B5EF4-FFF2-40B4-BE49-F238E27FC236}">
+                <a16:creationId xmlns:a16="http://schemas.microsoft.com/office/drawing/2014/main" id="{AF2D513C-6176-4A3D-8C99-17D662779F9A}"/>
+              </a:ext>
+            </a:extLst>
+          </p:cNvPr>
+          <p:cNvSpPr txBox="1"/>
+          <p:nvPr/>
+        </p:nvSpPr>
+        <p:spPr>
+          <a:xfrm>
+            <a:off x="1575141" y="5530789"/>
+            <a:ext cx="8558074" cy="646331"/>
+          </a:xfrm>
+          <a:prstGeom prst="rect">
+            <a:avLst/>
+          </a:prstGeom>
+          <a:noFill/>
+        </p:spPr>
+        <p:txBody>
+          <a:bodyPr wrap="square" rtlCol="0">
+            <a:spAutoFit/>
+          </a:bodyPr>
+          <a:lstStyle/>
+          <a:p>
+            <a:r>
+              <a:rPr lang="en-US"/>
+              <a:t> Level 1.4 - Administrator module (Implemented as class)  </a:t>
+            </a:r>
+          </a:p>
+          <a:p>
+            <a:r>
+              <a:rPr lang="en-US"/>
+              <a:t> </a:t>
+            </a:r>
+            <a:endParaRPr lang="en-IN"/>
+          </a:p>
+        </p:txBody>
+      </p:sp>
+    </p:spTree>
+    <p:extLst>
+      <p:ext uri="{BB962C8B-B14F-4D97-AF65-F5344CB8AC3E}">
+        <p14:creationId xmlns:p14="http://schemas.microsoft.com/office/powerpoint/2010/main" val="943317959"/>
+      </p:ext>
+    </p:extLst>
+  </p:cSld>
+  <p:clrMapOvr>
+    <a:masterClrMapping/>
+  </p:clrMapOvr>
+</p:sld>
+</file>
+
+<file path=ppt/slides/slide21.xml><?xml version="1.0" encoding="utf-8"?>
+<p:sld xmlns:a="http://schemas.openxmlformats.org/drawingml/2006/main" xmlns:r="http://schemas.openxmlformats.org/officeDocument/2006/relationships" xmlns:p="http://schemas.openxmlformats.org/presentationml/2006/main">
+  <p:cSld>
+    <p:spTree>
+      <p:nvGrpSpPr>
+        <p:cNvPr id="1" name=""/>
+        <p:cNvGrpSpPr/>
+        <p:nvPr/>
+      </p:nvGrpSpPr>
+      <p:grpSpPr>
+        <a:xfrm>
+          <a:off x="0" y="0"/>
+          <a:ext cx="0" cy="0"/>
+          <a:chOff x="0" y="0"/>
+          <a:chExt cx="0" cy="0"/>
+        </a:xfrm>
+      </p:grpSpPr>
+      <p:pic>
+        <p:nvPicPr>
+          <p:cNvPr id="3" name="Picture 2">
+            <a:extLst>
+              <a:ext uri="{FF2B5EF4-FFF2-40B4-BE49-F238E27FC236}">
+                <a16:creationId xmlns:a16="http://schemas.microsoft.com/office/drawing/2014/main" id="{5A7CD0C8-0B50-4EF3-A483-916B2C12DACF}"/>
+              </a:ext>
+            </a:extLst>
+          </p:cNvPr>
+          <p:cNvPicPr>
+            <a:picLocks noChangeAspect="1"/>
+          </p:cNvPicPr>
+          <p:nvPr/>
+        </p:nvPicPr>
+        <p:blipFill>
+          <a:blip r:embed="rId2">
+            <a:extLst>
+              <a:ext uri="{28A0092B-C50C-407E-A947-70E740481C1C}">
+                <a14:useLocalDpi xmlns:a14="http://schemas.microsoft.com/office/drawing/2010/main" val="0"/>
+              </a:ext>
+            </a:extLst>
+          </a:blip>
+          <a:stretch>
+            <a:fillRect/>
+          </a:stretch>
+        </p:blipFill>
+        <p:spPr>
+          <a:xfrm>
+            <a:off x="1127464" y="1610435"/>
+            <a:ext cx="10256769" cy="2388359"/>
+          </a:xfrm>
+          <a:prstGeom prst="rect">
+            <a:avLst/>
+          </a:prstGeom>
+        </p:spPr>
+      </p:pic>
+      <p:sp>
+        <p:nvSpPr>
+          <p:cNvPr id="4" name="TextBox 3">
+            <a:extLst>
+              <a:ext uri="{FF2B5EF4-FFF2-40B4-BE49-F238E27FC236}">
+                <a16:creationId xmlns:a16="http://schemas.microsoft.com/office/drawing/2014/main" id="{E14986F5-C009-4B20-BD85-86C3E5D5F188}"/>
+              </a:ext>
+            </a:extLst>
+          </p:cNvPr>
+          <p:cNvSpPr txBox="1"/>
+          <p:nvPr/>
+        </p:nvSpPr>
+        <p:spPr>
+          <a:xfrm>
+            <a:off x="1127465" y="5140171"/>
+            <a:ext cx="5885895" cy="923330"/>
+          </a:xfrm>
+          <a:prstGeom prst="rect">
+            <a:avLst/>
+          </a:prstGeom>
+          <a:noFill/>
+        </p:spPr>
+        <p:txBody>
+          <a:bodyPr wrap="square" rtlCol="0">
+            <a:spAutoFit/>
+          </a:bodyPr>
+          <a:lstStyle/>
+          <a:p>
+            <a:r>
+              <a:rPr lang="en-US" dirty="0"/>
+              <a:t> Level 1.5 - Server module (Implemented as class) </a:t>
+            </a:r>
+          </a:p>
+          <a:p>
+            <a:r>
+              <a:rPr lang="en-US" dirty="0"/>
+              <a:t> </a:t>
+            </a:r>
+          </a:p>
+          <a:p>
+            <a:r>
+              <a:rPr lang="en-US" dirty="0"/>
+              <a:t> </a:t>
+            </a:r>
+            <a:endParaRPr lang="en-IN" dirty="0"/>
+          </a:p>
+        </p:txBody>
+      </p:sp>
+    </p:spTree>
+    <p:extLst>
+      <p:ext uri="{BB962C8B-B14F-4D97-AF65-F5344CB8AC3E}">
+        <p14:creationId xmlns:p14="http://schemas.microsoft.com/office/powerpoint/2010/main" val="1514012170"/>
+      </p:ext>
+    </p:extLst>
+  </p:cSld>
+  <p:clrMapOvr>
+    <a:masterClrMapping/>
+  </p:clrMapOvr>
+</p:sld>
+</file>
+
+<file path=ppt/slides/slide22.xml><?xml version="1.0" encoding="utf-8"?>
+<p:sld xmlns:a="http://schemas.openxmlformats.org/drawingml/2006/main" xmlns:r="http://schemas.openxmlformats.org/officeDocument/2006/relationships" xmlns:p="http://schemas.openxmlformats.org/presentationml/2006/main">
+  <p:cSld>
+    <p:spTree>
+      <p:nvGrpSpPr>
+        <p:cNvPr id="1" name=""/>
+        <p:cNvGrpSpPr/>
+        <p:nvPr/>
+      </p:nvGrpSpPr>
+      <p:grpSpPr>
+        <a:xfrm>
+          <a:off x="0" y="0"/>
+          <a:ext cx="0" cy="0"/>
+          <a:chOff x="0" y="0"/>
+          <a:chExt cx="0" cy="0"/>
+        </a:xfrm>
+      </p:grpSpPr>
+      <p:pic>
+        <p:nvPicPr>
+          <p:cNvPr id="3" name="Picture 2">
+            <a:extLst>
+              <a:ext uri="{FF2B5EF4-FFF2-40B4-BE49-F238E27FC236}">
+                <a16:creationId xmlns:a16="http://schemas.microsoft.com/office/drawing/2014/main" id="{F0E855AB-3A30-48C7-99E3-AF99827F306C}"/>
+              </a:ext>
+            </a:extLst>
+          </p:cNvPr>
+          <p:cNvPicPr>
+            <a:picLocks noChangeAspect="1"/>
+          </p:cNvPicPr>
+          <p:nvPr/>
+        </p:nvPicPr>
+        <p:blipFill>
+          <a:blip r:embed="rId2">
+            <a:extLst>
+              <a:ext uri="{28A0092B-C50C-407E-A947-70E740481C1C}">
+                <a14:useLocalDpi xmlns:a14="http://schemas.microsoft.com/office/drawing/2010/main" val="0"/>
+              </a:ext>
+            </a:extLst>
+          </a:blip>
+          <a:stretch>
+            <a:fillRect/>
+          </a:stretch>
+        </p:blipFill>
+        <p:spPr>
+          <a:xfrm>
+            <a:off x="1134875" y="1427116"/>
+            <a:ext cx="8430802" cy="2867425"/>
+          </a:xfrm>
+          <a:prstGeom prst="rect">
+            <a:avLst/>
+          </a:prstGeom>
+        </p:spPr>
+      </p:pic>
+      <p:sp>
+        <p:nvSpPr>
+          <p:cNvPr id="4" name="TextBox 3">
+            <a:extLst>
+              <a:ext uri="{FF2B5EF4-FFF2-40B4-BE49-F238E27FC236}">
+                <a16:creationId xmlns:a16="http://schemas.microsoft.com/office/drawing/2014/main" id="{9F610B53-46B3-4A24-A6C6-2BC20139957B}"/>
+              </a:ext>
+            </a:extLst>
+          </p:cNvPr>
+          <p:cNvSpPr txBox="1"/>
+          <p:nvPr/>
+        </p:nvSpPr>
+        <p:spPr>
+          <a:xfrm>
+            <a:off x="1134875" y="5504155"/>
+            <a:ext cx="8930936" cy="369332"/>
+          </a:xfrm>
+          <a:prstGeom prst="rect">
+            <a:avLst/>
+          </a:prstGeom>
+          <a:noFill/>
+        </p:spPr>
+        <p:txBody>
+          <a:bodyPr wrap="square" rtlCol="0">
+            <a:spAutoFit/>
+          </a:bodyPr>
+          <a:lstStyle/>
+          <a:p>
+            <a:r>
+              <a:rPr lang="en-US"/>
+              <a:t> Level 1.6 - Information module (module used to display web pages for career information) </a:t>
+            </a:r>
+            <a:endParaRPr lang="en-IN"/>
+          </a:p>
+        </p:txBody>
+      </p:sp>
+    </p:spTree>
+    <p:extLst>
+      <p:ext uri="{BB962C8B-B14F-4D97-AF65-F5344CB8AC3E}">
+        <p14:creationId xmlns:p14="http://schemas.microsoft.com/office/powerpoint/2010/main" val="3745376998"/>
+      </p:ext>
+    </p:extLst>
+  </p:cSld>
+  <p:clrMapOvr>
+    <a:masterClrMapping/>
+  </p:clrMapOvr>
+</p:sld>
+</file>
+
+<file path=ppt/slides/slide23.xml><?xml version="1.0" encoding="utf-8"?>
+<p:sld xmlns:a="http://schemas.openxmlformats.org/drawingml/2006/main" xmlns:r="http://schemas.openxmlformats.org/officeDocument/2006/relationships" xmlns:p="http://schemas.openxmlformats.org/presentationml/2006/main">
+  <p:cSld>
+    <p:spTree>
+      <p:nvGrpSpPr>
+        <p:cNvPr id="1" name=""/>
+        <p:cNvGrpSpPr/>
+        <p:nvPr/>
+      </p:nvGrpSpPr>
+      <p:grpSpPr>
+        <a:xfrm>
+          <a:off x="0" y="0"/>
+          <a:ext cx="0" cy="0"/>
+          <a:chOff x="0" y="0"/>
+          <a:chExt cx="0" cy="0"/>
+        </a:xfrm>
+      </p:grpSpPr>
+      <p:pic>
+        <p:nvPicPr>
+          <p:cNvPr id="3" name="Picture 2">
+            <a:extLst>
+              <a:ext uri="{FF2B5EF4-FFF2-40B4-BE49-F238E27FC236}">
+                <a16:creationId xmlns:a16="http://schemas.microsoft.com/office/drawing/2014/main" id="{0F1572AE-5CC9-4B31-8612-C8DB99C4C04E}"/>
+              </a:ext>
+            </a:extLst>
+          </p:cNvPr>
+          <p:cNvPicPr>
+            <a:picLocks noChangeAspect="1"/>
+          </p:cNvPicPr>
+          <p:nvPr/>
+        </p:nvPicPr>
+        <p:blipFill>
+          <a:blip r:embed="rId2">
+            <a:extLst>
+              <a:ext uri="{28A0092B-C50C-407E-A947-70E740481C1C}">
+                <a14:useLocalDpi xmlns:a14="http://schemas.microsoft.com/office/drawing/2010/main" val="0"/>
+              </a:ext>
+            </a:extLst>
+          </a:blip>
+          <a:stretch>
+            <a:fillRect/>
+          </a:stretch>
+        </p:blipFill>
+        <p:spPr>
+          <a:xfrm>
+            <a:off x="1216241" y="1285688"/>
+            <a:ext cx="9463297" cy="4286624"/>
+          </a:xfrm>
+          <a:prstGeom prst="rect">
+            <a:avLst/>
+          </a:prstGeom>
+        </p:spPr>
+      </p:pic>
+      <p:sp>
+        <p:nvSpPr>
+          <p:cNvPr id="4" name="TextBox 3">
+            <a:extLst>
+              <a:ext uri="{FF2B5EF4-FFF2-40B4-BE49-F238E27FC236}">
+                <a16:creationId xmlns:a16="http://schemas.microsoft.com/office/drawing/2014/main" id="{F7253E62-E15E-43B1-80AF-186BEEB9F65A}"/>
+              </a:ext>
+            </a:extLst>
+          </p:cNvPr>
+          <p:cNvSpPr txBox="1"/>
+          <p:nvPr/>
+        </p:nvSpPr>
+        <p:spPr>
+          <a:xfrm>
+            <a:off x="1154097" y="754602"/>
+            <a:ext cx="7315200" cy="397032"/>
+          </a:xfrm>
+          <a:prstGeom prst="rect">
+            <a:avLst/>
+          </a:prstGeom>
+          <a:noFill/>
+        </p:spPr>
+        <p:txBody>
+          <a:bodyPr wrap="square" rtlCol="0">
+            <a:spAutoFit/>
+          </a:bodyPr>
+          <a:lstStyle/>
+          <a:p>
+            <a:pPr>
+              <a:lnSpc>
+                <a:spcPct val="90000"/>
+              </a:lnSpc>
+              <a:spcBef>
+                <a:spcPts val="1000"/>
+              </a:spcBef>
+            </a:pPr>
+            <a:r>
+              <a:rPr lang="en-IN" sz="2200" b="1" dirty="0">
+                <a:solidFill>
+                  <a:srgbClr val="123E62"/>
+                </a:solidFill>
+              </a:rPr>
+              <a:t>LEVEL 2 DIAGRAMS</a:t>
+            </a:r>
+          </a:p>
+        </p:txBody>
+      </p:sp>
+      <p:sp>
+        <p:nvSpPr>
+          <p:cNvPr id="5" name="TextBox 4">
+            <a:extLst>
+              <a:ext uri="{FF2B5EF4-FFF2-40B4-BE49-F238E27FC236}">
+                <a16:creationId xmlns:a16="http://schemas.microsoft.com/office/drawing/2014/main" id="{9C8A159F-5AE4-4FEF-A3C9-68D123AE8F61}"/>
+              </a:ext>
+            </a:extLst>
+          </p:cNvPr>
+          <p:cNvSpPr txBox="1"/>
+          <p:nvPr/>
+        </p:nvSpPr>
+        <p:spPr>
+          <a:xfrm>
+            <a:off x="1154097" y="5572312"/>
+            <a:ext cx="9348186" cy="369332"/>
+          </a:xfrm>
+          <a:prstGeom prst="rect">
+            <a:avLst/>
+          </a:prstGeom>
+          <a:noFill/>
+        </p:spPr>
+        <p:txBody>
+          <a:bodyPr wrap="square" rtlCol="0">
+            <a:spAutoFit/>
+          </a:bodyPr>
+          <a:lstStyle/>
+          <a:p>
+            <a:r>
+              <a:rPr lang="en-IN"/>
+              <a:t> Level 2.1 - User login </a:t>
+            </a:r>
+            <a:endParaRPr lang="en-IN" dirty="0"/>
+          </a:p>
+        </p:txBody>
+      </p:sp>
+    </p:spTree>
+    <p:extLst>
+      <p:ext uri="{BB962C8B-B14F-4D97-AF65-F5344CB8AC3E}">
+        <p14:creationId xmlns:p14="http://schemas.microsoft.com/office/powerpoint/2010/main" val="3571913051"/>
+      </p:ext>
+    </p:extLst>
+  </p:cSld>
+  <p:clrMapOvr>
+    <a:masterClrMapping/>
+  </p:clrMapOvr>
+</p:sld>
+</file>
+
+<file path=ppt/slides/slide24.xml><?xml version="1.0" encoding="utf-8"?>
+<p:sld xmlns:a="http://schemas.openxmlformats.org/drawingml/2006/main" xmlns:r="http://schemas.openxmlformats.org/officeDocument/2006/relationships" xmlns:p="http://schemas.openxmlformats.org/presentationml/2006/main">
+  <p:cSld>
+    <p:spTree>
+      <p:nvGrpSpPr>
+        <p:cNvPr id="1" name=""/>
+        <p:cNvGrpSpPr/>
+        <p:nvPr/>
+      </p:nvGrpSpPr>
+      <p:grpSpPr>
+        <a:xfrm>
+          <a:off x="0" y="0"/>
+          <a:ext cx="0" cy="0"/>
+          <a:chOff x="0" y="0"/>
+          <a:chExt cx="0" cy="0"/>
+        </a:xfrm>
+      </p:grpSpPr>
+      <p:pic>
+        <p:nvPicPr>
+          <p:cNvPr id="3" name="Picture 2">
+            <a:extLst>
+              <a:ext uri="{FF2B5EF4-FFF2-40B4-BE49-F238E27FC236}">
+                <a16:creationId xmlns:a16="http://schemas.microsoft.com/office/drawing/2014/main" id="{36270BB3-2622-4BD2-8A0F-25E0DD0A10B2}"/>
+              </a:ext>
+            </a:extLst>
+          </p:cNvPr>
+          <p:cNvPicPr>
+            <a:picLocks noChangeAspect="1"/>
+          </p:cNvPicPr>
+          <p:nvPr/>
+        </p:nvPicPr>
+        <p:blipFill>
+          <a:blip r:embed="rId2">
+            <a:extLst>
+              <a:ext uri="{28A0092B-C50C-407E-A947-70E740481C1C}">
+                <a14:useLocalDpi xmlns:a14="http://schemas.microsoft.com/office/drawing/2010/main" val="0"/>
+              </a:ext>
+            </a:extLst>
+          </a:blip>
+          <a:stretch>
+            <a:fillRect/>
+          </a:stretch>
+        </p:blipFill>
+        <p:spPr>
+          <a:xfrm>
+            <a:off x="1038687" y="789998"/>
+            <a:ext cx="8603309" cy="4573571"/>
+          </a:xfrm>
+          <a:prstGeom prst="rect">
+            <a:avLst/>
+          </a:prstGeom>
+        </p:spPr>
+      </p:pic>
+      <p:sp>
+        <p:nvSpPr>
+          <p:cNvPr id="4" name="TextBox 3">
+            <a:extLst>
+              <a:ext uri="{FF2B5EF4-FFF2-40B4-BE49-F238E27FC236}">
+                <a16:creationId xmlns:a16="http://schemas.microsoft.com/office/drawing/2014/main" id="{635FD6AF-2B15-4F8F-99BF-4F882455B2A3}"/>
+              </a:ext>
+            </a:extLst>
+          </p:cNvPr>
+          <p:cNvSpPr txBox="1"/>
+          <p:nvPr/>
+        </p:nvSpPr>
+        <p:spPr>
+          <a:xfrm>
+            <a:off x="1038688" y="5548544"/>
+            <a:ext cx="7847860" cy="369332"/>
+          </a:xfrm>
+          <a:prstGeom prst="rect">
+            <a:avLst/>
+          </a:prstGeom>
+          <a:noFill/>
+        </p:spPr>
+        <p:txBody>
+          <a:bodyPr wrap="square" rtlCol="0">
+            <a:spAutoFit/>
+          </a:bodyPr>
+          <a:lstStyle/>
+          <a:p>
+            <a:r>
+              <a:rPr lang="en-US" dirty="0"/>
+              <a:t> Level 2.2 - Request for forgot password </a:t>
+            </a:r>
+            <a:endParaRPr lang="en-IN" dirty="0"/>
+          </a:p>
+        </p:txBody>
+      </p:sp>
+    </p:spTree>
+    <p:extLst>
+      <p:ext uri="{BB962C8B-B14F-4D97-AF65-F5344CB8AC3E}">
+        <p14:creationId xmlns:p14="http://schemas.microsoft.com/office/powerpoint/2010/main" val="1065549631"/>
+      </p:ext>
+    </p:extLst>
+  </p:cSld>
+  <p:clrMapOvr>
+    <a:masterClrMapping/>
+  </p:clrMapOvr>
+</p:sld>
+</file>
+
+<file path=ppt/slides/slide25.xml><?xml version="1.0" encoding="utf-8"?>
+<p:sld xmlns:a="http://schemas.openxmlformats.org/drawingml/2006/main" xmlns:r="http://schemas.openxmlformats.org/officeDocument/2006/relationships" xmlns:p="http://schemas.openxmlformats.org/presentationml/2006/main">
+  <p:cSld>
+    <p:spTree>
+      <p:nvGrpSpPr>
+        <p:cNvPr id="1" name=""/>
+        <p:cNvGrpSpPr/>
+        <p:nvPr/>
+      </p:nvGrpSpPr>
+      <p:grpSpPr>
+        <a:xfrm>
+          <a:off x="0" y="0"/>
+          <a:ext cx="0" cy="0"/>
+          <a:chOff x="0" y="0"/>
+          <a:chExt cx="0" cy="0"/>
+        </a:xfrm>
+      </p:grpSpPr>
+      <p:pic>
+        <p:nvPicPr>
+          <p:cNvPr id="3" name="Picture 2">
+            <a:extLst>
+              <a:ext uri="{FF2B5EF4-FFF2-40B4-BE49-F238E27FC236}">
+                <a16:creationId xmlns:a16="http://schemas.microsoft.com/office/drawing/2014/main" id="{A1926A20-1A49-4C67-9376-FEC88F4C5906}"/>
+              </a:ext>
+            </a:extLst>
+          </p:cNvPr>
+          <p:cNvPicPr>
+            <a:picLocks noChangeAspect="1"/>
+          </p:cNvPicPr>
+          <p:nvPr/>
+        </p:nvPicPr>
+        <p:blipFill>
+          <a:blip r:embed="rId2">
+            <a:extLst>
+              <a:ext uri="{28A0092B-C50C-407E-A947-70E740481C1C}">
+                <a14:useLocalDpi xmlns:a14="http://schemas.microsoft.com/office/drawing/2010/main" val="0"/>
+              </a:ext>
+            </a:extLst>
+          </a:blip>
+          <a:stretch>
+            <a:fillRect/>
+          </a:stretch>
+        </p:blipFill>
+        <p:spPr>
+          <a:xfrm>
+            <a:off x="1606858" y="641444"/>
+            <a:ext cx="5549958" cy="5342105"/>
+          </a:xfrm>
+          <a:prstGeom prst="rect">
+            <a:avLst/>
+          </a:prstGeom>
+        </p:spPr>
+      </p:pic>
+      <p:sp>
+        <p:nvSpPr>
+          <p:cNvPr id="4" name="TextBox 3">
+            <a:extLst>
+              <a:ext uri="{FF2B5EF4-FFF2-40B4-BE49-F238E27FC236}">
+                <a16:creationId xmlns:a16="http://schemas.microsoft.com/office/drawing/2014/main" id="{303D7E02-D3D8-4AFE-86AB-E9DEC06265EE}"/>
+              </a:ext>
+            </a:extLst>
+          </p:cNvPr>
+          <p:cNvSpPr txBox="1"/>
+          <p:nvPr/>
+        </p:nvSpPr>
+        <p:spPr>
+          <a:xfrm>
+            <a:off x="1606858" y="5983550"/>
+            <a:ext cx="7057748" cy="369332"/>
+          </a:xfrm>
+          <a:prstGeom prst="rect">
+            <a:avLst/>
+          </a:prstGeom>
+          <a:noFill/>
+        </p:spPr>
+        <p:txBody>
+          <a:bodyPr wrap="square" rtlCol="0">
+            <a:spAutoFit/>
+          </a:bodyPr>
+          <a:lstStyle/>
+          <a:p>
+            <a:r>
+              <a:rPr lang="en-US"/>
+              <a:t> Level 2.3 - Opt out request by any privileged user </a:t>
+            </a:r>
+            <a:endParaRPr lang="en-IN"/>
+          </a:p>
+        </p:txBody>
+      </p:sp>
+    </p:spTree>
+    <p:extLst>
+      <p:ext uri="{BB962C8B-B14F-4D97-AF65-F5344CB8AC3E}">
+        <p14:creationId xmlns:p14="http://schemas.microsoft.com/office/powerpoint/2010/main" val="129863468"/>
+      </p:ext>
+    </p:extLst>
+  </p:cSld>
+  <p:clrMapOvr>
+    <a:masterClrMapping/>
+  </p:clrMapOvr>
+</p:sld>
+</file>
+
+<file path=ppt/slides/slide26.xml><?xml version="1.0" encoding="utf-8"?>
+<p:sld xmlns:a="http://schemas.openxmlformats.org/drawingml/2006/main" xmlns:r="http://schemas.openxmlformats.org/officeDocument/2006/relationships" xmlns:p="http://schemas.openxmlformats.org/presentationml/2006/main">
+  <p:cSld>
+    <p:spTree>
+      <p:nvGrpSpPr>
+        <p:cNvPr id="1" name=""/>
+        <p:cNvGrpSpPr/>
+        <p:nvPr/>
+      </p:nvGrpSpPr>
+      <p:grpSpPr>
+        <a:xfrm>
+          <a:off x="0" y="0"/>
+          <a:ext cx="0" cy="0"/>
+          <a:chOff x="0" y="0"/>
+          <a:chExt cx="0" cy="0"/>
+        </a:xfrm>
+      </p:grpSpPr>
+      <p:pic>
+        <p:nvPicPr>
+          <p:cNvPr id="3" name="Picture 2">
+            <a:extLst>
+              <a:ext uri="{FF2B5EF4-FFF2-40B4-BE49-F238E27FC236}">
+                <a16:creationId xmlns:a16="http://schemas.microsoft.com/office/drawing/2014/main" id="{C0EDF3CD-721B-41F2-8E13-137832E9B482}"/>
+              </a:ext>
+            </a:extLst>
+          </p:cNvPr>
+          <p:cNvPicPr>
+            <a:picLocks noChangeAspect="1"/>
+          </p:cNvPicPr>
+          <p:nvPr/>
+        </p:nvPicPr>
+        <p:blipFill>
+          <a:blip r:embed="rId2">
+            <a:extLst>
+              <a:ext uri="{28A0092B-C50C-407E-A947-70E740481C1C}">
+                <a14:useLocalDpi xmlns:a14="http://schemas.microsoft.com/office/drawing/2010/main" val="0"/>
+              </a:ext>
+            </a:extLst>
+          </a:blip>
+          <a:stretch>
+            <a:fillRect/>
+          </a:stretch>
+        </p:blipFill>
+        <p:spPr>
+          <a:xfrm>
+            <a:off x="323664" y="1692322"/>
+            <a:ext cx="11544672" cy="3330054"/>
+          </a:xfrm>
+          <a:prstGeom prst="rect">
+            <a:avLst/>
+          </a:prstGeom>
+        </p:spPr>
+      </p:pic>
+      <p:sp>
+        <p:nvSpPr>
+          <p:cNvPr id="4" name="TextBox 3">
+            <a:extLst>
+              <a:ext uri="{FF2B5EF4-FFF2-40B4-BE49-F238E27FC236}">
+                <a16:creationId xmlns:a16="http://schemas.microsoft.com/office/drawing/2014/main" id="{E306F48D-D120-462D-B652-A56FE1B966B7}"/>
+              </a:ext>
+            </a:extLst>
+          </p:cNvPr>
+          <p:cNvSpPr txBox="1"/>
+          <p:nvPr/>
+        </p:nvSpPr>
+        <p:spPr>
+          <a:xfrm>
+            <a:off x="1029810" y="5528115"/>
+            <a:ext cx="8930936" cy="369332"/>
+          </a:xfrm>
+          <a:prstGeom prst="rect">
+            <a:avLst/>
+          </a:prstGeom>
+          <a:noFill/>
+        </p:spPr>
+        <p:txBody>
+          <a:bodyPr wrap="square" rtlCol="0">
+            <a:spAutoFit/>
+          </a:bodyPr>
+          <a:lstStyle/>
+          <a:p>
+            <a:r>
+              <a:rPr lang="en-US"/>
+              <a:t> Level 2.4 - Update details of any privileged user </a:t>
+            </a:r>
+            <a:endParaRPr lang="en-IN"/>
+          </a:p>
+        </p:txBody>
+      </p:sp>
+    </p:spTree>
+    <p:extLst>
+      <p:ext uri="{BB962C8B-B14F-4D97-AF65-F5344CB8AC3E}">
+        <p14:creationId xmlns:p14="http://schemas.microsoft.com/office/powerpoint/2010/main" val="1109713795"/>
+      </p:ext>
+    </p:extLst>
+  </p:cSld>
+  <p:clrMapOvr>
+    <a:masterClrMapping/>
+  </p:clrMapOvr>
+</p:sld>
+</file>
+
+<file path=ppt/slides/slide27.xml><?xml version="1.0" encoding="utf-8"?>
+<p:sld xmlns:a="http://schemas.openxmlformats.org/drawingml/2006/main" xmlns:r="http://schemas.openxmlformats.org/officeDocument/2006/relationships" xmlns:p="http://schemas.openxmlformats.org/presentationml/2006/main">
+  <p:cSld>
+    <p:spTree>
+      <p:nvGrpSpPr>
+        <p:cNvPr id="1" name=""/>
+        <p:cNvGrpSpPr/>
+        <p:nvPr/>
+      </p:nvGrpSpPr>
+      <p:grpSpPr>
+        <a:xfrm>
+          <a:off x="0" y="0"/>
+          <a:ext cx="0" cy="0"/>
+          <a:chOff x="0" y="0"/>
+          <a:chExt cx="0" cy="0"/>
+        </a:xfrm>
+      </p:grpSpPr>
+      <p:pic>
+        <p:nvPicPr>
+          <p:cNvPr id="3" name="Picture 2">
+            <a:extLst>
+              <a:ext uri="{FF2B5EF4-FFF2-40B4-BE49-F238E27FC236}">
+                <a16:creationId xmlns:a16="http://schemas.microsoft.com/office/drawing/2014/main" id="{88BC1A36-32A5-4F9A-BA0A-7AC36253B73B}"/>
+              </a:ext>
+            </a:extLst>
+          </p:cNvPr>
+          <p:cNvPicPr>
+            <a:picLocks noChangeAspect="1"/>
+          </p:cNvPicPr>
+          <p:nvPr/>
+        </p:nvPicPr>
+        <p:blipFill>
+          <a:blip r:embed="rId2">
+            <a:extLst>
+              <a:ext uri="{28A0092B-C50C-407E-A947-70E740481C1C}">
+                <a14:useLocalDpi xmlns:a14="http://schemas.microsoft.com/office/drawing/2010/main" val="0"/>
+              </a:ext>
+            </a:extLst>
+          </a:blip>
+          <a:stretch>
+            <a:fillRect/>
+          </a:stretch>
+        </p:blipFill>
+        <p:spPr>
+          <a:xfrm>
+            <a:off x="985421" y="805218"/>
+            <a:ext cx="10323296" cy="4899546"/>
+          </a:xfrm>
+          <a:prstGeom prst="rect">
+            <a:avLst/>
+          </a:prstGeom>
+        </p:spPr>
+      </p:pic>
+      <p:sp>
+        <p:nvSpPr>
+          <p:cNvPr id="4" name="TextBox 3">
+            <a:extLst>
+              <a:ext uri="{FF2B5EF4-FFF2-40B4-BE49-F238E27FC236}">
+                <a16:creationId xmlns:a16="http://schemas.microsoft.com/office/drawing/2014/main" id="{AD8B776B-D68C-40F5-B1C4-C88A06C147C9}"/>
+              </a:ext>
+            </a:extLst>
+          </p:cNvPr>
+          <p:cNvSpPr txBox="1"/>
+          <p:nvPr/>
+        </p:nvSpPr>
+        <p:spPr>
+          <a:xfrm>
+            <a:off x="985421" y="5877017"/>
+            <a:ext cx="8300622" cy="369332"/>
+          </a:xfrm>
+          <a:prstGeom prst="rect">
+            <a:avLst/>
+          </a:prstGeom>
+          <a:noFill/>
+        </p:spPr>
+        <p:txBody>
+          <a:bodyPr wrap="square" rtlCol="0">
+            <a:spAutoFit/>
+          </a:bodyPr>
+          <a:lstStyle/>
+          <a:p>
+            <a:r>
+              <a:rPr lang="en-US"/>
+              <a:t> Level 2.5 - Registration of any privileged user </a:t>
+            </a:r>
+            <a:endParaRPr lang="en-IN"/>
+          </a:p>
+        </p:txBody>
+      </p:sp>
+    </p:spTree>
+    <p:extLst>
+      <p:ext uri="{BB962C8B-B14F-4D97-AF65-F5344CB8AC3E}">
+        <p14:creationId xmlns:p14="http://schemas.microsoft.com/office/powerpoint/2010/main" val="4199485710"/>
+      </p:ext>
+    </p:extLst>
+  </p:cSld>
+  <p:clrMapOvr>
+    <a:masterClrMapping/>
+  </p:clrMapOvr>
+</p:sld>
+</file>
+
+<file path=ppt/slides/slide28.xml><?xml version="1.0" encoding="utf-8"?>
+<p:sld xmlns:a="http://schemas.openxmlformats.org/drawingml/2006/main" xmlns:r="http://schemas.openxmlformats.org/officeDocument/2006/relationships" xmlns:p="http://schemas.openxmlformats.org/presentationml/2006/main">
+  <p:cSld>
+    <p:spTree>
+      <p:nvGrpSpPr>
+        <p:cNvPr id="1" name=""/>
+        <p:cNvGrpSpPr/>
+        <p:nvPr/>
+      </p:nvGrpSpPr>
+      <p:grpSpPr>
+        <a:xfrm>
+          <a:off x="0" y="0"/>
+          <a:ext cx="0" cy="0"/>
+          <a:chOff x="0" y="0"/>
+          <a:chExt cx="0" cy="0"/>
+        </a:xfrm>
+      </p:grpSpPr>
+      <p:pic>
+        <p:nvPicPr>
+          <p:cNvPr id="3" name="Picture 2">
+            <a:extLst>
+              <a:ext uri="{FF2B5EF4-FFF2-40B4-BE49-F238E27FC236}">
+                <a16:creationId xmlns:a16="http://schemas.microsoft.com/office/drawing/2014/main" id="{5D0112E7-68AD-4065-8342-740E4E1CD048}"/>
+              </a:ext>
+            </a:extLst>
+          </p:cNvPr>
+          <p:cNvPicPr>
+            <a:picLocks noChangeAspect="1"/>
+          </p:cNvPicPr>
+          <p:nvPr/>
+        </p:nvPicPr>
+        <p:blipFill>
+          <a:blip r:embed="rId2">
+            <a:extLst>
+              <a:ext uri="{28A0092B-C50C-407E-A947-70E740481C1C}">
+                <a14:useLocalDpi xmlns:a14="http://schemas.microsoft.com/office/drawing/2010/main" val="0"/>
+              </a:ext>
+            </a:extLst>
+          </a:blip>
+          <a:stretch>
+            <a:fillRect/>
+          </a:stretch>
+        </p:blipFill>
+        <p:spPr>
+          <a:xfrm>
+            <a:off x="1392464" y="1086606"/>
+            <a:ext cx="8167986" cy="4248599"/>
+          </a:xfrm>
+          <a:prstGeom prst="rect">
+            <a:avLst/>
+          </a:prstGeom>
+        </p:spPr>
+      </p:pic>
+      <p:sp>
+        <p:nvSpPr>
+          <p:cNvPr id="4" name="TextBox 3">
+            <a:extLst>
+              <a:ext uri="{FF2B5EF4-FFF2-40B4-BE49-F238E27FC236}">
+                <a16:creationId xmlns:a16="http://schemas.microsoft.com/office/drawing/2014/main" id="{00B1B6E8-3C86-46CB-9CD4-27680607702F}"/>
+              </a:ext>
+            </a:extLst>
+          </p:cNvPr>
+          <p:cNvSpPr txBox="1"/>
+          <p:nvPr/>
+        </p:nvSpPr>
+        <p:spPr>
+          <a:xfrm>
+            <a:off x="1597180" y="5402062"/>
+            <a:ext cx="7963270" cy="369332"/>
+          </a:xfrm>
+          <a:prstGeom prst="rect">
+            <a:avLst/>
+          </a:prstGeom>
+          <a:noFill/>
+        </p:spPr>
+        <p:txBody>
+          <a:bodyPr wrap="square" rtlCol="0">
+            <a:spAutoFit/>
+          </a:bodyPr>
+          <a:lstStyle/>
+          <a:p>
+            <a:r>
+              <a:rPr lang="en-US"/>
+              <a:t> Level 2.6 - Add new student by college </a:t>
+            </a:r>
+            <a:endParaRPr lang="en-IN"/>
+          </a:p>
+        </p:txBody>
+      </p:sp>
+    </p:spTree>
+    <p:extLst>
+      <p:ext uri="{BB962C8B-B14F-4D97-AF65-F5344CB8AC3E}">
+        <p14:creationId xmlns:p14="http://schemas.microsoft.com/office/powerpoint/2010/main" val="2317918205"/>
+      </p:ext>
+    </p:extLst>
+  </p:cSld>
+  <p:clrMapOvr>
+    <a:masterClrMapping/>
+  </p:clrMapOvr>
+</p:sld>
+</file>
+
+<file path=ppt/slides/slide29.xml><?xml version="1.0" encoding="utf-8"?>
+<p:sld xmlns:a="http://schemas.openxmlformats.org/drawingml/2006/main" xmlns:r="http://schemas.openxmlformats.org/officeDocument/2006/relationships" xmlns:p="http://schemas.openxmlformats.org/presentationml/2006/main">
+  <p:cSld>
+    <p:spTree>
+      <p:nvGrpSpPr>
+        <p:cNvPr id="1" name=""/>
+        <p:cNvGrpSpPr/>
+        <p:nvPr/>
+      </p:nvGrpSpPr>
+      <p:grpSpPr>
+        <a:xfrm>
+          <a:off x="0" y="0"/>
+          <a:ext cx="0" cy="0"/>
+          <a:chOff x="0" y="0"/>
+          <a:chExt cx="0" cy="0"/>
+        </a:xfrm>
+      </p:grpSpPr>
+      <p:pic>
+        <p:nvPicPr>
+          <p:cNvPr id="3" name="Picture 2">
+            <a:extLst>
+              <a:ext uri="{FF2B5EF4-FFF2-40B4-BE49-F238E27FC236}">
+                <a16:creationId xmlns:a16="http://schemas.microsoft.com/office/drawing/2014/main" id="{6F4EE7FD-C6F1-4EDD-9CE3-53F8E28CA70D}"/>
+              </a:ext>
+            </a:extLst>
+          </p:cNvPr>
+          <p:cNvPicPr>
+            <a:picLocks noChangeAspect="1"/>
+          </p:cNvPicPr>
+          <p:nvPr/>
+        </p:nvPicPr>
+        <p:blipFill>
+          <a:blip r:embed="rId2">
+            <a:extLst>
+              <a:ext uri="{28A0092B-C50C-407E-A947-70E740481C1C}">
+                <a14:useLocalDpi xmlns:a14="http://schemas.microsoft.com/office/drawing/2010/main" val="0"/>
+              </a:ext>
+            </a:extLst>
+          </a:blip>
+          <a:stretch>
+            <a:fillRect/>
+          </a:stretch>
+        </p:blipFill>
+        <p:spPr>
+          <a:xfrm>
+            <a:off x="1198484" y="1542197"/>
+            <a:ext cx="9608219" cy="3603009"/>
+          </a:xfrm>
+          <a:prstGeom prst="rect">
+            <a:avLst/>
+          </a:prstGeom>
+        </p:spPr>
+      </p:pic>
+      <p:sp>
+        <p:nvSpPr>
+          <p:cNvPr id="4" name="TextBox 3">
+            <a:extLst>
+              <a:ext uri="{FF2B5EF4-FFF2-40B4-BE49-F238E27FC236}">
+                <a16:creationId xmlns:a16="http://schemas.microsoft.com/office/drawing/2014/main" id="{4FF0D6BF-B0CA-4944-95E7-3B5508D8EE11}"/>
+              </a:ext>
+            </a:extLst>
+          </p:cNvPr>
+          <p:cNvSpPr txBox="1"/>
+          <p:nvPr/>
+        </p:nvSpPr>
+        <p:spPr>
+          <a:xfrm>
+            <a:off x="1198484" y="5439338"/>
+            <a:ext cx="8682361" cy="369332"/>
+          </a:xfrm>
+          <a:prstGeom prst="rect">
+            <a:avLst/>
+          </a:prstGeom>
+          <a:noFill/>
+        </p:spPr>
+        <p:txBody>
+          <a:bodyPr wrap="square" rtlCol="0">
+            <a:spAutoFit/>
+          </a:bodyPr>
+          <a:lstStyle/>
+          <a:p>
+            <a:r>
+              <a:rPr lang="en-US" dirty="0"/>
+              <a:t> Level 2.7 - Update student details by college </a:t>
+            </a:r>
+            <a:endParaRPr lang="en-IN" dirty="0"/>
+          </a:p>
+        </p:txBody>
+      </p:sp>
+    </p:spTree>
+    <p:extLst>
+      <p:ext uri="{BB962C8B-B14F-4D97-AF65-F5344CB8AC3E}">
+        <p14:creationId xmlns:p14="http://schemas.microsoft.com/office/powerpoint/2010/main" val="530601255"/>
+      </p:ext>
+    </p:extLst>
+  </p:cSld>
+  <p:clrMapOvr>
+    <a:masterClrMapping/>
+  </p:clrMapOvr>
+</p:sld>
+</file>
+
 <file path=ppt/slides/slide3.xml><?xml version="1.0" encoding="utf-8"?>
 <p:sld xmlns:a="http://schemas.openxmlformats.org/drawingml/2006/main" xmlns:r="http://schemas.openxmlformats.org/officeDocument/2006/relationships" xmlns:p="http://schemas.openxmlformats.org/presentationml/2006/main">
   <p:cSld>
@@ -6672,6 +8749,2364 @@
     <p:extLst>
       <p:ext uri="{BB962C8B-B14F-4D97-AF65-F5344CB8AC3E}">
         <p14:creationId xmlns:p14="http://schemas.microsoft.com/office/powerpoint/2010/main" val="2036609944"/>
+      </p:ext>
+    </p:extLst>
+  </p:cSld>
+  <p:clrMapOvr>
+    <a:masterClrMapping/>
+  </p:clrMapOvr>
+</p:sld>
+</file>
+
+<file path=ppt/slides/slide30.xml><?xml version="1.0" encoding="utf-8"?>
+<p:sld xmlns:a="http://schemas.openxmlformats.org/drawingml/2006/main" xmlns:r="http://schemas.openxmlformats.org/officeDocument/2006/relationships" xmlns:p="http://schemas.openxmlformats.org/presentationml/2006/main">
+  <p:cSld>
+    <p:spTree>
+      <p:nvGrpSpPr>
+        <p:cNvPr id="1" name=""/>
+        <p:cNvGrpSpPr/>
+        <p:nvPr/>
+      </p:nvGrpSpPr>
+      <p:grpSpPr>
+        <a:xfrm>
+          <a:off x="0" y="0"/>
+          <a:ext cx="0" cy="0"/>
+          <a:chOff x="0" y="0"/>
+          <a:chExt cx="0" cy="0"/>
+        </a:xfrm>
+      </p:grpSpPr>
+      <p:pic>
+        <p:nvPicPr>
+          <p:cNvPr id="3" name="Picture 2">
+            <a:extLst>
+              <a:ext uri="{FF2B5EF4-FFF2-40B4-BE49-F238E27FC236}">
+                <a16:creationId xmlns:a16="http://schemas.microsoft.com/office/drawing/2014/main" id="{B4597B37-1E1D-4F51-BED3-998B743D8DBB}"/>
+              </a:ext>
+            </a:extLst>
+          </p:cNvPr>
+          <p:cNvPicPr>
+            <a:picLocks noChangeAspect="1"/>
+          </p:cNvPicPr>
+          <p:nvPr/>
+        </p:nvPicPr>
+        <p:blipFill>
+          <a:blip r:embed="rId2">
+            <a:extLst>
+              <a:ext uri="{28A0092B-C50C-407E-A947-70E740481C1C}">
+                <a14:useLocalDpi xmlns:a14="http://schemas.microsoft.com/office/drawing/2010/main" val="0"/>
+              </a:ext>
+            </a:extLst>
+          </a:blip>
+          <a:stretch>
+            <a:fillRect/>
+          </a:stretch>
+        </p:blipFill>
+        <p:spPr>
+          <a:xfrm>
+            <a:off x="1145219" y="1665027"/>
+            <a:ext cx="8504807" cy="2995749"/>
+          </a:xfrm>
+          <a:prstGeom prst="rect">
+            <a:avLst/>
+          </a:prstGeom>
+        </p:spPr>
+      </p:pic>
+      <p:sp>
+        <p:nvSpPr>
+          <p:cNvPr id="4" name="TextBox 3">
+            <a:extLst>
+              <a:ext uri="{FF2B5EF4-FFF2-40B4-BE49-F238E27FC236}">
+                <a16:creationId xmlns:a16="http://schemas.microsoft.com/office/drawing/2014/main" id="{61D958A2-4061-4DD1-920E-47BF252980C0}"/>
+              </a:ext>
+            </a:extLst>
+          </p:cNvPr>
+          <p:cNvSpPr txBox="1"/>
+          <p:nvPr/>
+        </p:nvSpPr>
+        <p:spPr>
+          <a:xfrm>
+            <a:off x="1145219" y="5468645"/>
+            <a:ext cx="5424257" cy="369332"/>
+          </a:xfrm>
+          <a:prstGeom prst="rect">
+            <a:avLst/>
+          </a:prstGeom>
+          <a:noFill/>
+        </p:spPr>
+        <p:txBody>
+          <a:bodyPr wrap="square" rtlCol="0">
+            <a:spAutoFit/>
+          </a:bodyPr>
+          <a:lstStyle/>
+          <a:p>
+            <a:r>
+              <a:rPr lang="en-US"/>
+              <a:t> Level 2.8 - Create new job listing by Recruiter </a:t>
+            </a:r>
+            <a:endParaRPr lang="en-IN"/>
+          </a:p>
+        </p:txBody>
+      </p:sp>
+    </p:spTree>
+    <p:extLst>
+      <p:ext uri="{BB962C8B-B14F-4D97-AF65-F5344CB8AC3E}">
+        <p14:creationId xmlns:p14="http://schemas.microsoft.com/office/powerpoint/2010/main" val="2590233953"/>
+      </p:ext>
+    </p:extLst>
+  </p:cSld>
+  <p:clrMapOvr>
+    <a:masterClrMapping/>
+  </p:clrMapOvr>
+</p:sld>
+</file>
+
+<file path=ppt/slides/slide31.xml><?xml version="1.0" encoding="utf-8"?>
+<p:sld xmlns:a="http://schemas.openxmlformats.org/drawingml/2006/main" xmlns:r="http://schemas.openxmlformats.org/officeDocument/2006/relationships" xmlns:p="http://schemas.openxmlformats.org/presentationml/2006/main">
+  <p:cSld>
+    <p:spTree>
+      <p:nvGrpSpPr>
+        <p:cNvPr id="1" name=""/>
+        <p:cNvGrpSpPr/>
+        <p:nvPr/>
+      </p:nvGrpSpPr>
+      <p:grpSpPr>
+        <a:xfrm>
+          <a:off x="0" y="0"/>
+          <a:ext cx="0" cy="0"/>
+          <a:chOff x="0" y="0"/>
+          <a:chExt cx="0" cy="0"/>
+        </a:xfrm>
+      </p:grpSpPr>
+      <p:pic>
+        <p:nvPicPr>
+          <p:cNvPr id="3" name="Picture 2">
+            <a:extLst>
+              <a:ext uri="{FF2B5EF4-FFF2-40B4-BE49-F238E27FC236}">
+                <a16:creationId xmlns:a16="http://schemas.microsoft.com/office/drawing/2014/main" id="{F523D1F8-317E-45F8-A22F-164429C7E8E4}"/>
+              </a:ext>
+            </a:extLst>
+          </p:cNvPr>
+          <p:cNvPicPr>
+            <a:picLocks noChangeAspect="1"/>
+          </p:cNvPicPr>
+          <p:nvPr/>
+        </p:nvPicPr>
+        <p:blipFill>
+          <a:blip r:embed="rId2">
+            <a:extLst>
+              <a:ext uri="{28A0092B-C50C-407E-A947-70E740481C1C}">
+                <a14:useLocalDpi xmlns:a14="http://schemas.microsoft.com/office/drawing/2010/main" val="0"/>
+              </a:ext>
+            </a:extLst>
+          </a:blip>
+          <a:stretch>
+            <a:fillRect/>
+          </a:stretch>
+        </p:blipFill>
+        <p:spPr>
+          <a:xfrm>
+            <a:off x="1038687" y="1376039"/>
+            <a:ext cx="9312676" cy="3701987"/>
+          </a:xfrm>
+          <a:prstGeom prst="rect">
+            <a:avLst/>
+          </a:prstGeom>
+        </p:spPr>
+      </p:pic>
+      <p:sp>
+        <p:nvSpPr>
+          <p:cNvPr id="4" name="TextBox 3">
+            <a:extLst>
+              <a:ext uri="{FF2B5EF4-FFF2-40B4-BE49-F238E27FC236}">
+                <a16:creationId xmlns:a16="http://schemas.microsoft.com/office/drawing/2014/main" id="{238CEDA7-343D-411D-B77F-4C745F6A999C}"/>
+              </a:ext>
+            </a:extLst>
+          </p:cNvPr>
+          <p:cNvSpPr txBox="1"/>
+          <p:nvPr/>
+        </p:nvSpPr>
+        <p:spPr>
+          <a:xfrm>
+            <a:off x="1038687" y="5752730"/>
+            <a:ext cx="6027938" cy="369332"/>
+          </a:xfrm>
+          <a:prstGeom prst="rect">
+            <a:avLst/>
+          </a:prstGeom>
+          <a:noFill/>
+        </p:spPr>
+        <p:txBody>
+          <a:bodyPr wrap="square" rtlCol="0">
+            <a:spAutoFit/>
+          </a:bodyPr>
+          <a:lstStyle/>
+          <a:p>
+            <a:r>
+              <a:rPr lang="en-US"/>
+              <a:t> Level 2.9 - Edit or delete job listing by recruiter </a:t>
+            </a:r>
+            <a:endParaRPr lang="en-IN"/>
+          </a:p>
+        </p:txBody>
+      </p:sp>
+    </p:spTree>
+    <p:extLst>
+      <p:ext uri="{BB962C8B-B14F-4D97-AF65-F5344CB8AC3E}">
+        <p14:creationId xmlns:p14="http://schemas.microsoft.com/office/powerpoint/2010/main" val="2670188740"/>
+      </p:ext>
+    </p:extLst>
+  </p:cSld>
+  <p:clrMapOvr>
+    <a:masterClrMapping/>
+  </p:clrMapOvr>
+</p:sld>
+</file>
+
+<file path=ppt/slides/slide32.xml><?xml version="1.0" encoding="utf-8"?>
+<p:sld xmlns:a="http://schemas.openxmlformats.org/drawingml/2006/main" xmlns:r="http://schemas.openxmlformats.org/officeDocument/2006/relationships" xmlns:p="http://schemas.openxmlformats.org/presentationml/2006/main">
+  <p:cSld>
+    <p:spTree>
+      <p:nvGrpSpPr>
+        <p:cNvPr id="1" name=""/>
+        <p:cNvGrpSpPr/>
+        <p:nvPr/>
+      </p:nvGrpSpPr>
+      <p:grpSpPr>
+        <a:xfrm>
+          <a:off x="0" y="0"/>
+          <a:ext cx="0" cy="0"/>
+          <a:chOff x="0" y="0"/>
+          <a:chExt cx="0" cy="0"/>
+        </a:xfrm>
+      </p:grpSpPr>
+      <p:pic>
+        <p:nvPicPr>
+          <p:cNvPr id="3" name="Picture 2">
+            <a:extLst>
+              <a:ext uri="{FF2B5EF4-FFF2-40B4-BE49-F238E27FC236}">
+                <a16:creationId xmlns:a16="http://schemas.microsoft.com/office/drawing/2014/main" id="{9463ED2E-649B-4FF3-BCB0-3C5193C622A3}"/>
+              </a:ext>
+            </a:extLst>
+          </p:cNvPr>
+          <p:cNvPicPr>
+            <a:picLocks noChangeAspect="1"/>
+          </p:cNvPicPr>
+          <p:nvPr/>
+        </p:nvPicPr>
+        <p:blipFill>
+          <a:blip r:embed="rId2">
+            <a:extLst>
+              <a:ext uri="{28A0092B-C50C-407E-A947-70E740481C1C}">
+                <a14:useLocalDpi xmlns:a14="http://schemas.microsoft.com/office/drawing/2010/main" val="0"/>
+              </a:ext>
+            </a:extLst>
+          </a:blip>
+          <a:stretch>
+            <a:fillRect/>
+          </a:stretch>
+        </p:blipFill>
+        <p:spPr>
+          <a:xfrm>
+            <a:off x="1071238" y="1180730"/>
+            <a:ext cx="10049524" cy="3781887"/>
+          </a:xfrm>
+          <a:prstGeom prst="rect">
+            <a:avLst/>
+          </a:prstGeom>
+        </p:spPr>
+      </p:pic>
+      <p:sp>
+        <p:nvSpPr>
+          <p:cNvPr id="4" name="TextBox 3">
+            <a:extLst>
+              <a:ext uri="{FF2B5EF4-FFF2-40B4-BE49-F238E27FC236}">
+                <a16:creationId xmlns:a16="http://schemas.microsoft.com/office/drawing/2014/main" id="{9A785673-2440-45B1-879F-847D12CF1171}"/>
+              </a:ext>
+            </a:extLst>
+          </p:cNvPr>
+          <p:cNvSpPr txBox="1"/>
+          <p:nvPr/>
+        </p:nvSpPr>
+        <p:spPr>
+          <a:xfrm>
+            <a:off x="1071238" y="5592932"/>
+            <a:ext cx="7341833" cy="369332"/>
+          </a:xfrm>
+          <a:prstGeom prst="rect">
+            <a:avLst/>
+          </a:prstGeom>
+          <a:noFill/>
+        </p:spPr>
+        <p:txBody>
+          <a:bodyPr wrap="square" rtlCol="0">
+            <a:spAutoFit/>
+          </a:bodyPr>
+          <a:lstStyle/>
+          <a:p>
+            <a:r>
+              <a:rPr lang="en-US" dirty="0"/>
+              <a:t> Level 2.10 - Review CV by Recruiter </a:t>
+            </a:r>
+            <a:endParaRPr lang="en-IN" dirty="0"/>
+          </a:p>
+        </p:txBody>
+      </p:sp>
+    </p:spTree>
+    <p:extLst>
+      <p:ext uri="{BB962C8B-B14F-4D97-AF65-F5344CB8AC3E}">
+        <p14:creationId xmlns:p14="http://schemas.microsoft.com/office/powerpoint/2010/main" val="2738708463"/>
+      </p:ext>
+    </p:extLst>
+  </p:cSld>
+  <p:clrMapOvr>
+    <a:masterClrMapping/>
+  </p:clrMapOvr>
+</p:sld>
+</file>
+
+<file path=ppt/slides/slide33.xml><?xml version="1.0" encoding="utf-8"?>
+<p:sld xmlns:a="http://schemas.openxmlformats.org/drawingml/2006/main" xmlns:r="http://schemas.openxmlformats.org/officeDocument/2006/relationships" xmlns:p="http://schemas.openxmlformats.org/presentationml/2006/main">
+  <p:cSld>
+    <p:spTree>
+      <p:nvGrpSpPr>
+        <p:cNvPr id="1" name=""/>
+        <p:cNvGrpSpPr/>
+        <p:nvPr/>
+      </p:nvGrpSpPr>
+      <p:grpSpPr>
+        <a:xfrm>
+          <a:off x="0" y="0"/>
+          <a:ext cx="0" cy="0"/>
+          <a:chOff x="0" y="0"/>
+          <a:chExt cx="0" cy="0"/>
+        </a:xfrm>
+      </p:grpSpPr>
+      <p:pic>
+        <p:nvPicPr>
+          <p:cNvPr id="3" name="Picture 2">
+            <a:extLst>
+              <a:ext uri="{FF2B5EF4-FFF2-40B4-BE49-F238E27FC236}">
+                <a16:creationId xmlns:a16="http://schemas.microsoft.com/office/drawing/2014/main" id="{AE864247-110C-44E6-9A04-07B9FBF9742F}"/>
+              </a:ext>
+            </a:extLst>
+          </p:cNvPr>
+          <p:cNvPicPr>
+            <a:picLocks noChangeAspect="1"/>
+          </p:cNvPicPr>
+          <p:nvPr/>
+        </p:nvPicPr>
+        <p:blipFill>
+          <a:blip r:embed="rId2">
+            <a:extLst>
+              <a:ext uri="{28A0092B-C50C-407E-A947-70E740481C1C}">
+                <a14:useLocalDpi xmlns:a14="http://schemas.microsoft.com/office/drawing/2010/main" val="0"/>
+              </a:ext>
+            </a:extLst>
+          </a:blip>
+          <a:stretch>
+            <a:fillRect/>
+          </a:stretch>
+        </p:blipFill>
+        <p:spPr>
+          <a:xfrm>
+            <a:off x="568170" y="949910"/>
+            <a:ext cx="9925235" cy="4136996"/>
+          </a:xfrm>
+          <a:prstGeom prst="rect">
+            <a:avLst/>
+          </a:prstGeom>
+        </p:spPr>
+      </p:pic>
+      <p:sp>
+        <p:nvSpPr>
+          <p:cNvPr id="4" name="TextBox 3">
+            <a:extLst>
+              <a:ext uri="{FF2B5EF4-FFF2-40B4-BE49-F238E27FC236}">
+                <a16:creationId xmlns:a16="http://schemas.microsoft.com/office/drawing/2014/main" id="{A133B602-70D7-4616-965C-C087D5C5E5FA}"/>
+              </a:ext>
+            </a:extLst>
+          </p:cNvPr>
+          <p:cNvSpPr txBox="1"/>
+          <p:nvPr/>
+        </p:nvSpPr>
+        <p:spPr>
+          <a:xfrm>
+            <a:off x="941034" y="5362113"/>
+            <a:ext cx="7093258" cy="646331"/>
+          </a:xfrm>
+          <a:prstGeom prst="rect">
+            <a:avLst/>
+          </a:prstGeom>
+          <a:noFill/>
+        </p:spPr>
+        <p:txBody>
+          <a:bodyPr wrap="square" rtlCol="0">
+            <a:spAutoFit/>
+          </a:bodyPr>
+          <a:lstStyle/>
+          <a:p>
+            <a:r>
+              <a:rPr lang="en-US" dirty="0"/>
+              <a:t> Level 2.11 - Review applications by recruiter </a:t>
+            </a:r>
+          </a:p>
+          <a:p>
+            <a:r>
+              <a:rPr lang="en-US" dirty="0"/>
+              <a:t> </a:t>
+            </a:r>
+            <a:endParaRPr lang="en-IN" dirty="0"/>
+          </a:p>
+        </p:txBody>
+      </p:sp>
+    </p:spTree>
+    <p:extLst>
+      <p:ext uri="{BB962C8B-B14F-4D97-AF65-F5344CB8AC3E}">
+        <p14:creationId xmlns:p14="http://schemas.microsoft.com/office/powerpoint/2010/main" val="4180214495"/>
+      </p:ext>
+    </p:extLst>
+  </p:cSld>
+  <p:clrMapOvr>
+    <a:masterClrMapping/>
+  </p:clrMapOvr>
+</p:sld>
+</file>
+
+<file path=ppt/slides/slide34.xml><?xml version="1.0" encoding="utf-8"?>
+<p:sld xmlns:a="http://schemas.openxmlformats.org/drawingml/2006/main" xmlns:r="http://schemas.openxmlformats.org/officeDocument/2006/relationships" xmlns:p="http://schemas.openxmlformats.org/presentationml/2006/main">
+  <p:cSld>
+    <p:spTree>
+      <p:nvGrpSpPr>
+        <p:cNvPr id="1" name=""/>
+        <p:cNvGrpSpPr/>
+        <p:nvPr/>
+      </p:nvGrpSpPr>
+      <p:grpSpPr>
+        <a:xfrm>
+          <a:off x="0" y="0"/>
+          <a:ext cx="0" cy="0"/>
+          <a:chOff x="0" y="0"/>
+          <a:chExt cx="0" cy="0"/>
+        </a:xfrm>
+      </p:grpSpPr>
+      <p:pic>
+        <p:nvPicPr>
+          <p:cNvPr id="3" name="Picture 2">
+            <a:extLst>
+              <a:ext uri="{FF2B5EF4-FFF2-40B4-BE49-F238E27FC236}">
+                <a16:creationId xmlns:a16="http://schemas.microsoft.com/office/drawing/2014/main" id="{975900C6-19CB-4B29-8C0E-6F0C37A907FE}"/>
+              </a:ext>
+            </a:extLst>
+          </p:cNvPr>
+          <p:cNvPicPr>
+            <a:picLocks noChangeAspect="1"/>
+          </p:cNvPicPr>
+          <p:nvPr/>
+        </p:nvPicPr>
+        <p:blipFill>
+          <a:blip r:embed="rId2">
+            <a:extLst>
+              <a:ext uri="{28A0092B-C50C-407E-A947-70E740481C1C}">
+                <a14:useLocalDpi xmlns:a14="http://schemas.microsoft.com/office/drawing/2010/main" val="0"/>
+              </a:ext>
+            </a:extLst>
+          </a:blip>
+          <a:stretch>
+            <a:fillRect/>
+          </a:stretch>
+        </p:blipFill>
+        <p:spPr>
+          <a:xfrm>
+            <a:off x="681600" y="780978"/>
+            <a:ext cx="9000000" cy="5082980"/>
+          </a:xfrm>
+          <a:prstGeom prst="rect">
+            <a:avLst/>
+          </a:prstGeom>
+        </p:spPr>
+      </p:pic>
+      <p:sp>
+        <p:nvSpPr>
+          <p:cNvPr id="4" name="TextBox 3">
+            <a:extLst>
+              <a:ext uri="{FF2B5EF4-FFF2-40B4-BE49-F238E27FC236}">
+                <a16:creationId xmlns:a16="http://schemas.microsoft.com/office/drawing/2014/main" id="{C872C121-4C13-49BF-BE79-FC1CB29BE688}"/>
+              </a:ext>
+            </a:extLst>
+          </p:cNvPr>
+          <p:cNvSpPr txBox="1"/>
+          <p:nvPr/>
+        </p:nvSpPr>
+        <p:spPr>
+          <a:xfrm>
+            <a:off x="1464814" y="5894978"/>
+            <a:ext cx="6480699" cy="923330"/>
+          </a:xfrm>
+          <a:prstGeom prst="rect">
+            <a:avLst/>
+          </a:prstGeom>
+          <a:noFill/>
+        </p:spPr>
+        <p:txBody>
+          <a:bodyPr wrap="square" rtlCol="0">
+            <a:spAutoFit/>
+          </a:bodyPr>
+          <a:lstStyle/>
+          <a:p>
+            <a:r>
+              <a:rPr lang="en-US"/>
+              <a:t> Level 2.12 - Entering personalization details by student </a:t>
+            </a:r>
+          </a:p>
+          <a:p>
+            <a:r>
+              <a:rPr lang="en-US"/>
+              <a:t> </a:t>
+            </a:r>
+          </a:p>
+          <a:p>
+            <a:r>
+              <a:rPr lang="en-US"/>
+              <a:t> </a:t>
+            </a:r>
+            <a:endParaRPr lang="en-IN"/>
+          </a:p>
+        </p:txBody>
+      </p:sp>
+    </p:spTree>
+    <p:extLst>
+      <p:ext uri="{BB962C8B-B14F-4D97-AF65-F5344CB8AC3E}">
+        <p14:creationId xmlns:p14="http://schemas.microsoft.com/office/powerpoint/2010/main" val="2168042213"/>
+      </p:ext>
+    </p:extLst>
+  </p:cSld>
+  <p:clrMapOvr>
+    <a:masterClrMapping/>
+  </p:clrMapOvr>
+</p:sld>
+</file>
+
+<file path=ppt/slides/slide35.xml><?xml version="1.0" encoding="utf-8"?>
+<p:sld xmlns:a="http://schemas.openxmlformats.org/drawingml/2006/main" xmlns:r="http://schemas.openxmlformats.org/officeDocument/2006/relationships" xmlns:p="http://schemas.openxmlformats.org/presentationml/2006/main">
+  <p:cSld>
+    <p:spTree>
+      <p:nvGrpSpPr>
+        <p:cNvPr id="1" name=""/>
+        <p:cNvGrpSpPr/>
+        <p:nvPr/>
+      </p:nvGrpSpPr>
+      <p:grpSpPr>
+        <a:xfrm>
+          <a:off x="0" y="0"/>
+          <a:ext cx="0" cy="0"/>
+          <a:chOff x="0" y="0"/>
+          <a:chExt cx="0" cy="0"/>
+        </a:xfrm>
+      </p:grpSpPr>
+      <p:pic>
+        <p:nvPicPr>
+          <p:cNvPr id="3" name="Picture 2">
+            <a:extLst>
+              <a:ext uri="{FF2B5EF4-FFF2-40B4-BE49-F238E27FC236}">
+                <a16:creationId xmlns:a16="http://schemas.microsoft.com/office/drawing/2014/main" id="{680EAFFA-FE21-4C60-8CD7-8F8BF7EE7664}"/>
+              </a:ext>
+            </a:extLst>
+          </p:cNvPr>
+          <p:cNvPicPr>
+            <a:picLocks noChangeAspect="1"/>
+          </p:cNvPicPr>
+          <p:nvPr/>
+        </p:nvPicPr>
+        <p:blipFill>
+          <a:blip r:embed="rId2">
+            <a:extLst>
+              <a:ext uri="{28A0092B-C50C-407E-A947-70E740481C1C}">
+                <a14:useLocalDpi xmlns:a14="http://schemas.microsoft.com/office/drawing/2010/main" val="0"/>
+              </a:ext>
+            </a:extLst>
+          </a:blip>
+          <a:stretch>
+            <a:fillRect/>
+          </a:stretch>
+        </p:blipFill>
+        <p:spPr>
+          <a:xfrm>
+            <a:off x="985422" y="541538"/>
+            <a:ext cx="8176334" cy="5042517"/>
+          </a:xfrm>
+          <a:prstGeom prst="rect">
+            <a:avLst/>
+          </a:prstGeom>
+        </p:spPr>
+      </p:pic>
+      <p:sp>
+        <p:nvSpPr>
+          <p:cNvPr id="4" name="TextBox 3">
+            <a:extLst>
+              <a:ext uri="{FF2B5EF4-FFF2-40B4-BE49-F238E27FC236}">
+                <a16:creationId xmlns:a16="http://schemas.microsoft.com/office/drawing/2014/main" id="{F4014702-6B5E-4890-AFAE-10D9A1522451}"/>
+              </a:ext>
+            </a:extLst>
+          </p:cNvPr>
+          <p:cNvSpPr txBox="1"/>
+          <p:nvPr/>
+        </p:nvSpPr>
+        <p:spPr>
+          <a:xfrm>
+            <a:off x="1518082" y="5584055"/>
+            <a:ext cx="7111014" cy="646331"/>
+          </a:xfrm>
+          <a:prstGeom prst="rect">
+            <a:avLst/>
+          </a:prstGeom>
+          <a:noFill/>
+        </p:spPr>
+        <p:txBody>
+          <a:bodyPr wrap="square" rtlCol="0">
+            <a:spAutoFit/>
+          </a:bodyPr>
+          <a:lstStyle/>
+          <a:p>
+            <a:r>
+              <a:rPr lang="en-US" dirty="0"/>
+              <a:t> Level 2.13 -  Following topics or recruiters by student </a:t>
+            </a:r>
+          </a:p>
+          <a:p>
+            <a:r>
+              <a:rPr lang="en-US" dirty="0"/>
+              <a:t> </a:t>
+            </a:r>
+            <a:endParaRPr lang="en-IN" dirty="0"/>
+          </a:p>
+        </p:txBody>
+      </p:sp>
+    </p:spTree>
+    <p:extLst>
+      <p:ext uri="{BB962C8B-B14F-4D97-AF65-F5344CB8AC3E}">
+        <p14:creationId xmlns:p14="http://schemas.microsoft.com/office/powerpoint/2010/main" val="2740790293"/>
+      </p:ext>
+    </p:extLst>
+  </p:cSld>
+  <p:clrMapOvr>
+    <a:masterClrMapping/>
+  </p:clrMapOvr>
+</p:sld>
+</file>
+
+<file path=ppt/slides/slide36.xml><?xml version="1.0" encoding="utf-8"?>
+<p:sld xmlns:a="http://schemas.openxmlformats.org/drawingml/2006/main" xmlns:r="http://schemas.openxmlformats.org/officeDocument/2006/relationships" xmlns:p="http://schemas.openxmlformats.org/presentationml/2006/main">
+  <p:cSld>
+    <p:spTree>
+      <p:nvGrpSpPr>
+        <p:cNvPr id="1" name=""/>
+        <p:cNvGrpSpPr/>
+        <p:nvPr/>
+      </p:nvGrpSpPr>
+      <p:grpSpPr>
+        <a:xfrm>
+          <a:off x="0" y="0"/>
+          <a:ext cx="0" cy="0"/>
+          <a:chOff x="0" y="0"/>
+          <a:chExt cx="0" cy="0"/>
+        </a:xfrm>
+      </p:grpSpPr>
+      <p:pic>
+        <p:nvPicPr>
+          <p:cNvPr id="3" name="Picture 2">
+            <a:extLst>
+              <a:ext uri="{FF2B5EF4-FFF2-40B4-BE49-F238E27FC236}">
+                <a16:creationId xmlns:a16="http://schemas.microsoft.com/office/drawing/2014/main" id="{2162B2B5-6D94-40EA-B3DE-8601BAF3E10E}"/>
+              </a:ext>
+            </a:extLst>
+          </p:cNvPr>
+          <p:cNvPicPr>
+            <a:picLocks noChangeAspect="1"/>
+          </p:cNvPicPr>
+          <p:nvPr/>
+        </p:nvPicPr>
+        <p:blipFill rotWithShape="1">
+          <a:blip r:embed="rId2">
+            <a:extLst>
+              <a:ext uri="{28A0092B-C50C-407E-A947-70E740481C1C}">
+                <a14:useLocalDpi xmlns:a14="http://schemas.microsoft.com/office/drawing/2010/main" val="0"/>
+              </a:ext>
+            </a:extLst>
+          </a:blip>
+          <a:srcRect b="7214"/>
+          <a:stretch/>
+        </p:blipFill>
+        <p:spPr>
+          <a:xfrm>
+            <a:off x="985422" y="772357"/>
+            <a:ext cx="8528132" cy="5007006"/>
+          </a:xfrm>
+          <a:prstGeom prst="rect">
+            <a:avLst/>
+          </a:prstGeom>
+        </p:spPr>
+      </p:pic>
+      <p:sp>
+        <p:nvSpPr>
+          <p:cNvPr id="4" name="TextBox 3">
+            <a:extLst>
+              <a:ext uri="{FF2B5EF4-FFF2-40B4-BE49-F238E27FC236}">
+                <a16:creationId xmlns:a16="http://schemas.microsoft.com/office/drawing/2014/main" id="{5CF95422-99C0-40D8-B613-9A82048A86E3}"/>
+              </a:ext>
+            </a:extLst>
+          </p:cNvPr>
+          <p:cNvSpPr txBox="1"/>
+          <p:nvPr/>
+        </p:nvSpPr>
+        <p:spPr>
+          <a:xfrm>
+            <a:off x="985421" y="5779363"/>
+            <a:ext cx="7741329" cy="369332"/>
+          </a:xfrm>
+          <a:prstGeom prst="rect">
+            <a:avLst/>
+          </a:prstGeom>
+          <a:noFill/>
+        </p:spPr>
+        <p:txBody>
+          <a:bodyPr wrap="square" rtlCol="0">
+            <a:spAutoFit/>
+          </a:bodyPr>
+          <a:lstStyle/>
+          <a:p>
+            <a:r>
+              <a:rPr lang="en-US" dirty="0"/>
+              <a:t> Level 2.14 - Apply for job by student </a:t>
+            </a:r>
+            <a:endParaRPr lang="en-IN" dirty="0"/>
+          </a:p>
+        </p:txBody>
+      </p:sp>
+    </p:spTree>
+    <p:extLst>
+      <p:ext uri="{BB962C8B-B14F-4D97-AF65-F5344CB8AC3E}">
+        <p14:creationId xmlns:p14="http://schemas.microsoft.com/office/powerpoint/2010/main" val="3045933539"/>
+      </p:ext>
+    </p:extLst>
+  </p:cSld>
+  <p:clrMapOvr>
+    <a:masterClrMapping/>
+  </p:clrMapOvr>
+</p:sld>
+</file>
+
+<file path=ppt/slides/slide37.xml><?xml version="1.0" encoding="utf-8"?>
+<p:sld xmlns:a="http://schemas.openxmlformats.org/drawingml/2006/main" xmlns:r="http://schemas.openxmlformats.org/officeDocument/2006/relationships" xmlns:p="http://schemas.openxmlformats.org/presentationml/2006/main">
+  <p:cSld>
+    <p:spTree>
+      <p:nvGrpSpPr>
+        <p:cNvPr id="1" name=""/>
+        <p:cNvGrpSpPr/>
+        <p:nvPr/>
+      </p:nvGrpSpPr>
+      <p:grpSpPr>
+        <a:xfrm>
+          <a:off x="0" y="0"/>
+          <a:ext cx="0" cy="0"/>
+          <a:chOff x="0" y="0"/>
+          <a:chExt cx="0" cy="0"/>
+        </a:xfrm>
+      </p:grpSpPr>
+      <p:sp>
+        <p:nvSpPr>
+          <p:cNvPr id="5" name="Title 4">
+            <a:extLst>
+              <a:ext uri="{FF2B5EF4-FFF2-40B4-BE49-F238E27FC236}">
+                <a16:creationId xmlns:a16="http://schemas.microsoft.com/office/drawing/2014/main" id="{AF5A2BDD-B148-4F27-8921-CB48343D26A4}"/>
+              </a:ext>
+            </a:extLst>
+          </p:cNvPr>
+          <p:cNvSpPr>
+            <a:spLocks noGrp="1"/>
+          </p:cNvSpPr>
+          <p:nvPr>
+            <p:ph type="title"/>
+          </p:nvPr>
+        </p:nvSpPr>
+        <p:spPr>
+          <a:xfrm>
+            <a:off x="838200" y="703565"/>
+            <a:ext cx="10515600" cy="776288"/>
+          </a:xfrm>
+        </p:spPr>
+        <p:txBody>
+          <a:bodyPr/>
+          <a:lstStyle/>
+          <a:p>
+            <a:r>
+              <a:rPr lang="en-US" dirty="0"/>
+              <a:t>REFERENCES</a:t>
+            </a:r>
+            <a:endParaRPr lang="en-GB" dirty="0"/>
+          </a:p>
+        </p:txBody>
+      </p:sp>
+      <p:sp>
+        <p:nvSpPr>
+          <p:cNvPr id="6" name="Content Placeholder 5">
+            <a:extLst>
+              <a:ext uri="{FF2B5EF4-FFF2-40B4-BE49-F238E27FC236}">
+                <a16:creationId xmlns:a16="http://schemas.microsoft.com/office/drawing/2014/main" id="{DA1664A8-3DF3-41F7-BBFA-9727344715BF}"/>
+              </a:ext>
+            </a:extLst>
+          </p:cNvPr>
+          <p:cNvSpPr>
+            <a:spLocks noGrp="1"/>
+          </p:cNvSpPr>
+          <p:nvPr>
+            <p:ph idx="1"/>
+          </p:nvPr>
+        </p:nvSpPr>
+        <p:spPr>
+          <a:xfrm>
+            <a:off x="838200" y="1603915"/>
+            <a:ext cx="10515600" cy="4351338"/>
+          </a:xfrm>
+        </p:spPr>
+        <p:txBody>
+          <a:bodyPr>
+            <a:normAutofit fontScale="25000" lnSpcReduction="20000"/>
+          </a:bodyPr>
+          <a:lstStyle/>
+          <a:p>
+            <a:pPr marL="0" indent="0">
+              <a:buNone/>
+            </a:pPr>
+            <a:endParaRPr lang="en-GB" dirty="0"/>
+          </a:p>
+          <a:p>
+            <a:pPr marL="0" indent="0">
+              <a:buNone/>
+            </a:pPr>
+            <a:r>
+              <a:rPr lang="en-GB" sz="11200" dirty="0"/>
+              <a:t>1]</a:t>
+            </a:r>
+            <a:r>
+              <a:rPr lang="en-GB" sz="11200" dirty="0" err="1"/>
+              <a:t>Rajib</a:t>
+            </a:r>
+            <a:r>
+              <a:rPr lang="en-GB" sz="11200" dirty="0"/>
+              <a:t> Mall-Fundamentals of Software Engineering-PHI.</a:t>
+            </a:r>
+          </a:p>
+          <a:p>
+            <a:pPr marL="0" indent="0">
+              <a:buNone/>
+            </a:pPr>
+            <a:endParaRPr lang="en-GB" sz="11200" dirty="0"/>
+          </a:p>
+          <a:p>
+            <a:pPr marL="0" indent="0">
+              <a:buNone/>
+            </a:pPr>
+            <a:r>
+              <a:rPr lang="en-GB" sz="11200" dirty="0"/>
+              <a:t>2]Pankaj </a:t>
+            </a:r>
+            <a:r>
+              <a:rPr lang="en-GB" sz="11200" dirty="0" err="1"/>
+              <a:t>Jalote</a:t>
+            </a:r>
+            <a:r>
+              <a:rPr lang="en-GB" sz="11200" dirty="0"/>
+              <a:t>-Software Engineering-</a:t>
+            </a:r>
+            <a:r>
+              <a:rPr lang="en-GB" sz="11200" dirty="0" err="1"/>
+              <a:t>Narosa</a:t>
+            </a:r>
+            <a:r>
+              <a:rPr lang="en-GB" sz="11200" dirty="0"/>
+              <a:t> Publications.</a:t>
+            </a:r>
+          </a:p>
+          <a:p>
+            <a:pPr marL="0" indent="0">
+              <a:buNone/>
+            </a:pPr>
+            <a:endParaRPr lang="en-GB" sz="11200" dirty="0"/>
+          </a:p>
+          <a:p>
+            <a:pPr marL="0" indent="0">
+              <a:buNone/>
+            </a:pPr>
+            <a:r>
+              <a:rPr lang="en-GB" sz="11200" dirty="0"/>
+              <a:t>3]</a:t>
+            </a:r>
+            <a:r>
+              <a:rPr lang="en-GB" sz="11200" dirty="0">
+                <a:hlinkClick r:id="rId2" action="ppaction://hlinksldjump"/>
+              </a:rPr>
+              <a:t> Google Web Help</a:t>
+            </a:r>
+            <a:r>
+              <a:rPr lang="en-GB" sz="11200" dirty="0"/>
+              <a:t>-System Requirements.</a:t>
+            </a:r>
+          </a:p>
+          <a:p>
+            <a:pPr marL="0" indent="0">
+              <a:buNone/>
+            </a:pPr>
+            <a:endParaRPr lang="en-GB" sz="11200" dirty="0"/>
+          </a:p>
+          <a:p>
+            <a:pPr marL="0" indent="0">
+              <a:buNone/>
+            </a:pPr>
+            <a:r>
+              <a:rPr lang="en-GB" sz="11200" dirty="0"/>
+              <a:t>4]</a:t>
+            </a:r>
+            <a:r>
+              <a:rPr lang="en-GB" sz="11200" dirty="0">
+                <a:hlinkClick r:id="rId2" action="ppaction://hlinksldjump"/>
+              </a:rPr>
+              <a:t>Online job portal java </a:t>
+            </a:r>
+            <a:r>
+              <a:rPr lang="en-GB" sz="11200">
+                <a:hlinkClick r:id="rId2" action="ppaction://hlinksldjump"/>
+              </a:rPr>
+              <a:t>project.</a:t>
+            </a:r>
+            <a:endParaRPr lang="en-GB" sz="11200" dirty="0"/>
+          </a:p>
+          <a:p>
+            <a:pPr marL="0" indent="0">
+              <a:buNone/>
+            </a:pPr>
+            <a:endParaRPr lang="en-GB" sz="11200" dirty="0"/>
+          </a:p>
+          <a:p>
+            <a:pPr marL="0" indent="0">
+              <a:buNone/>
+            </a:pPr>
+            <a:r>
+              <a:rPr lang="en-GB" sz="11200" dirty="0"/>
+              <a:t>5]Wikipedia.</a:t>
+            </a:r>
+          </a:p>
+          <a:p>
+            <a:pPr marL="0" indent="0">
+              <a:buNone/>
+            </a:pPr>
+            <a:endParaRPr lang="en-GB" sz="11200" dirty="0"/>
+          </a:p>
+          <a:p>
+            <a:pPr marL="0" indent="0">
+              <a:buNone/>
+            </a:pPr>
+            <a:endParaRPr lang="en-GB" dirty="0"/>
+          </a:p>
+          <a:p>
+            <a:pPr marL="0" indent="0">
+              <a:buNone/>
+            </a:pPr>
+            <a:endParaRPr lang="en-GB" sz="11200" dirty="0"/>
+          </a:p>
+          <a:p>
+            <a:pPr marL="0" indent="0">
+              <a:buNone/>
+            </a:pPr>
+            <a:endParaRPr lang="en-GB" dirty="0"/>
+          </a:p>
+          <a:p>
+            <a:pPr marL="0" indent="0">
+              <a:buNone/>
+            </a:pPr>
+            <a:endParaRPr lang="en-GB" dirty="0"/>
+          </a:p>
+          <a:p>
+            <a:pPr marL="0" indent="0">
+              <a:buNone/>
+            </a:pPr>
+            <a:endParaRPr lang="en-GB" dirty="0"/>
+          </a:p>
+          <a:p>
+            <a:pPr marL="0" indent="0">
+              <a:buNone/>
+            </a:pPr>
+            <a:endParaRPr lang="en-GB" dirty="0"/>
+          </a:p>
+          <a:p>
+            <a:pPr marL="0" indent="0">
+              <a:buNone/>
+            </a:pPr>
+            <a:endParaRPr lang="en-GB" dirty="0"/>
+          </a:p>
+          <a:p>
+            <a:pPr marL="0" indent="0">
+              <a:buNone/>
+            </a:pPr>
+            <a:endParaRPr lang="en-GB" dirty="0"/>
+          </a:p>
+          <a:p>
+            <a:pPr marL="0" indent="0">
+              <a:buNone/>
+            </a:pPr>
+            <a:endParaRPr lang="en-GB" dirty="0"/>
+          </a:p>
+          <a:p>
+            <a:pPr marL="0" indent="0">
+              <a:buNone/>
+            </a:pPr>
+            <a:endParaRPr lang="en-GB" dirty="0"/>
+          </a:p>
+          <a:p>
+            <a:pPr marL="0" indent="0">
+              <a:buNone/>
+            </a:pPr>
+            <a:endParaRPr lang="en-GB" dirty="0"/>
+          </a:p>
+          <a:p>
+            <a:pPr marL="0" indent="0">
+              <a:buNone/>
+            </a:pPr>
+            <a:endParaRPr lang="en-GB" dirty="0"/>
+          </a:p>
+          <a:p>
+            <a:pPr marL="0" indent="0">
+              <a:buNone/>
+            </a:pPr>
+            <a:endParaRPr lang="en-GB" dirty="0"/>
+          </a:p>
+          <a:p>
+            <a:pPr marL="0" indent="0">
+              <a:buNone/>
+            </a:pPr>
+            <a:endParaRPr lang="en-GB" dirty="0"/>
+          </a:p>
+          <a:p>
+            <a:pPr marL="0" indent="0">
+              <a:buNone/>
+            </a:pPr>
+            <a:endParaRPr lang="en-GB" dirty="0"/>
+          </a:p>
+          <a:p>
+            <a:pPr marL="0" indent="0">
+              <a:buNone/>
+            </a:pPr>
+            <a:endParaRPr lang="en-GB" dirty="0"/>
+          </a:p>
+          <a:p>
+            <a:pPr marL="0" indent="0">
+              <a:buNone/>
+            </a:pPr>
+            <a:endParaRPr lang="en-GB" dirty="0"/>
+          </a:p>
+          <a:p>
+            <a:pPr marL="0" indent="0">
+              <a:buNone/>
+            </a:pPr>
+            <a:endParaRPr lang="en-GB" dirty="0"/>
+          </a:p>
+          <a:p>
+            <a:pPr marL="0" indent="0">
+              <a:buNone/>
+            </a:pPr>
+            <a:endParaRPr lang="en-GB" dirty="0"/>
+          </a:p>
+          <a:p>
+            <a:pPr marL="0" indent="0">
+              <a:buNone/>
+            </a:pPr>
+            <a:endParaRPr lang="en-GB" dirty="0"/>
+          </a:p>
+          <a:p>
+            <a:pPr marL="0" indent="0">
+              <a:buNone/>
+            </a:pPr>
+            <a:endParaRPr lang="en-GB" dirty="0"/>
+          </a:p>
+          <a:p>
+            <a:pPr marL="0" indent="0">
+              <a:buNone/>
+            </a:pPr>
+            <a:endParaRPr lang="en-GB" dirty="0"/>
+          </a:p>
+          <a:p>
+            <a:pPr marL="0" indent="0">
+              <a:buNone/>
+            </a:pPr>
+            <a:endParaRPr lang="en-GB" dirty="0"/>
+          </a:p>
+          <a:p>
+            <a:pPr marL="0" indent="0">
+              <a:buNone/>
+            </a:pPr>
+            <a:endParaRPr lang="en-GB" dirty="0"/>
+          </a:p>
+          <a:p>
+            <a:pPr marL="0" indent="0">
+              <a:buNone/>
+            </a:pPr>
+            <a:endParaRPr lang="en-GB" dirty="0"/>
+          </a:p>
+          <a:p>
+            <a:pPr marL="0" indent="0">
+              <a:buNone/>
+            </a:pPr>
+            <a:endParaRPr lang="en-GB" dirty="0"/>
+          </a:p>
+          <a:p>
+            <a:pPr marL="0" indent="0">
+              <a:buNone/>
+            </a:pPr>
+            <a:endParaRPr lang="en-GB" dirty="0"/>
+          </a:p>
+          <a:p>
+            <a:pPr marL="0" indent="0">
+              <a:buNone/>
+            </a:pPr>
+            <a:endParaRPr lang="en-GB" dirty="0"/>
+          </a:p>
+          <a:p>
+            <a:pPr marL="0" indent="0">
+              <a:buNone/>
+            </a:pPr>
+            <a:endParaRPr lang="en-GB" dirty="0"/>
+          </a:p>
+          <a:p>
+            <a:pPr marL="0" indent="0">
+              <a:buNone/>
+            </a:pPr>
+            <a:endParaRPr lang="en-GB" dirty="0"/>
+          </a:p>
+          <a:p>
+            <a:pPr marL="0" indent="0">
+              <a:buNone/>
+            </a:pPr>
+            <a:endParaRPr lang="en-GB" dirty="0"/>
+          </a:p>
+          <a:p>
+            <a:pPr marL="0" indent="0">
+              <a:buNone/>
+            </a:pPr>
+            <a:endParaRPr lang="en-GB" dirty="0"/>
+          </a:p>
+          <a:p>
+            <a:pPr marL="0" indent="0">
+              <a:buNone/>
+            </a:pPr>
+            <a:endParaRPr lang="en-GB" dirty="0"/>
+          </a:p>
+          <a:p>
+            <a:pPr marL="0" indent="0">
+              <a:buNone/>
+            </a:pPr>
+            <a:endParaRPr lang="en-GB" dirty="0"/>
+          </a:p>
+          <a:p>
+            <a:pPr marL="0" indent="0">
+              <a:buNone/>
+            </a:pPr>
+            <a:endParaRPr lang="en-GB" dirty="0"/>
+          </a:p>
+          <a:p>
+            <a:pPr marL="0" indent="0">
+              <a:buNone/>
+            </a:pPr>
+            <a:endParaRPr lang="en-GB" dirty="0"/>
+          </a:p>
+          <a:p>
+            <a:pPr marL="0" indent="0">
+              <a:buNone/>
+            </a:pPr>
+            <a:endParaRPr lang="en-GB" dirty="0"/>
+          </a:p>
+          <a:p>
+            <a:pPr marL="0" indent="0">
+              <a:buNone/>
+            </a:pPr>
+            <a:endParaRPr lang="en-GB" dirty="0"/>
+          </a:p>
+          <a:p>
+            <a:pPr marL="0" indent="0">
+              <a:buNone/>
+            </a:pPr>
+            <a:endParaRPr lang="en-GB" dirty="0"/>
+          </a:p>
+          <a:p>
+            <a:pPr marL="0" indent="0">
+              <a:buNone/>
+            </a:pPr>
+            <a:endParaRPr lang="en-GB" dirty="0"/>
+          </a:p>
+          <a:p>
+            <a:pPr marL="0" indent="0">
+              <a:buNone/>
+            </a:pPr>
+            <a:endParaRPr lang="en-GB" dirty="0"/>
+          </a:p>
+          <a:p>
+            <a:pPr marL="0" indent="0">
+              <a:buNone/>
+            </a:pPr>
+            <a:endParaRPr lang="en-GB" dirty="0"/>
+          </a:p>
+          <a:p>
+            <a:pPr marL="0" indent="0">
+              <a:buNone/>
+            </a:pPr>
+            <a:endParaRPr lang="en-GB" dirty="0"/>
+          </a:p>
+          <a:p>
+            <a:pPr marL="0" indent="0">
+              <a:buNone/>
+            </a:pPr>
+            <a:endParaRPr lang="en-GB" dirty="0"/>
+          </a:p>
+          <a:p>
+            <a:pPr marL="0" indent="0">
+              <a:buNone/>
+            </a:pPr>
+            <a:endParaRPr lang="en-GB" dirty="0"/>
+          </a:p>
+          <a:p>
+            <a:pPr marL="0" indent="0">
+              <a:buNone/>
+            </a:pPr>
+            <a:endParaRPr lang="en-GB" dirty="0"/>
+          </a:p>
+          <a:p>
+            <a:pPr marL="0" indent="0">
+              <a:buNone/>
+            </a:pPr>
+            <a:endParaRPr lang="en-GB" dirty="0"/>
+          </a:p>
+          <a:p>
+            <a:pPr marL="0" indent="0">
+              <a:buNone/>
+            </a:pPr>
+            <a:endParaRPr lang="en-GB" dirty="0"/>
+          </a:p>
+          <a:p>
+            <a:pPr marL="0" indent="0">
+              <a:buNone/>
+            </a:pPr>
+            <a:endParaRPr lang="en-GB" dirty="0"/>
+          </a:p>
+          <a:p>
+            <a:pPr marL="0" indent="0">
+              <a:buNone/>
+            </a:pPr>
+            <a:endParaRPr lang="en-GB" dirty="0"/>
+          </a:p>
+          <a:p>
+            <a:pPr marL="0" indent="0">
+              <a:buNone/>
+            </a:pPr>
+            <a:endParaRPr lang="en-GB" dirty="0"/>
+          </a:p>
+          <a:p>
+            <a:pPr marL="0" indent="0">
+              <a:buNone/>
+            </a:pPr>
+            <a:endParaRPr lang="en-GB" dirty="0"/>
+          </a:p>
+          <a:p>
+            <a:pPr marL="0" indent="0">
+              <a:buNone/>
+            </a:pPr>
+            <a:endParaRPr lang="en-GB" dirty="0"/>
+          </a:p>
+          <a:p>
+            <a:pPr marL="0" indent="0">
+              <a:buNone/>
+            </a:pPr>
+            <a:endParaRPr lang="en-GB" dirty="0"/>
+          </a:p>
+          <a:p>
+            <a:pPr marL="0" indent="0">
+              <a:buNone/>
+            </a:pPr>
+            <a:endParaRPr lang="en-GB" dirty="0"/>
+          </a:p>
+          <a:p>
+            <a:pPr marL="0" indent="0">
+              <a:buNone/>
+            </a:pPr>
+            <a:endParaRPr lang="en-GB" dirty="0"/>
+          </a:p>
+          <a:p>
+            <a:pPr marL="0" indent="0">
+              <a:buNone/>
+            </a:pPr>
+            <a:endParaRPr lang="en-GB" dirty="0"/>
+          </a:p>
+          <a:p>
+            <a:pPr marL="0" indent="0">
+              <a:buNone/>
+            </a:pPr>
+            <a:endParaRPr lang="en-GB" dirty="0"/>
+          </a:p>
+          <a:p>
+            <a:pPr marL="0" indent="0">
+              <a:buNone/>
+            </a:pPr>
+            <a:endParaRPr lang="en-GB" dirty="0"/>
+          </a:p>
+          <a:p>
+            <a:pPr marL="0" indent="0">
+              <a:buNone/>
+            </a:pPr>
+            <a:endParaRPr lang="en-GB" dirty="0"/>
+          </a:p>
+          <a:p>
+            <a:pPr marL="0" indent="0">
+              <a:buNone/>
+            </a:pPr>
+            <a:endParaRPr lang="en-GB" dirty="0"/>
+          </a:p>
+          <a:p>
+            <a:pPr marL="0" indent="0">
+              <a:buNone/>
+            </a:pPr>
+            <a:endParaRPr lang="en-GB" dirty="0"/>
+          </a:p>
+          <a:p>
+            <a:pPr marL="0" indent="0">
+              <a:buNone/>
+            </a:pPr>
+            <a:endParaRPr lang="en-GB" dirty="0"/>
+          </a:p>
+          <a:p>
+            <a:pPr marL="0" indent="0">
+              <a:buNone/>
+            </a:pPr>
+            <a:endParaRPr lang="en-GB" dirty="0"/>
+          </a:p>
+          <a:p>
+            <a:pPr marL="0" indent="0">
+              <a:buNone/>
+            </a:pPr>
+            <a:endParaRPr lang="en-GB" dirty="0"/>
+          </a:p>
+          <a:p>
+            <a:pPr marL="0" indent="0">
+              <a:buNone/>
+            </a:pPr>
+            <a:endParaRPr lang="en-GB" dirty="0"/>
+          </a:p>
+          <a:p>
+            <a:pPr marL="0" indent="0">
+              <a:buNone/>
+            </a:pPr>
+            <a:endParaRPr lang="en-GB" dirty="0"/>
+          </a:p>
+          <a:p>
+            <a:pPr marL="0" indent="0">
+              <a:buNone/>
+            </a:pPr>
+            <a:endParaRPr lang="en-GB" dirty="0"/>
+          </a:p>
+          <a:p>
+            <a:pPr marL="0" indent="0">
+              <a:buNone/>
+            </a:pPr>
+            <a:endParaRPr lang="en-GB" dirty="0"/>
+          </a:p>
+          <a:p>
+            <a:pPr marL="0" indent="0">
+              <a:buNone/>
+            </a:pPr>
+            <a:endParaRPr lang="en-GB" dirty="0"/>
+          </a:p>
+          <a:p>
+            <a:pPr marL="0" indent="0">
+              <a:buNone/>
+            </a:pPr>
+            <a:endParaRPr lang="en-GB" dirty="0"/>
+          </a:p>
+          <a:p>
+            <a:pPr marL="0" indent="0">
+              <a:buNone/>
+            </a:pPr>
+            <a:endParaRPr lang="en-GB" dirty="0"/>
+          </a:p>
+          <a:p>
+            <a:pPr marL="0" indent="0">
+              <a:buNone/>
+            </a:pPr>
+            <a:endParaRPr lang="en-GB" dirty="0"/>
+          </a:p>
+          <a:p>
+            <a:pPr marL="0" indent="0">
+              <a:buNone/>
+            </a:pPr>
+            <a:endParaRPr lang="en-GB" dirty="0"/>
+          </a:p>
+          <a:p>
+            <a:pPr marL="0" indent="0">
+              <a:buNone/>
+            </a:pPr>
+            <a:endParaRPr lang="en-GB" dirty="0"/>
+          </a:p>
+          <a:p>
+            <a:pPr marL="0" indent="0">
+              <a:buNone/>
+            </a:pPr>
+            <a:endParaRPr lang="en-GB" dirty="0"/>
+          </a:p>
+          <a:p>
+            <a:pPr marL="0" indent="0">
+              <a:buNone/>
+            </a:pPr>
+            <a:endParaRPr lang="en-GB" dirty="0"/>
+          </a:p>
+          <a:p>
+            <a:pPr marL="0" indent="0">
+              <a:buNone/>
+            </a:pPr>
+            <a:endParaRPr lang="en-GB" dirty="0"/>
+          </a:p>
+          <a:p>
+            <a:pPr marL="0" indent="0">
+              <a:buNone/>
+            </a:pPr>
+            <a:endParaRPr lang="en-GB" dirty="0"/>
+          </a:p>
+          <a:p>
+            <a:pPr marL="0" indent="0">
+              <a:buNone/>
+            </a:pPr>
+            <a:endParaRPr lang="en-GB" dirty="0"/>
+          </a:p>
+          <a:p>
+            <a:pPr marL="0" indent="0">
+              <a:buNone/>
+            </a:pPr>
+            <a:endParaRPr lang="en-GB" dirty="0"/>
+          </a:p>
+          <a:p>
+            <a:pPr marL="0" indent="0">
+              <a:buNone/>
+            </a:pPr>
+            <a:endParaRPr lang="en-GB" dirty="0"/>
+          </a:p>
+          <a:p>
+            <a:pPr marL="0" indent="0">
+              <a:buNone/>
+            </a:pPr>
+            <a:endParaRPr lang="en-GB" dirty="0"/>
+          </a:p>
+          <a:p>
+            <a:pPr marL="0" indent="0">
+              <a:buNone/>
+            </a:pPr>
+            <a:endParaRPr lang="en-GB" dirty="0"/>
+          </a:p>
+          <a:p>
+            <a:pPr marL="0" indent="0">
+              <a:buNone/>
+            </a:pPr>
+            <a:endParaRPr lang="en-GB" dirty="0"/>
+          </a:p>
+          <a:p>
+            <a:pPr marL="0" indent="0">
+              <a:buNone/>
+            </a:pPr>
+            <a:endParaRPr lang="en-GB" dirty="0"/>
+          </a:p>
+          <a:p>
+            <a:pPr marL="0" indent="0">
+              <a:buNone/>
+            </a:pPr>
+            <a:endParaRPr lang="en-GB" dirty="0"/>
+          </a:p>
+          <a:p>
+            <a:pPr marL="0" indent="0">
+              <a:buNone/>
+            </a:pPr>
+            <a:endParaRPr lang="en-GB" dirty="0"/>
+          </a:p>
+          <a:p>
+            <a:pPr marL="0" indent="0">
+              <a:buNone/>
+            </a:pPr>
+            <a:endParaRPr lang="en-GB" dirty="0"/>
+          </a:p>
+          <a:p>
+            <a:pPr marL="0" indent="0">
+              <a:buNone/>
+            </a:pPr>
+            <a:endParaRPr lang="en-GB" dirty="0"/>
+          </a:p>
+          <a:p>
+            <a:pPr marL="0" indent="0">
+              <a:buNone/>
+            </a:pPr>
+            <a:endParaRPr lang="en-GB" dirty="0"/>
+          </a:p>
+          <a:p>
+            <a:pPr marL="0" indent="0">
+              <a:buNone/>
+            </a:pPr>
+            <a:endParaRPr lang="en-GB" dirty="0"/>
+          </a:p>
+          <a:p>
+            <a:pPr marL="0" indent="0">
+              <a:buNone/>
+            </a:pPr>
+            <a:endParaRPr lang="en-GB" dirty="0"/>
+          </a:p>
+          <a:p>
+            <a:pPr marL="0" indent="0">
+              <a:buNone/>
+            </a:pPr>
+            <a:endParaRPr lang="en-GB" dirty="0"/>
+          </a:p>
+          <a:p>
+            <a:pPr marL="0" indent="0">
+              <a:buNone/>
+            </a:pPr>
+            <a:endParaRPr lang="en-GB" dirty="0"/>
+          </a:p>
+          <a:p>
+            <a:pPr marL="0" indent="0">
+              <a:buNone/>
+            </a:pPr>
+            <a:endParaRPr lang="en-GB" dirty="0"/>
+          </a:p>
+          <a:p>
+            <a:pPr marL="0" indent="0">
+              <a:buNone/>
+            </a:pPr>
+            <a:endParaRPr lang="en-GB" dirty="0"/>
+          </a:p>
+          <a:p>
+            <a:pPr marL="0" indent="0">
+              <a:buNone/>
+            </a:pPr>
+            <a:endParaRPr lang="en-GB" dirty="0"/>
+          </a:p>
+          <a:p>
+            <a:pPr marL="0" indent="0">
+              <a:buNone/>
+            </a:pPr>
+            <a:endParaRPr lang="en-GB" dirty="0"/>
+          </a:p>
+          <a:p>
+            <a:pPr marL="0" indent="0">
+              <a:buNone/>
+            </a:pPr>
+            <a:endParaRPr lang="en-GB" dirty="0"/>
+          </a:p>
+          <a:p>
+            <a:pPr marL="0" indent="0">
+              <a:buNone/>
+            </a:pPr>
+            <a:endParaRPr lang="en-GB" dirty="0"/>
+          </a:p>
+          <a:p>
+            <a:pPr marL="0" indent="0">
+              <a:buNone/>
+            </a:pPr>
+            <a:endParaRPr lang="en-GB" dirty="0"/>
+          </a:p>
+          <a:p>
+            <a:pPr marL="0" indent="0">
+              <a:buNone/>
+            </a:pPr>
+            <a:endParaRPr lang="en-GB" dirty="0"/>
+          </a:p>
+          <a:p>
+            <a:pPr marL="0" indent="0">
+              <a:buNone/>
+            </a:pPr>
+            <a:endParaRPr lang="en-GB" dirty="0"/>
+          </a:p>
+          <a:p>
+            <a:pPr marL="0" indent="0">
+              <a:buNone/>
+            </a:pPr>
+            <a:endParaRPr lang="en-GB" dirty="0"/>
+          </a:p>
+          <a:p>
+            <a:pPr marL="0" indent="0">
+              <a:buNone/>
+            </a:pPr>
+            <a:endParaRPr lang="en-GB" dirty="0"/>
+          </a:p>
+          <a:p>
+            <a:pPr marL="0" indent="0">
+              <a:buNone/>
+            </a:pPr>
+            <a:endParaRPr lang="en-GB" dirty="0"/>
+          </a:p>
+          <a:p>
+            <a:pPr marL="0" indent="0">
+              <a:buNone/>
+            </a:pPr>
+            <a:endParaRPr lang="en-GB" dirty="0"/>
+          </a:p>
+          <a:p>
+            <a:pPr marL="0" indent="0">
+              <a:buNone/>
+            </a:pPr>
+            <a:endParaRPr lang="en-GB" dirty="0"/>
+          </a:p>
+          <a:p>
+            <a:pPr marL="0" indent="0">
+              <a:buNone/>
+            </a:pPr>
+            <a:endParaRPr lang="en-GB" dirty="0"/>
+          </a:p>
+          <a:p>
+            <a:pPr marL="0" indent="0">
+              <a:buNone/>
+            </a:pPr>
+            <a:endParaRPr lang="en-GB" dirty="0"/>
+          </a:p>
+          <a:p>
+            <a:pPr marL="0" indent="0">
+              <a:buNone/>
+            </a:pPr>
+            <a:endParaRPr lang="en-GB" dirty="0"/>
+          </a:p>
+          <a:p>
+            <a:pPr marL="0" indent="0">
+              <a:buNone/>
+            </a:pPr>
+            <a:endParaRPr lang="en-GB" dirty="0"/>
+          </a:p>
+          <a:p>
+            <a:pPr marL="0" indent="0">
+              <a:buNone/>
+            </a:pPr>
+            <a:endParaRPr lang="en-GB" dirty="0"/>
+          </a:p>
+          <a:p>
+            <a:pPr marL="0" indent="0">
+              <a:buNone/>
+            </a:pPr>
+            <a:endParaRPr lang="en-GB" dirty="0"/>
+          </a:p>
+          <a:p>
+            <a:pPr marL="0" indent="0">
+              <a:buNone/>
+            </a:pPr>
+            <a:endParaRPr lang="en-GB" dirty="0"/>
+          </a:p>
+          <a:p>
+            <a:pPr marL="0" indent="0">
+              <a:buNone/>
+            </a:pPr>
+            <a:endParaRPr lang="en-GB" dirty="0"/>
+          </a:p>
+          <a:p>
+            <a:pPr marL="0" indent="0">
+              <a:buNone/>
+            </a:pPr>
+            <a:endParaRPr lang="en-GB" dirty="0"/>
+          </a:p>
+          <a:p>
+            <a:pPr marL="0" indent="0">
+              <a:buNone/>
+            </a:pPr>
+            <a:endParaRPr lang="en-GB" dirty="0"/>
+          </a:p>
+          <a:p>
+            <a:pPr marL="0" indent="0">
+              <a:buNone/>
+            </a:pPr>
+            <a:endParaRPr lang="en-GB" dirty="0"/>
+          </a:p>
+          <a:p>
+            <a:pPr marL="0" indent="0">
+              <a:buNone/>
+            </a:pPr>
+            <a:endParaRPr lang="en-GB" dirty="0"/>
+          </a:p>
+          <a:p>
+            <a:pPr marL="0" indent="0">
+              <a:buNone/>
+            </a:pPr>
+            <a:endParaRPr lang="en-GB" dirty="0"/>
+          </a:p>
+          <a:p>
+            <a:pPr marL="0" indent="0">
+              <a:buNone/>
+            </a:pPr>
+            <a:endParaRPr lang="en-GB" dirty="0"/>
+          </a:p>
+          <a:p>
+            <a:pPr marL="0" indent="0">
+              <a:buNone/>
+            </a:pPr>
+            <a:endParaRPr lang="en-GB" dirty="0"/>
+          </a:p>
+          <a:p>
+            <a:pPr marL="0" indent="0">
+              <a:buNone/>
+            </a:pPr>
+            <a:endParaRPr lang="en-GB" dirty="0"/>
+          </a:p>
+          <a:p>
+            <a:pPr marL="0" indent="0">
+              <a:buNone/>
+            </a:pPr>
+            <a:endParaRPr lang="en-GB" dirty="0"/>
+          </a:p>
+          <a:p>
+            <a:pPr marL="0" indent="0">
+              <a:buNone/>
+            </a:pPr>
+            <a:endParaRPr lang="en-GB" dirty="0"/>
+          </a:p>
+          <a:p>
+            <a:pPr marL="0" indent="0">
+              <a:buNone/>
+            </a:pPr>
+            <a:endParaRPr lang="en-GB" dirty="0"/>
+          </a:p>
+          <a:p>
+            <a:pPr marL="0" indent="0">
+              <a:buNone/>
+            </a:pPr>
+            <a:endParaRPr lang="en-GB" dirty="0"/>
+          </a:p>
+          <a:p>
+            <a:pPr marL="0" indent="0">
+              <a:buNone/>
+            </a:pPr>
+            <a:endParaRPr lang="en-GB" dirty="0"/>
+          </a:p>
+          <a:p>
+            <a:pPr marL="0" indent="0">
+              <a:buNone/>
+            </a:pPr>
+            <a:endParaRPr lang="en-GB" dirty="0"/>
+          </a:p>
+          <a:p>
+            <a:pPr marL="0" indent="0">
+              <a:buNone/>
+            </a:pPr>
+            <a:endParaRPr lang="en-GB" dirty="0"/>
+          </a:p>
+          <a:p>
+            <a:pPr marL="0" indent="0">
+              <a:buNone/>
+            </a:pPr>
+            <a:endParaRPr lang="en-GB" dirty="0"/>
+          </a:p>
+          <a:p>
+            <a:pPr marL="0" indent="0">
+              <a:buNone/>
+            </a:pPr>
+            <a:endParaRPr lang="en-GB" dirty="0"/>
+          </a:p>
+          <a:p>
+            <a:pPr marL="0" indent="0">
+              <a:buNone/>
+            </a:pPr>
+            <a:endParaRPr lang="en-GB" dirty="0"/>
+          </a:p>
+          <a:p>
+            <a:pPr marL="0" indent="0">
+              <a:buNone/>
+            </a:pPr>
+            <a:endParaRPr lang="en-GB" dirty="0"/>
+          </a:p>
+          <a:p>
+            <a:pPr marL="0" indent="0">
+              <a:buNone/>
+            </a:pPr>
+            <a:endParaRPr lang="en-GB" dirty="0"/>
+          </a:p>
+          <a:p>
+            <a:pPr marL="0" indent="0">
+              <a:buNone/>
+            </a:pPr>
+            <a:endParaRPr lang="en-GB" dirty="0"/>
+          </a:p>
+          <a:p>
+            <a:pPr marL="0" indent="0">
+              <a:buNone/>
+            </a:pPr>
+            <a:endParaRPr lang="en-GB" dirty="0"/>
+          </a:p>
+          <a:p>
+            <a:pPr marL="0" indent="0">
+              <a:buNone/>
+            </a:pPr>
+            <a:endParaRPr lang="en-GB" dirty="0"/>
+          </a:p>
+          <a:p>
+            <a:pPr marL="0" indent="0">
+              <a:buNone/>
+            </a:pPr>
+            <a:endParaRPr lang="en-GB" dirty="0"/>
+          </a:p>
+          <a:p>
+            <a:pPr marL="0" indent="0">
+              <a:buNone/>
+            </a:pPr>
+            <a:endParaRPr lang="en-GB" dirty="0"/>
+          </a:p>
+          <a:p>
+            <a:pPr marL="0" indent="0">
+              <a:buNone/>
+            </a:pPr>
+            <a:endParaRPr lang="en-GB" dirty="0"/>
+          </a:p>
+          <a:p>
+            <a:pPr marL="0" indent="0">
+              <a:buNone/>
+            </a:pPr>
+            <a:endParaRPr lang="en-GB" dirty="0"/>
+          </a:p>
+          <a:p>
+            <a:pPr marL="0" indent="0">
+              <a:buNone/>
+            </a:pPr>
+            <a:endParaRPr lang="en-GB" dirty="0"/>
+          </a:p>
+          <a:p>
+            <a:pPr marL="0" indent="0">
+              <a:buNone/>
+            </a:pPr>
+            <a:endParaRPr lang="en-GB" dirty="0"/>
+          </a:p>
+          <a:p>
+            <a:pPr marL="0" indent="0">
+              <a:buNone/>
+            </a:pPr>
+            <a:endParaRPr lang="en-GB" dirty="0"/>
+          </a:p>
+          <a:p>
+            <a:pPr marL="0" indent="0">
+              <a:buNone/>
+            </a:pPr>
+            <a:endParaRPr lang="en-GB" dirty="0"/>
+          </a:p>
+          <a:p>
+            <a:pPr marL="0" indent="0">
+              <a:buNone/>
+            </a:pPr>
+            <a:endParaRPr lang="en-GB" dirty="0"/>
+          </a:p>
+          <a:p>
+            <a:pPr marL="0" indent="0">
+              <a:buNone/>
+            </a:pPr>
+            <a:endParaRPr lang="en-GB" dirty="0"/>
+          </a:p>
+          <a:p>
+            <a:pPr marL="0" indent="0">
+              <a:buNone/>
+            </a:pPr>
+            <a:endParaRPr lang="en-GB" dirty="0"/>
+          </a:p>
+          <a:p>
+            <a:pPr marL="0" indent="0">
+              <a:buNone/>
+            </a:pPr>
+            <a:endParaRPr lang="en-GB" dirty="0"/>
+          </a:p>
+          <a:p>
+            <a:pPr marL="0" indent="0">
+              <a:buNone/>
+            </a:pPr>
+            <a:endParaRPr lang="en-GB" dirty="0"/>
+          </a:p>
+          <a:p>
+            <a:pPr marL="0" indent="0">
+              <a:buNone/>
+            </a:pPr>
+            <a:endParaRPr lang="en-GB" dirty="0"/>
+          </a:p>
+          <a:p>
+            <a:pPr marL="0" indent="0">
+              <a:buNone/>
+            </a:pPr>
+            <a:endParaRPr lang="en-GB" dirty="0"/>
+          </a:p>
+          <a:p>
+            <a:pPr marL="0" indent="0">
+              <a:buNone/>
+            </a:pPr>
+            <a:endParaRPr lang="en-GB" dirty="0"/>
+          </a:p>
+          <a:p>
+            <a:pPr marL="0" indent="0">
+              <a:buNone/>
+            </a:pPr>
+            <a:endParaRPr lang="en-GB" dirty="0"/>
+          </a:p>
+          <a:p>
+            <a:pPr marL="0" indent="0">
+              <a:buNone/>
+            </a:pPr>
+            <a:endParaRPr lang="en-GB" dirty="0"/>
+          </a:p>
+          <a:p>
+            <a:pPr marL="0" indent="0">
+              <a:buNone/>
+            </a:pPr>
+            <a:endParaRPr lang="en-GB" dirty="0"/>
+          </a:p>
+          <a:p>
+            <a:pPr marL="0" indent="0">
+              <a:buNone/>
+            </a:pPr>
+            <a:endParaRPr lang="en-GB" dirty="0"/>
+          </a:p>
+          <a:p>
+            <a:pPr marL="0" indent="0">
+              <a:buNone/>
+            </a:pPr>
+            <a:endParaRPr lang="en-GB" dirty="0"/>
+          </a:p>
+          <a:p>
+            <a:pPr marL="0" indent="0">
+              <a:buNone/>
+            </a:pPr>
+            <a:endParaRPr lang="en-GB" dirty="0"/>
+          </a:p>
+          <a:p>
+            <a:pPr marL="0" indent="0">
+              <a:buNone/>
+            </a:pPr>
+            <a:endParaRPr lang="en-GB" dirty="0"/>
+          </a:p>
+          <a:p>
+            <a:pPr marL="0" indent="0">
+              <a:buNone/>
+            </a:pPr>
+            <a:endParaRPr lang="en-GB" dirty="0"/>
+          </a:p>
+          <a:p>
+            <a:pPr marL="0" indent="0">
+              <a:buNone/>
+            </a:pPr>
+            <a:endParaRPr lang="en-GB" dirty="0"/>
+          </a:p>
+          <a:p>
+            <a:pPr marL="0" indent="0">
+              <a:buNone/>
+            </a:pPr>
+            <a:endParaRPr lang="en-GB" dirty="0"/>
+          </a:p>
+          <a:p>
+            <a:pPr marL="0" indent="0">
+              <a:buNone/>
+            </a:pPr>
+            <a:endParaRPr lang="en-GB" dirty="0"/>
+          </a:p>
+          <a:p>
+            <a:pPr marL="0" indent="0">
+              <a:buNone/>
+            </a:pPr>
+            <a:endParaRPr lang="en-GB" dirty="0"/>
+          </a:p>
+          <a:p>
+            <a:pPr marL="0" indent="0">
+              <a:buNone/>
+            </a:pPr>
+            <a:endParaRPr lang="en-GB" dirty="0"/>
+          </a:p>
+          <a:p>
+            <a:pPr marL="0" indent="0">
+              <a:buNone/>
+            </a:pPr>
+            <a:endParaRPr lang="en-GB" dirty="0"/>
+          </a:p>
+          <a:p>
+            <a:pPr marL="0" indent="0">
+              <a:buNone/>
+            </a:pPr>
+            <a:endParaRPr lang="en-GB" dirty="0"/>
+          </a:p>
+          <a:p>
+            <a:pPr marL="0" indent="0">
+              <a:buNone/>
+            </a:pPr>
+            <a:endParaRPr lang="en-GB" dirty="0"/>
+          </a:p>
+          <a:p>
+            <a:pPr marL="0" indent="0">
+              <a:buNone/>
+            </a:pPr>
+            <a:endParaRPr lang="en-GB" dirty="0"/>
+          </a:p>
+          <a:p>
+            <a:pPr marL="0" indent="0">
+              <a:buNone/>
+            </a:pPr>
+            <a:endParaRPr lang="en-GB" dirty="0"/>
+          </a:p>
+          <a:p>
+            <a:pPr marL="0" indent="0">
+              <a:buNone/>
+            </a:pPr>
+            <a:endParaRPr lang="en-GB" dirty="0"/>
+          </a:p>
+          <a:p>
+            <a:pPr marL="0" indent="0">
+              <a:buNone/>
+            </a:pPr>
+            <a:endParaRPr lang="en-GB" dirty="0"/>
+          </a:p>
+          <a:p>
+            <a:pPr marL="0" indent="0">
+              <a:buNone/>
+            </a:pPr>
+            <a:endParaRPr lang="en-GB" dirty="0"/>
+          </a:p>
+          <a:p>
+            <a:pPr marL="0" indent="0">
+              <a:buNone/>
+            </a:pPr>
+            <a:endParaRPr lang="en-GB" dirty="0"/>
+          </a:p>
+          <a:p>
+            <a:pPr marL="0" indent="0">
+              <a:buNone/>
+            </a:pPr>
+            <a:endParaRPr lang="en-GB" dirty="0"/>
+          </a:p>
+          <a:p>
+            <a:pPr marL="0" indent="0">
+              <a:buNone/>
+            </a:pPr>
+            <a:endParaRPr lang="en-GB" dirty="0"/>
+          </a:p>
+          <a:p>
+            <a:pPr marL="0" indent="0">
+              <a:buNone/>
+            </a:pPr>
+            <a:endParaRPr lang="en-GB" dirty="0"/>
+          </a:p>
+          <a:p>
+            <a:pPr marL="0" indent="0">
+              <a:buNone/>
+            </a:pPr>
+            <a:endParaRPr lang="en-GB" dirty="0"/>
+          </a:p>
+          <a:p>
+            <a:pPr marL="0" indent="0">
+              <a:buNone/>
+            </a:pPr>
+            <a:endParaRPr lang="en-GB" dirty="0"/>
+          </a:p>
+          <a:p>
+            <a:pPr marL="0" indent="0">
+              <a:buNone/>
+            </a:pPr>
+            <a:endParaRPr lang="en-GB" dirty="0"/>
+          </a:p>
+          <a:p>
+            <a:pPr marL="0" indent="0">
+              <a:buNone/>
+            </a:pPr>
+            <a:endParaRPr lang="en-GB" dirty="0"/>
+          </a:p>
+          <a:p>
+            <a:pPr marL="0" indent="0">
+              <a:buNone/>
+            </a:pPr>
+            <a:endParaRPr lang="en-GB" dirty="0"/>
+          </a:p>
+          <a:p>
+            <a:pPr marL="0" indent="0">
+              <a:buNone/>
+            </a:pPr>
+            <a:endParaRPr lang="en-GB" dirty="0"/>
+          </a:p>
+          <a:p>
+            <a:pPr marL="0" indent="0">
+              <a:buNone/>
+            </a:pPr>
+            <a:endParaRPr lang="en-GB" dirty="0"/>
+          </a:p>
+          <a:p>
+            <a:pPr marL="0" indent="0">
+              <a:buNone/>
+            </a:pPr>
+            <a:endParaRPr lang="en-GB" dirty="0"/>
+          </a:p>
+          <a:p>
+            <a:pPr marL="0" indent="0">
+              <a:buNone/>
+            </a:pPr>
+            <a:endParaRPr lang="en-GB" dirty="0"/>
+          </a:p>
+          <a:p>
+            <a:pPr marL="0" indent="0">
+              <a:buNone/>
+            </a:pPr>
+            <a:endParaRPr lang="en-GB" dirty="0"/>
+          </a:p>
+          <a:p>
+            <a:pPr marL="0" indent="0">
+              <a:buNone/>
+            </a:pPr>
+            <a:endParaRPr lang="en-GB" dirty="0"/>
+          </a:p>
+          <a:p>
+            <a:pPr marL="0" indent="0">
+              <a:buNone/>
+            </a:pPr>
+            <a:endParaRPr lang="en-GB" dirty="0"/>
+          </a:p>
+          <a:p>
+            <a:pPr marL="0" indent="0">
+              <a:buNone/>
+            </a:pPr>
+            <a:endParaRPr lang="en-GB" dirty="0"/>
+          </a:p>
+          <a:p>
+            <a:pPr marL="0" indent="0">
+              <a:buNone/>
+            </a:pPr>
+            <a:endParaRPr lang="en-GB" dirty="0"/>
+          </a:p>
+          <a:p>
+            <a:pPr marL="0" indent="0">
+              <a:buNone/>
+            </a:pPr>
+            <a:endParaRPr lang="en-GB" dirty="0"/>
+          </a:p>
+          <a:p>
+            <a:pPr marL="0" indent="0">
+              <a:buNone/>
+            </a:pPr>
+            <a:endParaRPr lang="en-GB" dirty="0"/>
+          </a:p>
+          <a:p>
+            <a:pPr marL="0" indent="0">
+              <a:buNone/>
+            </a:pPr>
+            <a:endParaRPr lang="en-GB" dirty="0"/>
+          </a:p>
+          <a:p>
+            <a:pPr marL="0" indent="0">
+              <a:buNone/>
+            </a:pPr>
+            <a:endParaRPr lang="en-GB" dirty="0"/>
+          </a:p>
+          <a:p>
+            <a:pPr marL="0" indent="0">
+              <a:buNone/>
+            </a:pPr>
+            <a:endParaRPr lang="en-GB" dirty="0"/>
+          </a:p>
+          <a:p>
+            <a:pPr marL="0" indent="0">
+              <a:buNone/>
+            </a:pPr>
+            <a:endParaRPr lang="en-GB" dirty="0"/>
+          </a:p>
+          <a:p>
+            <a:pPr marL="0" indent="0">
+              <a:buNone/>
+            </a:pPr>
+            <a:endParaRPr lang="en-GB" dirty="0"/>
+          </a:p>
+          <a:p>
+            <a:pPr marL="0" indent="0">
+              <a:buNone/>
+            </a:pPr>
+            <a:endParaRPr lang="en-GB" dirty="0"/>
+          </a:p>
+          <a:p>
+            <a:pPr marL="0" indent="0">
+              <a:buNone/>
+            </a:pPr>
+            <a:endParaRPr lang="en-GB" dirty="0"/>
+          </a:p>
+          <a:p>
+            <a:pPr marL="0" indent="0">
+              <a:buNone/>
+            </a:pPr>
+            <a:endParaRPr lang="en-GB" dirty="0"/>
+          </a:p>
+          <a:p>
+            <a:pPr marL="0" indent="0">
+              <a:buNone/>
+            </a:pPr>
+            <a:endParaRPr lang="en-GB" dirty="0"/>
+          </a:p>
+          <a:p>
+            <a:pPr marL="0" indent="0">
+              <a:buNone/>
+            </a:pPr>
+            <a:endParaRPr lang="en-GB" dirty="0"/>
+          </a:p>
+          <a:p>
+            <a:pPr marL="0" indent="0">
+              <a:buNone/>
+            </a:pPr>
+            <a:endParaRPr lang="en-GB" dirty="0"/>
+          </a:p>
+          <a:p>
+            <a:pPr marL="0" indent="0">
+              <a:buNone/>
+            </a:pPr>
+            <a:endParaRPr lang="en-GB" dirty="0"/>
+          </a:p>
+          <a:p>
+            <a:pPr marL="0" indent="0">
+              <a:buNone/>
+            </a:pPr>
+            <a:endParaRPr lang="en-GB" dirty="0"/>
+          </a:p>
+          <a:p>
+            <a:pPr marL="0" indent="0">
+              <a:buNone/>
+            </a:pPr>
+            <a:endParaRPr lang="en-GB" dirty="0"/>
+          </a:p>
+          <a:p>
+            <a:pPr marL="0" indent="0">
+              <a:buNone/>
+            </a:pPr>
+            <a:endParaRPr lang="en-GB" dirty="0"/>
+          </a:p>
+          <a:p>
+            <a:pPr marL="0" indent="0">
+              <a:buNone/>
+            </a:pPr>
+            <a:endParaRPr lang="en-GB" dirty="0"/>
+          </a:p>
+          <a:p>
+            <a:pPr marL="0" indent="0">
+              <a:buNone/>
+            </a:pPr>
+            <a:endParaRPr lang="en-GB" dirty="0"/>
+          </a:p>
+          <a:p>
+            <a:pPr marL="0" indent="0">
+              <a:buNone/>
+            </a:pPr>
+            <a:endParaRPr lang="en-GB" dirty="0"/>
+          </a:p>
+          <a:p>
+            <a:pPr marL="0" indent="0">
+              <a:buNone/>
+            </a:pPr>
+            <a:endParaRPr lang="en-GB" dirty="0"/>
+          </a:p>
+          <a:p>
+            <a:pPr marL="0" indent="0">
+              <a:buNone/>
+            </a:pPr>
+            <a:endParaRPr lang="en-GB" dirty="0"/>
+          </a:p>
+          <a:p>
+            <a:pPr marL="0" indent="0">
+              <a:buNone/>
+            </a:pPr>
+            <a:endParaRPr lang="en-GB" dirty="0"/>
+          </a:p>
+          <a:p>
+            <a:pPr marL="0" indent="0">
+              <a:buNone/>
+            </a:pPr>
+            <a:r>
+              <a:rPr lang="en-GB" dirty="0"/>
+              <a:t>Pankaj</a:t>
+            </a:r>
+          </a:p>
+          <a:p>
+            <a:pPr marL="0" indent="0">
+              <a:buNone/>
+            </a:pPr>
+            <a:endParaRPr lang="en-GB" dirty="0"/>
+          </a:p>
+          <a:p>
+            <a:pPr marL="0" indent="0">
+              <a:buNone/>
+            </a:pPr>
+            <a:endParaRPr lang="en-GB" dirty="0"/>
+          </a:p>
+          <a:p>
+            <a:pPr marL="0" indent="0">
+              <a:buNone/>
+            </a:pPr>
+            <a:endParaRPr lang="en-GB" dirty="0"/>
+          </a:p>
+          <a:p>
+            <a:pPr marL="0" indent="0">
+              <a:buNone/>
+            </a:pPr>
+            <a:endParaRPr lang="en-GB" dirty="0"/>
+          </a:p>
+        </p:txBody>
+      </p:sp>
+    </p:spTree>
+    <p:extLst>
+      <p:ext uri="{BB962C8B-B14F-4D97-AF65-F5344CB8AC3E}">
+        <p14:creationId xmlns:p14="http://schemas.microsoft.com/office/powerpoint/2010/main" val="1893057290"/>
+      </p:ext>
+    </p:extLst>
+  </p:cSld>
+  <p:clrMapOvr>
+    <a:masterClrMapping/>
+  </p:clrMapOvr>
+</p:sld>
+</file>
+
+<file path=ppt/slides/slide38.xml><?xml version="1.0" encoding="utf-8"?>
+<p:sld xmlns:a="http://schemas.openxmlformats.org/drawingml/2006/main" xmlns:r="http://schemas.openxmlformats.org/officeDocument/2006/relationships" xmlns:p="http://schemas.openxmlformats.org/presentationml/2006/main">
+  <p:cSld>
+    <p:spTree>
+      <p:nvGrpSpPr>
+        <p:cNvPr id="1" name=""/>
+        <p:cNvGrpSpPr/>
+        <p:nvPr/>
+      </p:nvGrpSpPr>
+      <p:grpSpPr>
+        <a:xfrm>
+          <a:off x="0" y="0"/>
+          <a:ext cx="0" cy="0"/>
+          <a:chOff x="0" y="0"/>
+          <a:chExt cx="0" cy="0"/>
+        </a:xfrm>
+      </p:grpSpPr>
+      <p:sp>
+        <p:nvSpPr>
+          <p:cNvPr id="4" name="Title 3">
+            <a:extLst>
+              <a:ext uri="{FF2B5EF4-FFF2-40B4-BE49-F238E27FC236}">
+                <a16:creationId xmlns:a16="http://schemas.microsoft.com/office/drawing/2014/main" id="{EA8558A0-16AF-40A2-94AF-AFFDBFB63E72}"/>
+              </a:ext>
+            </a:extLst>
+          </p:cNvPr>
+          <p:cNvSpPr>
+            <a:spLocks noGrp="1"/>
+          </p:cNvSpPr>
+          <p:nvPr>
+            <p:ph type="title"/>
+          </p:nvPr>
+        </p:nvSpPr>
+        <p:spPr/>
+        <p:txBody>
+          <a:bodyPr/>
+          <a:lstStyle/>
+          <a:p>
+            <a:r>
+              <a:rPr lang="en-US" dirty="0"/>
+              <a:t>THANK YOU!</a:t>
+            </a:r>
+            <a:endParaRPr lang="en-GB" dirty="0"/>
+          </a:p>
+        </p:txBody>
+      </p:sp>
+    </p:spTree>
+    <p:extLst>
+      <p:ext uri="{BB962C8B-B14F-4D97-AF65-F5344CB8AC3E}">
+        <p14:creationId xmlns:p14="http://schemas.microsoft.com/office/powerpoint/2010/main" val="492460600"/>
       </p:ext>
     </p:extLst>
   </p:cSld>
@@ -7115,41 +11550,31 @@
         <p:spPr/>
         <p:txBody>
           <a:bodyPr>
-            <a:normAutofit fontScale="55000" lnSpcReduction="20000"/>
+            <a:normAutofit fontScale="70000" lnSpcReduction="20000"/>
           </a:bodyPr>
           <a:lstStyle/>
           <a:p>
             <a:r>
               <a:rPr lang="en-GB" dirty="0"/>
-              <a:t>Develop a web application using </a:t>
-            </a:r>
-            <a:r>
-              <a:rPr lang="en-US" dirty="0"/>
-              <a:t>Java, spring boot, spring security, rest APIs, mongo dB database</a:t>
+              <a:t>Develop a web application to connect college, student, alumni and recruiter</a:t>
             </a:r>
           </a:p>
           <a:p>
             <a:r>
               <a:rPr lang="en-GB" dirty="0"/>
-              <a:t>Connects college, student, alumni, recruiter</a:t>
+              <a:t>Placement cell management for colleges</a:t>
             </a:r>
           </a:p>
           <a:p>
             <a:r>
               <a:rPr lang="en-GB" dirty="0"/>
-              <a:t>Placement cell management for college</a:t>
+              <a:t>Student or alumni hiring for recruiters</a:t>
             </a:r>
           </a:p>
           <a:p>
             <a:r>
               <a:rPr lang="en-GB" dirty="0"/>
-              <a:t>Student or alumni hiring for recruiter</a:t>
-            </a:r>
-          </a:p>
-          <a:p>
-            <a:r>
-              <a:rPr lang="en-GB" dirty="0"/>
-              <a:t>Job finding opportunity for student or alumni</a:t>
+              <a:t>Job finding opportunity for student and alumni</a:t>
             </a:r>
           </a:p>
         </p:txBody>
@@ -7493,103 +11918,71 @@
         <p:spPr/>
         <p:txBody>
           <a:bodyPr>
-            <a:normAutofit fontScale="55000" lnSpcReduction="20000"/>
+            <a:normAutofit fontScale="92500" lnSpcReduction="20000"/>
           </a:bodyPr>
           <a:lstStyle/>
           <a:p>
             <a:r>
-              <a:rPr lang="en-GB" dirty="0"/>
+              <a:rPr lang="en-GB" sz="2000" dirty="0"/>
               <a:t>Operating System:</a:t>
             </a:r>
           </a:p>
           <a:p>
             <a:pPr lvl="1"/>
             <a:r>
-              <a:rPr lang="en-GB" dirty="0"/>
-              <a:t>Windows 7 or above,       </a:t>
+              <a:rPr lang="en-GB" sz="1800" dirty="0"/>
+              <a:t>Windows 7+       </a:t>
             </a:r>
           </a:p>
           <a:p>
             <a:pPr lvl="1"/>
             <a:r>
-              <a:rPr lang="en-GB" dirty="0"/>
-              <a:t>Mac OS X  Yosemite 10.10 or above</a:t>
+              <a:rPr lang="en-GB" sz="1800" dirty="0"/>
+              <a:t>Mac OS X  Yosemite 10.10+</a:t>
             </a:r>
           </a:p>
           <a:p>
             <a:pPr lvl="1"/>
             <a:r>
-              <a:rPr lang="en-GB" dirty="0"/>
-              <a:t> 64-bit Ubuntu 14.04+</a:t>
-            </a:r>
-          </a:p>
-          <a:p>
-            <a:pPr lvl="1"/>
-            <a:r>
-              <a:rPr lang="en-GB" dirty="0"/>
-              <a:t> Debian 8+</a:t>
-            </a:r>
-          </a:p>
-          <a:p>
-            <a:pPr lvl="1"/>
-            <a:r>
-              <a:rPr lang="en-GB" dirty="0"/>
-              <a:t> openSUSE 13.3+ or Fedora Linux 24+</a:t>
-            </a:r>
-          </a:p>
-          <a:p>
-            <a:r>
-              <a:rPr lang="en-GB" dirty="0"/>
+              <a:rPr lang="en-GB" sz="1800" dirty="0"/>
+              <a:t> Linux: 64-bit Ubuntu 14.04+, Debian 8+,  openSUSE 13.3+ or Fedora Linux 24+</a:t>
+            </a:r>
+          </a:p>
+          <a:p>
+            <a:r>
+              <a:rPr lang="en-GB" sz="2000" dirty="0"/>
               <a:t>Front end:  </a:t>
             </a:r>
             <a:r>
-              <a:rPr lang="en-US" dirty="0"/>
-              <a:t>Spring boot and </a:t>
-            </a:r>
-          </a:p>
-          <a:p>
-            <a:pPr marL="0" indent="0">
-              <a:buNone/>
-            </a:pPr>
-            <a:r>
-              <a:rPr lang="en-US" dirty="0"/>
-              <a:t>    spring  security core</a:t>
-            </a:r>
-          </a:p>
-          <a:p>
-            <a:r>
-              <a:rPr lang="en-GB" dirty="0"/>
+              <a:rPr lang="en-US" sz="2000" dirty="0"/>
+              <a:t>Spring boot and spring  security core</a:t>
+            </a:r>
+          </a:p>
+          <a:p>
+            <a:r>
+              <a:rPr lang="en-GB" sz="2000" dirty="0"/>
               <a:t>Back end:  MongoDB</a:t>
             </a:r>
           </a:p>
           <a:p>
             <a:r>
-              <a:rPr lang="en-GB" dirty="0"/>
-              <a:t>Supported browser:</a:t>
-            </a:r>
-          </a:p>
-          <a:p>
-            <a:pPr marL="0" indent="0">
-              <a:buNone/>
-            </a:pPr>
-            <a:r>
-              <a:rPr lang="en-GB" dirty="0"/>
-              <a:t>  Chrome, Firefox,  Internet Explorer 9  </a:t>
-            </a:r>
-          </a:p>
-          <a:p>
-            <a:pPr marL="0" indent="0">
-              <a:buNone/>
-            </a:pPr>
-            <a:r>
-              <a:rPr lang="en-GB" dirty="0"/>
+              <a:rPr lang="en-GB" sz="2000" dirty="0"/>
+              <a:t>Supported browsers: Chrome, Firefox,  Internet Explorer 9  </a:t>
+            </a:r>
+          </a:p>
+          <a:p>
+            <a:pPr marL="0" indent="0">
+              <a:buNone/>
+            </a:pPr>
+            <a:r>
+              <a:rPr lang="en-GB" sz="2000" dirty="0"/>
               <a:t>   and above</a:t>
             </a:r>
           </a:p>
           <a:p>
             <a:r>
-              <a:rPr lang="en-GB" dirty="0"/>
-              <a:t>Java version 1.8 and above</a:t>
+              <a:rPr lang="en-GB" sz="2000" dirty="0"/>
+              <a:t>Java version 1.8+</a:t>
             </a:r>
           </a:p>
         </p:txBody>
@@ -7679,6 +12072,15 @@
             </a:pPr>
             <a:r>
               <a:rPr lang="en-US" dirty="0"/>
+              <a:t>Software Requirements Specification (SRS), documents all expected functionalities of a system/application by the end user.</a:t>
+            </a:r>
+          </a:p>
+          <a:p>
+            <a:pPr marL="0" indent="0">
+              <a:buNone/>
+            </a:pPr>
+            <a:r>
+              <a:rPr lang="en-US" dirty="0"/>
               <a:t>Our SRS Document for this project can be found from </a:t>
             </a:r>
             <a:r>
@@ -7775,7 +12177,24 @@
           <a:bodyPr/>
           <a:lstStyle/>
           <a:p>
-            <a:endParaRPr lang="en-GB"/>
+            <a:pPr marL="0" indent="0">
+              <a:buNone/>
+            </a:pPr>
+            <a:r>
+              <a:rPr lang="en-US" dirty="0"/>
+              <a:t>A high level design of our project including all modules, functions, priorities and iterations has been made into an excel spreadsheet and can be found from </a:t>
+            </a:r>
+            <a:r>
+              <a:rPr lang="en-US" dirty="0">
+                <a:hlinkClick r:id="rId2"/>
+              </a:rPr>
+              <a:t>here</a:t>
+            </a:r>
+            <a:r>
+              <a:rPr lang="en-US" dirty="0"/>
+              <a:t>.</a:t>
+            </a:r>
+            <a:endParaRPr lang="en-GB" dirty="0"/>
           </a:p>
         </p:txBody>
       </p:sp>

</xml_diff>

<commit_message>
Corrected level 0 dfd, saved cropped and resized images from ppt to dfd folder
</commit_message>
<xml_diff>
--- a/Presentation for zeroth review/PPT for zeroth review.pptx
+++ b/Presentation for zeroth review/PPT for zeroth review.pptx
@@ -6197,41 +6197,6 @@
           <a:chExt cx="0" cy="0"/>
         </a:xfrm>
       </p:grpSpPr>
-      <p:pic>
-        <p:nvPicPr>
-          <p:cNvPr id="3" name="Content Placeholder 2">
-            <a:extLst>
-              <a:ext uri="{FF2B5EF4-FFF2-40B4-BE49-F238E27FC236}">
-                <a16:creationId xmlns:a16="http://schemas.microsoft.com/office/drawing/2014/main" id="{B43A98F5-15E6-4A67-9CD6-F54700711DD1}"/>
-              </a:ext>
-            </a:extLst>
-          </p:cNvPr>
-          <p:cNvPicPr>
-            <a:picLocks noGrp="1" noChangeAspect="1"/>
-          </p:cNvPicPr>
-          <p:nvPr>
-            <p:ph idx="1"/>
-          </p:nvPr>
-        </p:nvPicPr>
-        <p:blipFill>
-          <a:blip r:embed="rId2">
-            <a:extLst>
-              <a:ext uri="{28A0092B-C50C-407E-A947-70E740481C1C}">
-                <a14:useLocalDpi xmlns:a14="http://schemas.microsoft.com/office/drawing/2010/main" val="0"/>
-              </a:ext>
-            </a:extLst>
-          </a:blip>
-          <a:stretch>
-            <a:fillRect/>
-          </a:stretch>
-        </p:blipFill>
-        <p:spPr>
-          <a:xfrm>
-            <a:off x="2094567" y="1085295"/>
-            <a:ext cx="6951779" cy="4687409"/>
-          </a:xfrm>
-        </p:spPr>
-      </p:pic>
       <p:sp>
         <p:nvSpPr>
           <p:cNvPr id="4" name="TextBox 3">
@@ -6314,6 +6279,35 @@
           </a:p>
         </p:txBody>
       </p:sp>
+      <p:pic>
+        <p:nvPicPr>
+          <p:cNvPr id="8" name="Picture 7">
+            <a:extLst>
+              <a:ext uri="{FF2B5EF4-FFF2-40B4-BE49-F238E27FC236}">
+                <a16:creationId xmlns:a16="http://schemas.microsoft.com/office/drawing/2014/main" id="{5B547F91-4409-4C94-91AA-B7229E9BCEEA}"/>
+              </a:ext>
+            </a:extLst>
+          </p:cNvPr>
+          <p:cNvPicPr>
+            <a:picLocks noChangeAspect="1"/>
+          </p:cNvPicPr>
+          <p:nvPr/>
+        </p:nvPicPr>
+        <p:blipFill rotWithShape="1">
+          <a:blip r:embed="rId2"/>
+          <a:srcRect l="25970" t="18492" r="34851" b="24764"/>
+          <a:stretch/>
+        </p:blipFill>
+        <p:spPr>
+          <a:xfrm>
+            <a:off x="2192221" y="1000909"/>
+            <a:ext cx="6032292" cy="4912009"/>
+          </a:xfrm>
+          <a:prstGeom prst="rect">
+            <a:avLst/>
+          </a:prstGeom>
+        </p:spPr>
+      </p:pic>
     </p:spTree>
     <p:extLst>
       <p:ext uri="{BB962C8B-B14F-4D97-AF65-F5344CB8AC3E}">

</xml_diff>

<commit_message>
Corrected Software and hardware specifications, modified proposed methodology, spell & grammar check
</commit_message>
<xml_diff>
--- a/Presentation for zeroth review/PPT for zeroth review.pptx
+++ b/Presentation for zeroth review/PPT for zeroth review.pptx
@@ -188,9 +188,6 @@
             <p14:sldId id="265"/>
             <p14:sldId id="296"/>
           </p14:sldIdLst>
-        </p14:section>
-        <p14:section name="Default Section" id="{4F96BA1D-6A5F-4605-AF9D-7D0711F162FE}">
-          <p14:sldIdLst/>
         </p14:section>
       </p14:sectionLst>
     </p:ext>
@@ -6259,7 +6256,7 @@
         <p:spPr>
           <a:xfrm>
             <a:off x="2192221" y="5941475"/>
-            <a:ext cx="6032292" cy="369332"/>
+            <a:ext cx="6869253" cy="369332"/>
           </a:xfrm>
           <a:prstGeom prst="rect">
             <a:avLst/>
@@ -6274,7 +6271,7 @@
           <a:p>
             <a:r>
               <a:rPr lang="en-IN" dirty="0"/>
-              <a:t>Context Diagram for career information and Recruitment portal.</a:t>
+              <a:t>Level 0. Context Diagram for Career Information and Recruitment portal.</a:t>
             </a:r>
           </a:p>
         </p:txBody>
@@ -6949,7 +6946,7 @@
         <p:spPr>
           <a:xfrm>
             <a:off x="1020932" y="5406501"/>
-            <a:ext cx="10652550" cy="923330"/>
+            <a:ext cx="10652550" cy="1200329"/>
           </a:xfrm>
           <a:prstGeom prst="rect">
             <a:avLst/>
@@ -6964,7 +6961,7 @@
           <a:p>
             <a:r>
               <a:rPr lang="en-US" dirty="0"/>
-              <a:t> Level 1.2.1 - Request Recommendation (Recommendation module (1.2) has 2 functions - Request Recommendation and Recommend, both are implemented via separate interfaces and hence considered as sub-modules.) </a:t>
+              <a:t> Level 1.2.1 - Request Recommendation (Recommendation module (1.2) has two functions - Request Recommendation and Recommend, both are implemented via separate interfaces and hence considered as sub-modules.) </a:t>
             </a:r>
           </a:p>
           <a:p>
@@ -7072,7 +7069,7 @@
           <a:p>
             <a:r>
               <a:rPr lang="en-US" dirty="0"/>
-              <a:t>Level 1.2.2 - Recommend (Recommendation module (1.2) has 2 functions - Request Recommendation and        Recommend, both are implemented via separate interfaces and hence considered as sub-modules.) </a:t>
+              <a:t>Level 1.2.2 - Recommend (Recommendation module (1.2) has two functions - Request Recommendation and        Recommend, both are implemented via separate interfaces and hence considered as sub-modules.) </a:t>
             </a:r>
             <a:endParaRPr lang="en-IN" dirty="0"/>
           </a:p>
@@ -8707,21 +8704,10 @@
             <p:ph idx="1"/>
           </p:nvPr>
         </p:nvSpPr>
-        <p:spPr>
-          <a:xfrm>
-            <a:off x="838200" y="1604513"/>
-            <a:ext cx="10515600" cy="4572449"/>
-          </a:xfrm>
-        </p:spPr>
+        <p:spPr/>
         <p:txBody>
           <a:bodyPr/>
           <a:lstStyle/>
-          <a:p>
-            <a:pPr>
-              <a:buNone/>
-            </a:pPr>
-            <a:endParaRPr lang="en-US" dirty="0"/>
-          </a:p>
           <a:p>
             <a:r>
               <a:rPr lang="en-US" dirty="0"/>
@@ -9599,31 +9585,31 @@
               <a:buNone/>
             </a:pPr>
             <a:r>
-              <a:rPr lang="en-GB" sz="2700" dirty="0"/>
+              <a:rPr lang="en-GB" sz="2600" dirty="0"/>
               <a:t>[1]	</a:t>
             </a:r>
             <a:r>
-              <a:rPr lang="en-GB" sz="2700" dirty="0" err="1"/>
+              <a:rPr lang="en-GB" sz="2600" dirty="0" err="1"/>
               <a:t>Rajib</a:t>
             </a:r>
             <a:r>
-              <a:rPr lang="en-GB" sz="2700" dirty="0"/>
+              <a:rPr lang="en-GB" sz="2600" dirty="0"/>
               <a:t> Mall, </a:t>
             </a:r>
             <a:r>
-              <a:rPr lang="en-GB" sz="2700" i="1" dirty="0"/>
+              <a:rPr lang="en-GB" sz="2600" i="1" dirty="0"/>
               <a:t>Fundamentals of Software Engineering</a:t>
             </a:r>
             <a:r>
-              <a:rPr lang="en-GB" sz="2700" dirty="0"/>
+              <a:rPr lang="en-GB" sz="2600" dirty="0"/>
               <a:t>, 2</a:t>
             </a:r>
             <a:r>
-              <a:rPr lang="en-GB" sz="2700" baseline="30000" dirty="0"/>
+              <a:rPr lang="en-GB" sz="2600" baseline="30000" dirty="0"/>
               <a:t>nd</a:t>
             </a:r>
             <a:r>
-              <a:rPr lang="en-GB" sz="2700" dirty="0"/>
+              <a:rPr lang="en-GB" sz="2600" dirty="0"/>
               <a:t> ed., IN: PHI, 2003</a:t>
             </a:r>
           </a:p>
@@ -9638,31 +9624,31 @@
               <a:buNone/>
             </a:pPr>
             <a:r>
-              <a:rPr lang="en-GB" sz="2700" dirty="0"/>
+              <a:rPr lang="en-GB" sz="2600" dirty="0"/>
               <a:t>[2]	Pankaj </a:t>
             </a:r>
             <a:r>
-              <a:rPr lang="en-GB" sz="2700" dirty="0" err="1"/>
+              <a:rPr lang="en-GB" sz="2600" dirty="0" err="1"/>
               <a:t>Jalote</a:t>
             </a:r>
             <a:r>
-              <a:rPr lang="en-GB" sz="2700" dirty="0"/>
+              <a:rPr lang="en-GB" sz="2600" dirty="0"/>
               <a:t>, </a:t>
             </a:r>
             <a:r>
-              <a:rPr lang="en-GB" sz="2700" i="1" dirty="0"/>
+              <a:rPr lang="en-GB" sz="2600" i="1" dirty="0"/>
               <a:t>A Concise Introduction to Software Engineering, </a:t>
             </a:r>
             <a:r>
-              <a:rPr lang="en-GB" sz="2700" dirty="0"/>
+              <a:rPr lang="en-GB" sz="2600" dirty="0"/>
               <a:t>1</a:t>
             </a:r>
             <a:r>
-              <a:rPr lang="en-GB" sz="2700" baseline="30000" dirty="0"/>
+              <a:rPr lang="en-GB" sz="2600" baseline="30000" dirty="0"/>
               <a:t>st </a:t>
             </a:r>
             <a:r>
-              <a:rPr lang="en-GB" sz="2700" dirty="0"/>
+              <a:rPr lang="en-GB" sz="2600" dirty="0"/>
               <a:t>ed., UK: Springer,  2008. [E-book] Available: Springer e-book</a:t>
             </a:r>
           </a:p>
@@ -9677,20 +9663,20 @@
               <a:buNone/>
             </a:pPr>
             <a:r>
-              <a:rPr lang="en-GB" sz="2700" dirty="0"/>
+              <a:rPr lang="en-GB" sz="2600" dirty="0"/>
               <a:t>[3]	</a:t>
             </a:r>
             <a:r>
-              <a:rPr lang="en-US" sz="2700" dirty="0"/>
+              <a:rPr lang="en-US" sz="2600" dirty="0"/>
               <a:t>Barber L. (Mar 2006). e-Recruitment  Developments. Institute  for Employment  Studies,  Brighton. [Online] Available: </a:t>
             </a:r>
             <a:r>
-              <a:rPr lang="en-US" sz="2700" dirty="0">
+              <a:rPr lang="en-US" sz="2600" dirty="0">
                 <a:hlinkClick r:id="rId2"/>
               </a:rPr>
               <a:t>https://www.employment-studies.co.uk/resource/erecruitment-developments</a:t>
             </a:r>
-            <a:endParaRPr lang="en-US" sz="2700" dirty="0"/>
+            <a:endParaRPr lang="en-US" sz="2600" dirty="0"/>
           </a:p>
           <a:p>
             <a:pPr marL="900113" indent="-900113">
@@ -9703,40 +9689,40 @@
               <a:buNone/>
             </a:pPr>
             <a:r>
-              <a:rPr lang="en-US" sz="2700" dirty="0"/>
+              <a:rPr lang="en-US" sz="2600" dirty="0"/>
               <a:t>[4]	</a:t>
             </a:r>
             <a:r>
-              <a:rPr lang="en-US" sz="2700" dirty="0" err="1"/>
+              <a:rPr lang="en-US" sz="2600" dirty="0" err="1"/>
               <a:t>Ranga</a:t>
             </a:r>
             <a:r>
-              <a:rPr lang="en-US" sz="2700" dirty="0"/>
+              <a:rPr lang="en-US" sz="2600" dirty="0"/>
               <a:t> Karanam, </a:t>
             </a:r>
             <a:r>
-              <a:rPr lang="en-US" sz="2700" i="1" dirty="0"/>
+              <a:rPr lang="en-US" sz="2600" i="1" dirty="0"/>
               <a:t>Creating a Web Application with Spring Boot</a:t>
             </a:r>
             <a:r>
-              <a:rPr lang="en-US" sz="2700" dirty="0"/>
+              <a:rPr lang="en-US" sz="2600" dirty="0"/>
               <a:t>, </a:t>
             </a:r>
             <a:r>
-              <a:rPr lang="en-US" sz="2700" dirty="0" err="1"/>
+              <a:rPr lang="en-US" sz="2600" dirty="0" err="1"/>
               <a:t>DZone</a:t>
             </a:r>
             <a:r>
-              <a:rPr lang="en-US" sz="2700" dirty="0"/>
+              <a:rPr lang="en-US" sz="2600" dirty="0"/>
               <a:t>, Jun. 02, 2017. Accessed on: Jul. 08, 2020. [Online] Available: </a:t>
             </a:r>
             <a:r>
-              <a:rPr lang="en-US" sz="2700" dirty="0">
+              <a:rPr lang="en-US" sz="2600" dirty="0">
                 <a:hlinkClick r:id="rId3"/>
               </a:rPr>
               <a:t>https://dzone.com/articles/creating-a-web-application-with-spring-boot</a:t>
             </a:r>
-            <a:endParaRPr lang="en-US" sz="2700" dirty="0"/>
+            <a:endParaRPr lang="en-US" sz="2600" dirty="0"/>
           </a:p>
         </p:txBody>
       </p:sp>
@@ -9874,12 +9860,7 @@
             <p:ph idx="1"/>
           </p:nvPr>
         </p:nvSpPr>
-        <p:spPr>
-          <a:xfrm>
-            <a:off x="812321" y="1816999"/>
-            <a:ext cx="10515600" cy="4351338"/>
-          </a:xfrm>
-        </p:spPr>
+        <p:spPr/>
         <p:txBody>
           <a:bodyPr/>
           <a:lstStyle/>
@@ -10018,7 +9999,7 @@
           <a:p>
             <a:r>
               <a:rPr lang="en-GB" dirty="0"/>
-              <a:t>Connect students, recruiters and alumni.</a:t>
+              <a:t>Connect students, colleges, recruiters and alumni.</a:t>
             </a:r>
           </a:p>
           <a:p>
@@ -10042,15 +10023,7 @@
           <a:p>
             <a:r>
               <a:rPr lang="en-GB" dirty="0"/>
-              <a:t> Recruiters </a:t>
-            </a:r>
-            <a:r>
-              <a:rPr lang="en-GB"/>
-              <a:t>can easily maintain </a:t>
-            </a:r>
-            <a:r>
-              <a:rPr lang="en-GB" dirty="0"/>
-              <a:t>job details.</a:t>
+              <a:t>Recruiters can easily maintain job details.</a:t>
             </a:r>
           </a:p>
         </p:txBody>
@@ -10178,7 +10151,7 @@
           <a:p>
             <a:r>
               <a:rPr lang="en-GB" dirty="0"/>
-              <a:t>Difficulty in updating data</a:t>
+              <a:t>Difficult to updating data</a:t>
             </a:r>
           </a:p>
           <a:p>
@@ -10252,7 +10225,7 @@
           <a:p>
             <a:r>
               <a:rPr lang="en-GB" dirty="0"/>
-              <a:t>Develop a web application to connect college, student, alumni and recruiter</a:t>
+              <a:t>A secure and easy-to-use web application in Java using Spring boot and Spring security frameworks</a:t>
             </a:r>
           </a:p>
           <a:p>
@@ -10350,7 +10323,7 @@
           <a:p>
             <a:r>
               <a:rPr lang="en-GB" dirty="0"/>
-              <a:t>Schedule maintenance is easier</a:t>
+              <a:t>Schedule and maintenance is easier</a:t>
             </a:r>
           </a:p>
           <a:p>
@@ -10543,20 +10516,24 @@
           <a:lstStyle/>
           <a:p>
             <a:r>
+              <a:rPr lang="it-IT" dirty="0"/>
+              <a:t>4 GHz minimum, multi-core processor</a:t>
+            </a:r>
+            <a:r>
               <a:rPr lang="en-GB" dirty="0"/>
-              <a:t>Intel/AMD processor</a:t>
+              <a:t> </a:t>
             </a:r>
           </a:p>
           <a:p>
             <a:r>
               <a:rPr lang="en-GB" dirty="0"/>
-              <a:t>Minimum 1GB RAM</a:t>
+              <a:t>RAM: Minimum 2 GB</a:t>
             </a:r>
           </a:p>
           <a:p>
             <a:r>
               <a:rPr lang="en-GB" dirty="0"/>
-              <a:t>10GB Hard disk</a:t>
+              <a:t>Hard disk space: Minimum 10 GB</a:t>
             </a:r>
           </a:p>
         </p:txBody>
@@ -10641,44 +10618,50 @@
             <a:pPr lvl="1"/>
             <a:r>
               <a:rPr lang="en-GB" sz="1800" dirty="0"/>
-              <a:t> Linux: 64-bit Ubuntu 14.04+, Debian 8+,  openSUSE 13.3+ or Fedora Linux 24+</a:t>
+              <a:t>Linux: 64-bit Ubuntu 14.04+, Debian 8+,  openSUSE 13.3+ or Fedora Linux 24+</a:t>
             </a:r>
           </a:p>
           <a:p>
             <a:r>
               <a:rPr lang="en-GB" sz="2000" dirty="0"/>
-              <a:t>Front end:  </a:t>
+              <a:t>Front end: </a:t>
+            </a:r>
+            <a:r>
+              <a:rPr lang="en-GB" sz="2000" dirty="0" err="1"/>
+              <a:t>Thymeleaf</a:t>
+            </a:r>
+            <a:endParaRPr lang="en-US" sz="2000" dirty="0"/>
+          </a:p>
+          <a:p>
+            <a:r>
+              <a:rPr lang="en-GB" sz="2000" dirty="0"/>
+              <a:t>Back end: </a:t>
             </a:r>
             <a:r>
               <a:rPr lang="en-US" sz="2000" dirty="0"/>
-              <a:t>Spring boot and spring  security core</a:t>
-            </a:r>
-          </a:p>
-          <a:p>
+              <a:t>Spring boot, Spring  security and </a:t>
+            </a:r>
             <a:r>
               <a:rPr lang="en-GB" sz="2000" dirty="0"/>
-              <a:t>Back end:  MongoDB</a:t>
+              <a:t>MongoDB</a:t>
             </a:r>
           </a:p>
           <a:p>
             <a:r>
               <a:rPr lang="en-GB" sz="2000" dirty="0"/>
-              <a:t>Supported browsers: Chrome, Firefox,  Internet Explorer 9  </a:t>
-            </a:r>
-          </a:p>
-          <a:p>
-            <a:pPr marL="0" indent="0">
-              <a:buNone/>
-            </a:pPr>
+              <a:t>Web server: Embedded Tomcat</a:t>
+            </a:r>
+          </a:p>
+          <a:p>
             <a:r>
               <a:rPr lang="en-GB" sz="2000" dirty="0"/>
-              <a:t>   and above</a:t>
+              <a:t>Supported browsers: Chrome, Firefox,  Internet Explorer 9+</a:t>
             </a:r>
           </a:p>
           <a:p>
             <a:r>
               <a:rPr lang="en-GB" sz="2000" dirty="0"/>
-              <a:t>Java version 1.8+</a:t>
+              <a:t>Java 1.8+</a:t>
             </a:r>
           </a:p>
         </p:txBody>

</xml_diff>

<commit_message>
Corrected Alka's name in 0th review ppt
</commit_message>
<xml_diff>
--- a/Presentation for zeroth review/PPT for zeroth review.pptx
+++ b/Presentation for zeroth review/PPT for zeroth review.pptx
@@ -334,7 +334,7 @@
           <a:p>
             <a:fld id="{214F1ACB-3A54-4C60-B610-BAEB1CECA8AE}" type="datetimeFigureOut">
               <a:rPr lang="en-GB" smtClean="0"/>
-              <a:t>15/07/2020</a:t>
+              <a:t>19/07/2020</a:t>
             </a:fld>
             <a:endParaRPr lang="en-GB"/>
           </a:p>
@@ -5883,7 +5883,7 @@
         </p:nvSpPr>
         <p:spPr>
           <a:xfrm>
-            <a:off x="4687910" y="4198513"/>
+            <a:off x="4592376" y="4198514"/>
             <a:ext cx="7504090" cy="2659486"/>
           </a:xfrm>
           <a:noFill/>
@@ -5976,7 +5976,7 @@
                   <a:srgbClr val="2D3E50"/>
                 </a:solidFill>
               </a:rPr>
-              <a:t> (IEAREIT007)</a:t>
+              <a:t> K (IEAREIT007)</a:t>
             </a:r>
           </a:p>
           <a:p>

</xml_diff>